<commit_message>
add confirmation to ui spec
</commit_message>
<xml_diff>
--- a/bin/algieba.pptx
+++ b/bin/algieba.pptx
@@ -5,7 +5,7 @@
     <p:sldMasterId id="2147483648" r:id="rId1"/>
   </p:sldMasterIdLst>
   <p:notesMasterIdLst>
-    <p:notesMasterId r:id="rId7"/>
+    <p:notesMasterId r:id="rId8"/>
   </p:notesMasterIdLst>
   <p:sldIdLst>
     <p:sldId id="256" r:id="rId2"/>
@@ -13,6 +13,7 @@
     <p:sldId id="266" r:id="rId4"/>
     <p:sldId id="265" r:id="rId5"/>
     <p:sldId id="267" r:id="rId6"/>
+    <p:sldId id="268" r:id="rId7"/>
   </p:sldIdLst>
   <p:sldSz cx="9144000" cy="6858000" type="screen4x3"/>
   <p:notesSz cx="6858000" cy="9144000"/>
@@ -196,7 +197,7 @@
           <a:p>
             <a:fld id="{EE82FEE5-269B-9B49-A8C4-823C45BE6055}" type="datetimeFigureOut">
               <a:rPr kumimoji="1" lang="ja-JP" altLang="en-US" smtClean="0"/>
-              <a:t>17/02/12</a:t>
+              <a:t>17/07/02</a:t>
             </a:fld>
             <a:endParaRPr kumimoji="1" lang="ja-JP" altLang="en-US"/>
           </a:p>
@@ -832,6 +833,90 @@
 </p:notes>
 </file>
 
+<file path=ppt/notesSlides/notesSlide5.xml><?xml version="1.0" encoding="utf-8"?>
+<p:notes xmlns:a="http://schemas.openxmlformats.org/drawingml/2006/main" xmlns:r="http://schemas.openxmlformats.org/officeDocument/2006/relationships" xmlns:p="http://schemas.openxmlformats.org/presentationml/2006/main">
+  <p:cSld>
+    <p:spTree>
+      <p:nvGrpSpPr>
+        <p:cNvPr id="1" name=""/>
+        <p:cNvGrpSpPr/>
+        <p:nvPr/>
+      </p:nvGrpSpPr>
+      <p:grpSpPr>
+        <a:xfrm>
+          <a:off x="0" y="0"/>
+          <a:ext cx="0" cy="0"/>
+          <a:chOff x="0" y="0"/>
+          <a:chExt cx="0" cy="0"/>
+        </a:xfrm>
+      </p:grpSpPr>
+      <p:sp>
+        <p:nvSpPr>
+          <p:cNvPr id="2" name="スライド イメージ プレースホルダー 1"/>
+          <p:cNvSpPr>
+            <a:spLocks noGrp="1" noRot="1" noChangeAspect="1"/>
+          </p:cNvSpPr>
+          <p:nvPr>
+            <p:ph type="sldImg"/>
+          </p:nvPr>
+        </p:nvSpPr>
+        <p:spPr/>
+      </p:sp>
+      <p:sp>
+        <p:nvSpPr>
+          <p:cNvPr id="3" name="ノート プレースホルダー 2"/>
+          <p:cNvSpPr>
+            <a:spLocks noGrp="1"/>
+          </p:cNvSpPr>
+          <p:nvPr>
+            <p:ph type="body" idx="1"/>
+          </p:nvPr>
+        </p:nvSpPr>
+        <p:spPr/>
+        <p:txBody>
+          <a:bodyPr/>
+          <a:lstStyle/>
+          <a:p>
+            <a:endParaRPr kumimoji="1" lang="ja-JP" altLang="en-US" dirty="0"/>
+          </a:p>
+        </p:txBody>
+      </p:sp>
+      <p:sp>
+        <p:nvSpPr>
+          <p:cNvPr id="4" name="スライド番号プレースホルダー 3"/>
+          <p:cNvSpPr>
+            <a:spLocks noGrp="1"/>
+          </p:cNvSpPr>
+          <p:nvPr>
+            <p:ph type="sldNum" sz="quarter" idx="10"/>
+          </p:nvPr>
+        </p:nvSpPr>
+        <p:spPr/>
+        <p:txBody>
+          <a:bodyPr/>
+          <a:lstStyle/>
+          <a:p>
+            <a:fld id="{A9E1B25B-30E5-7A42-A56A-DF1A6F86BC06}" type="slidenum">
+              <a:rPr kumimoji="1" lang="ja-JP" altLang="en-US" smtClean="0"/>
+              <a:t>6</a:t>
+            </a:fld>
+            <a:endParaRPr kumimoji="1" lang="ja-JP" altLang="en-US"/>
+          </a:p>
+        </p:txBody>
+      </p:sp>
+    </p:spTree>
+    <p:extLst>
+      <p:ext uri="{BB962C8B-B14F-4D97-AF65-F5344CB8AC3E}">
+        <p14:creationId xmlns:p14="http://schemas.microsoft.com/office/powerpoint/2010/main" val="3631066132"/>
+      </p:ext>
+    </p:extLst>
+  </p:cSld>
+  <p:clrMapOvr>
+    <a:masterClrMapping/>
+  </p:clrMapOvr>
+</p:notes>
+</file>
+
 <file path=ppt/slideLayouts/slideLayout1.xml><?xml version="1.0" encoding="utf-8"?>
 <p:sldLayout xmlns:a="http://schemas.openxmlformats.org/drawingml/2006/main" xmlns:r="http://schemas.openxmlformats.org/officeDocument/2006/relationships" xmlns:p="http://schemas.openxmlformats.org/presentationml/2006/main" type="title" preserve="1">
   <p:cSld name="タイトル スライド">
@@ -1013,7 +1098,7 @@
           <a:p>
             <a:fld id="{3ABA01A1-4899-9944-833D-6A66CDE659CB}" type="datetimeFigureOut">
               <a:rPr kumimoji="1" lang="ja-JP" altLang="en-US" smtClean="0"/>
-              <a:t>17/02/12</a:t>
+              <a:t>17/07/02</a:t>
             </a:fld>
             <a:endParaRPr kumimoji="1" lang="ja-JP" altLang="en-US"/>
           </a:p>
@@ -1215,7 +1300,7 @@
           <a:p>
             <a:fld id="{3ABA01A1-4899-9944-833D-6A66CDE659CB}" type="datetimeFigureOut">
               <a:rPr kumimoji="1" lang="ja-JP" altLang="en-US" smtClean="0"/>
-              <a:t>17/02/12</a:t>
+              <a:t>17/07/02</a:t>
             </a:fld>
             <a:endParaRPr kumimoji="1" lang="ja-JP" altLang="en-US"/>
           </a:p>
@@ -1427,7 +1512,7 @@
           <a:p>
             <a:fld id="{3ABA01A1-4899-9944-833D-6A66CDE659CB}" type="datetimeFigureOut">
               <a:rPr kumimoji="1" lang="ja-JP" altLang="en-US" smtClean="0"/>
-              <a:t>17/02/12</a:t>
+              <a:t>17/07/02</a:t>
             </a:fld>
             <a:endParaRPr kumimoji="1" lang="ja-JP" altLang="en-US"/>
           </a:p>
@@ -1629,7 +1714,7 @@
           <a:p>
             <a:fld id="{3ABA01A1-4899-9944-833D-6A66CDE659CB}" type="datetimeFigureOut">
               <a:rPr kumimoji="1" lang="ja-JP" altLang="en-US" smtClean="0"/>
-              <a:t>17/02/12</a:t>
+              <a:t>17/07/02</a:t>
             </a:fld>
             <a:endParaRPr kumimoji="1" lang="ja-JP" altLang="en-US"/>
           </a:p>
@@ -1875,7 +1960,7 @@
           <a:p>
             <a:fld id="{3ABA01A1-4899-9944-833D-6A66CDE659CB}" type="datetimeFigureOut">
               <a:rPr kumimoji="1" lang="ja-JP" altLang="en-US" smtClean="0"/>
-              <a:t>17/02/12</a:t>
+              <a:t>17/07/02</a:t>
             </a:fld>
             <a:endParaRPr kumimoji="1" lang="ja-JP" altLang="en-US"/>
           </a:p>
@@ -2227,7 +2312,7 @@
           <a:p>
             <a:fld id="{3ABA01A1-4899-9944-833D-6A66CDE659CB}" type="datetimeFigureOut">
               <a:rPr kumimoji="1" lang="ja-JP" altLang="en-US" smtClean="0"/>
-              <a:t>17/02/12</a:t>
+              <a:t>17/07/02</a:t>
             </a:fld>
             <a:endParaRPr kumimoji="1" lang="ja-JP" altLang="en-US"/>
           </a:p>
@@ -2713,7 +2798,7 @@
           <a:p>
             <a:fld id="{3ABA01A1-4899-9944-833D-6A66CDE659CB}" type="datetimeFigureOut">
               <a:rPr kumimoji="1" lang="ja-JP" altLang="en-US" smtClean="0"/>
-              <a:t>17/02/12</a:t>
+              <a:t>17/07/02</a:t>
             </a:fld>
             <a:endParaRPr kumimoji="1" lang="ja-JP" altLang="en-US"/>
           </a:p>
@@ -2831,7 +2916,7 @@
           <a:p>
             <a:fld id="{3ABA01A1-4899-9944-833D-6A66CDE659CB}" type="datetimeFigureOut">
               <a:rPr kumimoji="1" lang="ja-JP" altLang="en-US" smtClean="0"/>
-              <a:t>17/02/12</a:t>
+              <a:t>17/07/02</a:t>
             </a:fld>
             <a:endParaRPr kumimoji="1" lang="ja-JP" altLang="en-US"/>
           </a:p>
@@ -2926,7 +3011,7 @@
           <a:p>
             <a:fld id="{3ABA01A1-4899-9944-833D-6A66CDE659CB}" type="datetimeFigureOut">
               <a:rPr kumimoji="1" lang="ja-JP" altLang="en-US" smtClean="0"/>
-              <a:t>17/02/12</a:t>
+              <a:t>17/07/02</a:t>
             </a:fld>
             <a:endParaRPr kumimoji="1" lang="ja-JP" altLang="en-US"/>
           </a:p>
@@ -3235,7 +3320,7 @@
           <a:p>
             <a:fld id="{3ABA01A1-4899-9944-833D-6A66CDE659CB}" type="datetimeFigureOut">
               <a:rPr kumimoji="1" lang="ja-JP" altLang="en-US" smtClean="0"/>
-              <a:t>17/02/12</a:t>
+              <a:t>17/07/02</a:t>
             </a:fld>
             <a:endParaRPr kumimoji="1" lang="ja-JP" altLang="en-US"/>
           </a:p>
@@ -3488,7 +3573,7 @@
           <a:p>
             <a:fld id="{3ABA01A1-4899-9944-833D-6A66CDE659CB}" type="datetimeFigureOut">
               <a:rPr kumimoji="1" lang="ja-JP" altLang="en-US" smtClean="0"/>
-              <a:t>17/02/12</a:t>
+              <a:t>17/07/02</a:t>
             </a:fld>
             <a:endParaRPr kumimoji="1" lang="ja-JP" altLang="en-US"/>
           </a:p>
@@ -3733,7 +3818,7 @@
           <a:p>
             <a:fld id="{3ABA01A1-4899-9944-833D-6A66CDE659CB}" type="datetimeFigureOut">
               <a:rPr kumimoji="1" lang="ja-JP" altLang="en-US" smtClean="0"/>
-              <a:t>17/02/12</a:t>
+              <a:t>17/07/02</a:t>
             </a:fld>
             <a:endParaRPr kumimoji="1" lang="ja-JP" altLang="en-US"/>
           </a:p>
@@ -4177,7 +4262,19 @@
             </a:r>
             <a:r>
               <a:rPr lang="en-US" altLang="ja-JP" sz="2800" dirty="0" smtClean="0"/>
-              <a:t>2017/02/12</a:t>
+              <a:t>2017/</a:t>
+            </a:r>
+            <a:r>
+              <a:rPr lang="en-US" altLang="ja-JP" sz="2800" dirty="0" smtClean="0"/>
+              <a:t>07/</a:t>
+            </a:r>
+            <a:r>
+              <a:rPr lang="en-US" altLang="ja-JP" sz="2800" dirty="0"/>
+              <a:t>0</a:t>
+            </a:r>
+            <a:r>
+              <a:rPr lang="en-US" altLang="ja-JP" sz="2800" dirty="0" smtClean="0"/>
+              <a:t>2</a:t>
             </a:r>
             <a:r>
               <a:rPr lang="en-US" altLang="ja-JP" sz="2800" dirty="0" smtClean="0"/>
@@ -4196,7 +4293,7 @@
             </a:r>
             <a:r>
               <a:rPr lang="en-US" altLang="ja-JP" sz="2800" dirty="0" smtClean="0"/>
-              <a:t>2.4.0</a:t>
+              <a:t>2.5.0</a:t>
             </a:r>
             <a:endParaRPr kumimoji="1" lang="ja-JP" altLang="en-US" dirty="0"/>
           </a:p>
@@ -4279,7 +4376,7 @@
         <p:spPr>
           <a:xfrm>
             <a:off x="646545" y="969818"/>
-            <a:ext cx="7378943" cy="3970318"/>
+            <a:ext cx="8071440" cy="4524316"/>
           </a:xfrm>
           <a:prstGeom prst="rect">
             <a:avLst/>
@@ -4419,7 +4516,39 @@
                 <a:ea typeface="メイリオ"/>
                 <a:cs typeface="メイリオ"/>
               </a:rPr>
-              <a:t>画面上部の入力フォームから家計簿を入力する</a:t>
+              <a:t>画面上部の入力フォーム</a:t>
+            </a:r>
+            <a:r>
+              <a:rPr lang="ja-JP" altLang="en-US" dirty="0" smtClean="0">
+                <a:latin typeface="メイリオ"/>
+                <a:ea typeface="メイリオ"/>
+                <a:cs typeface="メイリオ"/>
+              </a:rPr>
+              <a:t>から</a:t>
+            </a:r>
+            <a:r>
+              <a:rPr lang="ja-JP" altLang="en-US" dirty="0" smtClean="0">
+                <a:latin typeface="メイリオ"/>
+                <a:ea typeface="メイリオ"/>
+                <a:cs typeface="メイリオ"/>
+              </a:rPr>
+              <a:t>収支情報</a:t>
+            </a:r>
+            <a:r>
+              <a:rPr lang="ja-JP" altLang="en-US" dirty="0" smtClean="0">
+                <a:latin typeface="メイリオ"/>
+                <a:ea typeface="メイリオ"/>
+                <a:cs typeface="メイリオ"/>
+              </a:rPr>
+              <a:t>を</a:t>
+            </a:r>
+            <a:r>
+              <a:rPr lang="ja-JP" altLang="en-US" dirty="0" smtClean="0">
+                <a:latin typeface="メイリオ"/>
+                <a:ea typeface="メイリオ"/>
+                <a:cs typeface="メイリオ"/>
+              </a:rPr>
+              <a:t>入力する</a:t>
             </a:r>
             <a:endParaRPr lang="en-US" altLang="ja-JP" dirty="0">
               <a:latin typeface="メイリオ"/>
@@ -4438,7 +4567,102 @@
                 <a:ea typeface="メイリオ"/>
                 <a:cs typeface="メイリオ"/>
               </a:rPr>
-              <a:t>家計簿情報を入力後、登録ボタンを押すと家計簿が登録される</a:t>
+              <a:t>収支</a:t>
+            </a:r>
+            <a:r>
+              <a:rPr lang="ja-JP" altLang="en-US" dirty="0" smtClean="0">
+                <a:latin typeface="メイリオ"/>
+                <a:ea typeface="メイリオ"/>
+                <a:cs typeface="メイリオ"/>
+              </a:rPr>
+              <a:t>情報</a:t>
+            </a:r>
+            <a:r>
+              <a:rPr lang="ja-JP" altLang="en-US" dirty="0" smtClean="0">
+                <a:latin typeface="メイリオ"/>
+                <a:ea typeface="メイリオ"/>
+                <a:cs typeface="メイリオ"/>
+              </a:rPr>
+              <a:t>を入力後、登録ボタンを押す</a:t>
+            </a:r>
+            <a:r>
+              <a:rPr lang="ja-JP" altLang="en-US" dirty="0">
+                <a:latin typeface="メイリオ"/>
+                <a:ea typeface="メイリオ"/>
+                <a:cs typeface="メイリオ"/>
+              </a:rPr>
+              <a:t>と</a:t>
+            </a:r>
+            <a:r>
+              <a:rPr lang="ja-JP" altLang="en-US" dirty="0" smtClean="0">
+                <a:latin typeface="メイリオ"/>
+                <a:ea typeface="メイリオ"/>
+                <a:cs typeface="メイリオ"/>
+              </a:rPr>
+              <a:t>収支</a:t>
+            </a:r>
+            <a:r>
+              <a:rPr lang="ja-JP" altLang="en-US" dirty="0" smtClean="0">
+                <a:latin typeface="メイリオ"/>
+                <a:ea typeface="メイリオ"/>
+                <a:cs typeface="メイリオ"/>
+              </a:rPr>
+              <a:t>情報</a:t>
+            </a:r>
+            <a:r>
+              <a:rPr lang="ja-JP" altLang="en-US" dirty="0" smtClean="0">
+                <a:latin typeface="メイリオ"/>
+                <a:ea typeface="メイリオ"/>
+                <a:cs typeface="メイリオ"/>
+              </a:rPr>
+              <a:t>が</a:t>
+            </a:r>
+            <a:r>
+              <a:rPr lang="ja-JP" altLang="en-US" dirty="0" smtClean="0">
+                <a:latin typeface="メイリオ"/>
+                <a:ea typeface="メイリオ"/>
+                <a:cs typeface="メイリオ"/>
+              </a:rPr>
+              <a:t>登録</a:t>
+            </a:r>
+            <a:r>
+              <a:rPr lang="ja-JP" altLang="en-US" dirty="0" smtClean="0">
+                <a:latin typeface="メイリオ"/>
+                <a:ea typeface="メイリオ"/>
+                <a:cs typeface="メイリオ"/>
+              </a:rPr>
+              <a:t>され</a:t>
+            </a:r>
+            <a:r>
+              <a:rPr lang="ja-JP" altLang="en-US" dirty="0" smtClean="0">
+                <a:latin typeface="メイリオ"/>
+                <a:ea typeface="メイリオ"/>
+                <a:cs typeface="メイリオ"/>
+              </a:rPr>
+              <a:t>、表が</a:t>
+            </a:r>
+            <a:r>
+              <a:rPr lang="en-US" altLang="ja-JP" dirty="0">
+                <a:latin typeface="メイリオ"/>
+                <a:ea typeface="メイリオ"/>
+                <a:cs typeface="メイリオ"/>
+              </a:rPr>
+              <a:t/>
+            </a:r>
+            <a:br>
+              <a:rPr lang="en-US" altLang="ja-JP" dirty="0">
+                <a:latin typeface="メイリオ"/>
+                <a:ea typeface="メイリオ"/>
+                <a:cs typeface="メイリオ"/>
+              </a:rPr>
+            </a:br>
+            <a:r>
+              <a:rPr lang="ja-JP" altLang="en-US" dirty="0" smtClean="0">
+                <a:latin typeface="メイリオ"/>
+                <a:ea typeface="メイリオ"/>
+                <a:cs typeface="メイリオ"/>
+              </a:rPr>
+              <a:t>更新される</a:t>
             </a:r>
             <a:endParaRPr lang="en-US" altLang="ja-JP" dirty="0" smtClean="0">
               <a:latin typeface="メイリオ"/>
@@ -4452,33 +4676,22 @@
               <a:buChar char="•"/>
             </a:pPr>
             <a:r>
+              <a:rPr lang="ja-JP" altLang="en-US" dirty="0">
+                <a:latin typeface="メイリオ"/>
+                <a:ea typeface="メイリオ"/>
+                <a:cs typeface="メイリオ"/>
+              </a:rPr>
+              <a:t>収支情報</a:t>
+            </a:r>
+            <a:r>
               <a:rPr lang="ja-JP" altLang="en-US" dirty="0" smtClean="0">
                 <a:latin typeface="メイリオ"/>
                 <a:ea typeface="メイリオ"/>
                 <a:cs typeface="メイリオ"/>
               </a:rPr>
-              <a:t>家計簿情報が不正な場合、エラーを通知する</a:t>
+              <a:t>が不正な場合、エラーを通知する</a:t>
             </a:r>
             <a:endParaRPr lang="en-US" altLang="ja-JP" dirty="0" smtClean="0">
-              <a:latin typeface="メイリオ"/>
-              <a:ea typeface="メイリオ"/>
-              <a:cs typeface="メイリオ"/>
-            </a:endParaRPr>
-          </a:p>
-          <a:p>
-            <a:pPr marL="742950" lvl="1" indent="-285750">
-              <a:buFont typeface="Arial"/>
-              <a:buChar char="•"/>
-            </a:pPr>
-            <a:r>
-              <a:rPr lang="ja-JP" altLang="en-US" dirty="0" smtClean="0">
-                <a:latin typeface="メイリオ"/>
-                <a:ea typeface="メイリオ"/>
-                <a:cs typeface="メイリオ"/>
-              </a:rPr>
-              <a:t>登録成功時、画面遷移なしで家計簿表の上部に表示される</a:t>
-            </a:r>
-            <a:endParaRPr lang="en-US" altLang="ja-JP" dirty="0">
               <a:latin typeface="メイリオ"/>
               <a:ea typeface="メイリオ"/>
               <a:cs typeface="メイリオ"/>
@@ -4498,28 +4711,52 @@
               <a:t>１ページ</a:t>
             </a:r>
             <a:r>
+              <a:rPr lang="ja-JP" altLang="en-US" dirty="0" smtClean="0">
+                <a:latin typeface="メイリオ"/>
+                <a:ea typeface="メイリオ"/>
+                <a:cs typeface="メイリオ"/>
+              </a:rPr>
+              <a:t>あたり</a:t>
+            </a:r>
+            <a:r>
+              <a:rPr lang="en-US" altLang="ja-JP" dirty="0" smtClean="0">
+                <a:latin typeface="メイリオ"/>
+                <a:ea typeface="メイリオ"/>
+                <a:cs typeface="メイリオ"/>
+              </a:rPr>
+              <a:t>50</a:t>
+            </a:r>
+            <a:r>
+              <a:rPr lang="ja-JP" altLang="en-US" dirty="0" smtClean="0">
+                <a:latin typeface="メイリオ"/>
+                <a:ea typeface="メイリオ"/>
+                <a:cs typeface="メイリオ"/>
+              </a:rPr>
+              <a:t>件の</a:t>
+            </a:r>
+            <a:r>
+              <a:rPr lang="ja-JP" altLang="en-US" dirty="0" smtClean="0">
+                <a:latin typeface="メイリオ"/>
+                <a:ea typeface="メイリオ"/>
+                <a:cs typeface="メイリオ"/>
+              </a:rPr>
+              <a:t>収支情報</a:t>
+            </a:r>
+            <a:r>
+              <a:rPr lang="ja-JP" altLang="en-US" dirty="0" smtClean="0">
+                <a:latin typeface="メイリオ"/>
+                <a:ea typeface="メイリオ"/>
+                <a:cs typeface="メイリオ"/>
+              </a:rPr>
+              <a:t>が</a:t>
+            </a:r>
+            <a:r>
               <a:rPr lang="ja-JP" altLang="en-US" dirty="0">
                 <a:latin typeface="メイリオ"/>
                 <a:ea typeface="メイリオ"/>
                 <a:cs typeface="メイリオ"/>
               </a:rPr>
-              <a:t>に</a:t>
-            </a:r>
-            <a:r>
-              <a:rPr lang="en-US" altLang="ja-JP" dirty="0">
-                <a:latin typeface="メイリオ"/>
-                <a:ea typeface="メイリオ"/>
-                <a:cs typeface="メイリオ"/>
-              </a:rPr>
-              <a:t>50</a:t>
-            </a:r>
-            <a:r>
-              <a:rPr lang="ja-JP" altLang="en-US" dirty="0">
-                <a:latin typeface="メイリオ"/>
-                <a:ea typeface="メイリオ"/>
-                <a:cs typeface="メイリオ"/>
-              </a:rPr>
-              <a:t>件の家計簿が表示</a:t>
+              <a:t>表示</a:t>
             </a:r>
             <a:r>
               <a:rPr lang="ja-JP" altLang="en-US" dirty="0" smtClean="0">
@@ -4581,7 +4818,101 @@
                 <a:ea typeface="メイリオ"/>
                 <a:cs typeface="メイリオ"/>
               </a:rPr>
-              <a:t>削除ボタンを押すと、対応する家計簿が削除される</a:t>
+              <a:t>削除ボタンを押すと</a:t>
+            </a:r>
+            <a:r>
+              <a:rPr lang="ja-JP" altLang="en-US" dirty="0" smtClean="0">
+                <a:latin typeface="メイリオ"/>
+                <a:ea typeface="メイリオ"/>
+                <a:cs typeface="メイリオ"/>
+              </a:rPr>
+              <a:t>、</a:t>
+            </a:r>
+            <a:r>
+              <a:rPr lang="ja-JP" altLang="en-US" dirty="0" smtClean="0">
+                <a:latin typeface="メイリオ"/>
+                <a:ea typeface="メイリオ"/>
+                <a:cs typeface="メイリオ"/>
+              </a:rPr>
+              <a:t>削除確認画面が表示される</a:t>
+            </a:r>
+            <a:endParaRPr lang="en-US" altLang="ja-JP" dirty="0" smtClean="0">
+              <a:latin typeface="メイリオ"/>
+              <a:ea typeface="メイリオ"/>
+              <a:cs typeface="メイリオ"/>
+            </a:endParaRPr>
+          </a:p>
+          <a:p>
+            <a:pPr marL="1200150" lvl="2" indent="-285750">
+              <a:buFont typeface="Arial"/>
+              <a:buChar char="•"/>
+            </a:pPr>
+            <a:r>
+              <a:rPr lang="ja-JP" altLang="en-US" dirty="0" smtClean="0">
+                <a:latin typeface="メイリオ"/>
+                <a:ea typeface="メイリオ"/>
+                <a:cs typeface="メイリオ"/>
+              </a:rPr>
+              <a:t>「はい」を選択すると</a:t>
+            </a:r>
+            <a:r>
+              <a:rPr lang="ja-JP" altLang="en-US" dirty="0" smtClean="0">
+                <a:latin typeface="メイリオ"/>
+                <a:ea typeface="メイリオ"/>
+                <a:cs typeface="メイリオ"/>
+              </a:rPr>
+              <a:t>対応する</a:t>
+            </a:r>
+            <a:r>
+              <a:rPr lang="ja-JP" altLang="en-US" dirty="0" smtClean="0">
+                <a:latin typeface="メイリオ"/>
+                <a:ea typeface="メイリオ"/>
+                <a:cs typeface="メイリオ"/>
+              </a:rPr>
+              <a:t>収支情報</a:t>
+            </a:r>
+            <a:r>
+              <a:rPr lang="ja-JP" altLang="en-US" dirty="0" smtClean="0">
+                <a:latin typeface="メイリオ"/>
+                <a:ea typeface="メイリオ"/>
+                <a:cs typeface="メイリオ"/>
+              </a:rPr>
+              <a:t>が</a:t>
+            </a:r>
+            <a:r>
+              <a:rPr lang="ja-JP" altLang="en-US" dirty="0" smtClean="0">
+                <a:latin typeface="メイリオ"/>
+                <a:ea typeface="メイリオ"/>
+                <a:cs typeface="メイリオ"/>
+              </a:rPr>
+              <a:t>削除</a:t>
+            </a:r>
+            <a:r>
+              <a:rPr lang="ja-JP" altLang="en-US" dirty="0" smtClean="0">
+                <a:latin typeface="メイリオ"/>
+                <a:ea typeface="メイリオ"/>
+                <a:cs typeface="メイリオ"/>
+              </a:rPr>
+              <a:t>される</a:t>
+            </a:r>
+            <a:endParaRPr lang="en-US" altLang="ja-JP" dirty="0" smtClean="0">
+              <a:latin typeface="メイリオ"/>
+              <a:ea typeface="メイリオ"/>
+              <a:cs typeface="メイリオ"/>
+            </a:endParaRPr>
+          </a:p>
+          <a:p>
+            <a:pPr marL="1200150" lvl="2" indent="-285750">
+              <a:buFont typeface="Arial"/>
+              <a:buChar char="•"/>
+            </a:pPr>
+            <a:r>
+              <a:rPr lang="ja-JP" altLang="en-US" dirty="0" smtClean="0">
+                <a:latin typeface="メイリオ"/>
+                <a:ea typeface="メイリオ"/>
+                <a:cs typeface="メイリオ"/>
+              </a:rPr>
+              <a:t>「いいえ」を選択すると管理画面に戻る</a:t>
             </a:r>
             <a:endParaRPr lang="ja-JP" altLang="en-US" dirty="0">
               <a:latin typeface="メイリオ"/>
@@ -9775,6 +10106,2443 @@
     <p:extLst>
       <p:ext uri="{BB962C8B-B14F-4D97-AF65-F5344CB8AC3E}">
         <p14:creationId xmlns:p14="http://schemas.microsoft.com/office/powerpoint/2010/main" val="4276026136"/>
+      </p:ext>
+    </p:extLst>
+  </p:cSld>
+  <p:clrMapOvr>
+    <a:masterClrMapping/>
+  </p:clrMapOvr>
+</p:sld>
+</file>
+
+<file path=ppt/slides/slide6.xml><?xml version="1.0" encoding="utf-8"?>
+<p:sld xmlns:a="http://schemas.openxmlformats.org/drawingml/2006/main" xmlns:r="http://schemas.openxmlformats.org/officeDocument/2006/relationships" xmlns:p="http://schemas.openxmlformats.org/presentationml/2006/main">
+  <p:cSld>
+    <p:spTree>
+      <p:nvGrpSpPr>
+        <p:cNvPr id="1" name=""/>
+        <p:cNvGrpSpPr/>
+        <p:nvPr/>
+      </p:nvGrpSpPr>
+      <p:grpSpPr>
+        <a:xfrm>
+          <a:off x="0" y="0"/>
+          <a:ext cx="0" cy="0"/>
+          <a:chOff x="0" y="0"/>
+          <a:chExt cx="0" cy="0"/>
+        </a:xfrm>
+      </p:grpSpPr>
+      <p:sp>
+        <p:nvSpPr>
+          <p:cNvPr id="4" name="テキスト ボックス 3"/>
+          <p:cNvSpPr txBox="1"/>
+          <p:nvPr/>
+        </p:nvSpPr>
+        <p:spPr>
+          <a:xfrm>
+            <a:off x="200532" y="187161"/>
+            <a:ext cx="4134465" cy="523220"/>
+          </a:xfrm>
+          <a:prstGeom prst="rect">
+            <a:avLst/>
+          </a:prstGeom>
+          <a:noFill/>
+        </p:spPr>
+        <p:txBody>
+          <a:bodyPr wrap="none" rtlCol="0">
+            <a:spAutoFit/>
+          </a:bodyPr>
+          <a:lstStyle/>
+          <a:p>
+            <a:r>
+              <a:rPr lang="ja-JP" altLang="en-US" sz="2800" dirty="0" smtClean="0">
+                <a:latin typeface="メイリオ"/>
+                <a:ea typeface="メイリオ"/>
+                <a:cs typeface="メイリオ"/>
+              </a:rPr>
+              <a:t>管理画面</a:t>
+            </a:r>
+            <a:r>
+              <a:rPr lang="ja-JP" altLang="en-US" sz="2800" dirty="0" smtClean="0">
+                <a:latin typeface="メイリオ"/>
+                <a:ea typeface="メイリオ"/>
+                <a:cs typeface="メイリオ"/>
+              </a:rPr>
+              <a:t>（</a:t>
+            </a:r>
+            <a:r>
+              <a:rPr lang="en-US" altLang="en-US" sz="2800" dirty="0" smtClean="0">
+                <a:latin typeface="メイリオ"/>
+                <a:ea typeface="メイリオ"/>
+                <a:cs typeface="メイリオ"/>
+              </a:rPr>
+              <a:t>削除確認</a:t>
+            </a:r>
+            <a:r>
+              <a:rPr lang="ja-JP" altLang="en-US" sz="2800" dirty="0" smtClean="0">
+                <a:latin typeface="メイリオ"/>
+                <a:ea typeface="メイリオ"/>
+                <a:cs typeface="メイリオ"/>
+              </a:rPr>
+              <a:t>時</a:t>
+            </a:r>
+            <a:r>
+              <a:rPr lang="ja-JP" altLang="en-US" sz="2800" dirty="0" smtClean="0">
+                <a:latin typeface="メイリオ"/>
+                <a:ea typeface="メイリオ"/>
+                <a:cs typeface="メイリオ"/>
+              </a:rPr>
+              <a:t>）</a:t>
+            </a:r>
+            <a:endParaRPr kumimoji="1" lang="ja-JP" altLang="en-US" sz="2000" dirty="0">
+              <a:latin typeface="メイリオ"/>
+              <a:ea typeface="メイリオ"/>
+              <a:cs typeface="メイリオ"/>
+            </a:endParaRPr>
+          </a:p>
+        </p:txBody>
+      </p:sp>
+      <p:sp>
+        <p:nvSpPr>
+          <p:cNvPr id="64" name="テキスト ボックス 63"/>
+          <p:cNvSpPr txBox="1"/>
+          <p:nvPr/>
+        </p:nvSpPr>
+        <p:spPr>
+          <a:xfrm>
+            <a:off x="4124211" y="1630084"/>
+            <a:ext cx="296175" cy="307777"/>
+          </a:xfrm>
+          <a:prstGeom prst="rect">
+            <a:avLst/>
+          </a:prstGeom>
+          <a:noFill/>
+        </p:spPr>
+        <p:txBody>
+          <a:bodyPr wrap="none" rtlCol="0">
+            <a:spAutoFit/>
+          </a:bodyPr>
+          <a:lstStyle/>
+          <a:p>
+            <a:r>
+              <a:rPr lang="en-US" altLang="ja-JP" sz="1400" dirty="0">
+                <a:latin typeface="メイリオ"/>
+                <a:ea typeface="メイリオ"/>
+                <a:cs typeface="メイリオ"/>
+              </a:rPr>
+              <a:t>1</a:t>
+            </a:r>
+            <a:endParaRPr kumimoji="1" lang="ja-JP" altLang="en-US" sz="1400" dirty="0">
+              <a:latin typeface="メイリオ"/>
+              <a:ea typeface="メイリオ"/>
+              <a:cs typeface="メイリオ"/>
+            </a:endParaRPr>
+          </a:p>
+        </p:txBody>
+      </p:sp>
+      <p:sp>
+        <p:nvSpPr>
+          <p:cNvPr id="65" name="テキスト ボックス 64"/>
+          <p:cNvSpPr txBox="1"/>
+          <p:nvPr/>
+        </p:nvSpPr>
+        <p:spPr>
+          <a:xfrm>
+            <a:off x="4356158" y="1632399"/>
+            <a:ext cx="296175" cy="307777"/>
+          </a:xfrm>
+          <a:prstGeom prst="rect">
+            <a:avLst/>
+          </a:prstGeom>
+          <a:noFill/>
+        </p:spPr>
+        <p:txBody>
+          <a:bodyPr wrap="none" rtlCol="0">
+            <a:spAutoFit/>
+          </a:bodyPr>
+          <a:lstStyle/>
+          <a:p>
+            <a:r>
+              <a:rPr lang="en-US" altLang="ja-JP" sz="1400" dirty="0" smtClean="0">
+                <a:latin typeface="メイリオ"/>
+                <a:ea typeface="メイリオ"/>
+                <a:cs typeface="メイリオ"/>
+              </a:rPr>
+              <a:t>2</a:t>
+            </a:r>
+            <a:endParaRPr kumimoji="1" lang="ja-JP" altLang="en-US" sz="1400" dirty="0">
+              <a:latin typeface="メイリオ"/>
+              <a:ea typeface="メイリオ"/>
+              <a:cs typeface="メイリオ"/>
+            </a:endParaRPr>
+          </a:p>
+        </p:txBody>
+      </p:sp>
+      <p:sp>
+        <p:nvSpPr>
+          <p:cNvPr id="66" name="テキスト ボックス 65"/>
+          <p:cNvSpPr txBox="1"/>
+          <p:nvPr/>
+        </p:nvSpPr>
+        <p:spPr>
+          <a:xfrm>
+            <a:off x="4597125" y="1632399"/>
+            <a:ext cx="494734" cy="307777"/>
+          </a:xfrm>
+          <a:prstGeom prst="rect">
+            <a:avLst/>
+          </a:prstGeom>
+          <a:noFill/>
+        </p:spPr>
+        <p:txBody>
+          <a:bodyPr wrap="none" rtlCol="0">
+            <a:spAutoFit/>
+          </a:bodyPr>
+          <a:lstStyle/>
+          <a:p>
+            <a:r>
+              <a:rPr lang="en-US" altLang="ja-JP" sz="1400" dirty="0" smtClean="0">
+                <a:latin typeface="メイリオ"/>
+                <a:ea typeface="メイリオ"/>
+                <a:cs typeface="メイリオ"/>
+              </a:rPr>
+              <a:t>. . .</a:t>
+            </a:r>
+            <a:endParaRPr kumimoji="1" lang="ja-JP" altLang="en-US" sz="1400" dirty="0">
+              <a:latin typeface="メイリオ"/>
+              <a:ea typeface="メイリオ"/>
+              <a:cs typeface="メイリオ"/>
+            </a:endParaRPr>
+          </a:p>
+        </p:txBody>
+      </p:sp>
+      <p:sp>
+        <p:nvSpPr>
+          <p:cNvPr id="67" name="二等辺三角形 66"/>
+          <p:cNvSpPr/>
+          <p:nvPr/>
+        </p:nvSpPr>
+        <p:spPr>
+          <a:xfrm rot="5400000">
+            <a:off x="5439130" y="1683849"/>
+            <a:ext cx="179370" cy="181212"/>
+          </a:xfrm>
+          <a:prstGeom prst="triangle">
+            <a:avLst/>
+          </a:prstGeom>
+          <a:solidFill>
+            <a:srgbClr val="F75D31"/>
+          </a:solidFill>
+          <a:ln>
+            <a:noFill/>
+          </a:ln>
+          <a:effectLst/>
+        </p:spPr>
+        <p:style>
+          <a:lnRef idx="1">
+            <a:schemeClr val="accent1"/>
+          </a:lnRef>
+          <a:fillRef idx="3">
+            <a:schemeClr val="accent1"/>
+          </a:fillRef>
+          <a:effectRef idx="2">
+            <a:schemeClr val="accent1"/>
+          </a:effectRef>
+          <a:fontRef idx="minor">
+            <a:schemeClr val="lt1"/>
+          </a:fontRef>
+        </p:style>
+        <p:txBody>
+          <a:bodyPr rtlCol="0" anchor="ctr"/>
+          <a:lstStyle/>
+          <a:p>
+            <a:pPr algn="ctr"/>
+            <a:endParaRPr kumimoji="1" lang="ja-JP" altLang="en-US"/>
+          </a:p>
+        </p:txBody>
+      </p:sp>
+      <p:sp>
+        <p:nvSpPr>
+          <p:cNvPr id="68" name="二等辺三角形 67"/>
+          <p:cNvSpPr/>
+          <p:nvPr/>
+        </p:nvSpPr>
+        <p:spPr>
+          <a:xfrm rot="16200000">
+            <a:off x="3923520" y="1684770"/>
+            <a:ext cx="180000" cy="180000"/>
+          </a:xfrm>
+          <a:prstGeom prst="triangle">
+            <a:avLst/>
+          </a:prstGeom>
+          <a:solidFill>
+            <a:srgbClr val="F75D31"/>
+          </a:solidFill>
+          <a:ln>
+            <a:noFill/>
+          </a:ln>
+          <a:effectLst/>
+        </p:spPr>
+        <p:style>
+          <a:lnRef idx="1">
+            <a:schemeClr val="accent1"/>
+          </a:lnRef>
+          <a:fillRef idx="3">
+            <a:schemeClr val="accent1"/>
+          </a:fillRef>
+          <a:effectRef idx="2">
+            <a:schemeClr val="accent1"/>
+          </a:effectRef>
+          <a:fontRef idx="minor">
+            <a:schemeClr val="lt1"/>
+          </a:fontRef>
+        </p:style>
+        <p:txBody>
+          <a:bodyPr rtlCol="0" anchor="ctr"/>
+          <a:lstStyle/>
+          <a:p>
+            <a:pPr algn="ctr"/>
+            <a:endParaRPr kumimoji="1" lang="ja-JP" altLang="en-US"/>
+          </a:p>
+        </p:txBody>
+      </p:sp>
+      <p:sp>
+        <p:nvSpPr>
+          <p:cNvPr id="69" name="テキスト ボックス 68"/>
+          <p:cNvSpPr txBox="1"/>
+          <p:nvPr/>
+        </p:nvSpPr>
+        <p:spPr>
+          <a:xfrm>
+            <a:off x="5013885" y="1632399"/>
+            <a:ext cx="407684" cy="307777"/>
+          </a:xfrm>
+          <a:prstGeom prst="rect">
+            <a:avLst/>
+          </a:prstGeom>
+          <a:noFill/>
+        </p:spPr>
+        <p:txBody>
+          <a:bodyPr wrap="none" rtlCol="0">
+            <a:spAutoFit/>
+          </a:bodyPr>
+          <a:lstStyle/>
+          <a:p>
+            <a:r>
+              <a:rPr lang="en-US" altLang="ja-JP" sz="1400" dirty="0" smtClean="0">
+                <a:latin typeface="メイリオ"/>
+                <a:ea typeface="メイリオ"/>
+                <a:cs typeface="メイリオ"/>
+              </a:rPr>
+              <a:t>20</a:t>
+            </a:r>
+            <a:endParaRPr kumimoji="1" lang="ja-JP" altLang="en-US" sz="1400" dirty="0">
+              <a:latin typeface="メイリオ"/>
+              <a:ea typeface="メイリオ"/>
+              <a:cs typeface="メイリオ"/>
+            </a:endParaRPr>
+          </a:p>
+        </p:txBody>
+      </p:sp>
+      <p:sp>
+        <p:nvSpPr>
+          <p:cNvPr id="21" name="テキスト ボックス 20"/>
+          <p:cNvSpPr txBox="1"/>
+          <p:nvPr/>
+        </p:nvSpPr>
+        <p:spPr>
+          <a:xfrm>
+            <a:off x="993905" y="1630084"/>
+            <a:ext cx="2623046" cy="307777"/>
+          </a:xfrm>
+          <a:prstGeom prst="rect">
+            <a:avLst/>
+          </a:prstGeom>
+          <a:noFill/>
+        </p:spPr>
+        <p:txBody>
+          <a:bodyPr wrap="none" rtlCol="0">
+            <a:spAutoFit/>
+          </a:bodyPr>
+          <a:lstStyle/>
+          <a:p>
+            <a:r>
+              <a:rPr lang="en-US" altLang="ja-JP" sz="1400" dirty="0" smtClean="0">
+                <a:latin typeface="メイリオ"/>
+                <a:ea typeface="メイリオ"/>
+                <a:cs typeface="メイリオ"/>
+              </a:rPr>
+              <a:t>xxx </a:t>
+            </a:r>
+            <a:r>
+              <a:rPr lang="ja-JP" altLang="en-US" sz="1400" dirty="0" smtClean="0">
+                <a:latin typeface="メイリオ"/>
+                <a:ea typeface="メイリオ"/>
+                <a:cs typeface="メイリオ"/>
+              </a:rPr>
+              <a:t>件中</a:t>
+            </a:r>
+            <a:r>
+              <a:rPr lang="en-US" altLang="ja-JP" sz="1400" dirty="0" smtClean="0">
+                <a:latin typeface="メイリオ"/>
+                <a:ea typeface="メイリオ"/>
+                <a:cs typeface="メイリオ"/>
+              </a:rPr>
+              <a:t> </a:t>
+            </a:r>
+            <a:r>
+              <a:rPr lang="en-US" altLang="ja-JP" sz="1400" dirty="0" err="1" smtClean="0">
+                <a:latin typeface="メイリオ"/>
+                <a:ea typeface="メイリオ"/>
+                <a:cs typeface="メイリオ"/>
+              </a:rPr>
+              <a:t>yyy</a:t>
+            </a:r>
+            <a:r>
+              <a:rPr lang="en-US" altLang="ja-JP" sz="1400" dirty="0" smtClean="0">
+                <a:latin typeface="メイリオ"/>
+                <a:ea typeface="メイリオ"/>
+                <a:cs typeface="メイリオ"/>
+              </a:rPr>
+              <a:t> 〜 </a:t>
+            </a:r>
+            <a:r>
+              <a:rPr lang="en-US" altLang="ja-JP" sz="1400" dirty="0" err="1" smtClean="0">
+                <a:latin typeface="メイリオ"/>
+                <a:ea typeface="メイリオ"/>
+                <a:cs typeface="メイリオ"/>
+              </a:rPr>
+              <a:t>zzz</a:t>
+            </a:r>
+            <a:r>
+              <a:rPr lang="en-US" altLang="ja-JP" sz="1400" dirty="0" smtClean="0">
+                <a:latin typeface="メイリオ"/>
+                <a:ea typeface="メイリオ"/>
+                <a:cs typeface="メイリオ"/>
+              </a:rPr>
+              <a:t> </a:t>
+            </a:r>
+            <a:r>
+              <a:rPr lang="ja-JP" altLang="en-US" sz="1400" dirty="0" smtClean="0">
+                <a:latin typeface="メイリオ"/>
+                <a:ea typeface="メイリオ"/>
+                <a:cs typeface="メイリオ"/>
+              </a:rPr>
+              <a:t>件を表示</a:t>
+            </a:r>
+            <a:endParaRPr kumimoji="1" lang="ja-JP" altLang="en-US" sz="1400" dirty="0">
+              <a:latin typeface="メイリオ"/>
+              <a:ea typeface="メイリオ"/>
+              <a:cs typeface="メイリオ"/>
+            </a:endParaRPr>
+          </a:p>
+        </p:txBody>
+      </p:sp>
+      <p:sp>
+        <p:nvSpPr>
+          <p:cNvPr id="22" name="二等辺三角形 21"/>
+          <p:cNvSpPr/>
+          <p:nvPr/>
+        </p:nvSpPr>
+        <p:spPr>
+          <a:xfrm rot="16200000">
+            <a:off x="3596344" y="1684770"/>
+            <a:ext cx="180000" cy="180000"/>
+          </a:xfrm>
+          <a:prstGeom prst="triangle">
+            <a:avLst/>
+          </a:prstGeom>
+          <a:solidFill>
+            <a:srgbClr val="F75D31"/>
+          </a:solidFill>
+          <a:ln>
+            <a:noFill/>
+          </a:ln>
+          <a:effectLst/>
+        </p:spPr>
+        <p:style>
+          <a:lnRef idx="1">
+            <a:schemeClr val="accent1"/>
+          </a:lnRef>
+          <a:fillRef idx="3">
+            <a:schemeClr val="accent1"/>
+          </a:fillRef>
+          <a:effectRef idx="2">
+            <a:schemeClr val="accent1"/>
+          </a:effectRef>
+          <a:fontRef idx="minor">
+            <a:schemeClr val="lt1"/>
+          </a:fontRef>
+        </p:style>
+        <p:txBody>
+          <a:bodyPr rtlCol="0" anchor="ctr"/>
+          <a:lstStyle/>
+          <a:p>
+            <a:pPr algn="ctr"/>
+            <a:endParaRPr kumimoji="1" lang="ja-JP" altLang="en-US"/>
+          </a:p>
+        </p:txBody>
+      </p:sp>
+      <p:sp>
+        <p:nvSpPr>
+          <p:cNvPr id="23" name="二等辺三角形 22"/>
+          <p:cNvSpPr/>
+          <p:nvPr/>
+        </p:nvSpPr>
+        <p:spPr>
+          <a:xfrm rot="16200000">
+            <a:off x="3693379" y="1684140"/>
+            <a:ext cx="180000" cy="180000"/>
+          </a:xfrm>
+          <a:prstGeom prst="triangle">
+            <a:avLst/>
+          </a:prstGeom>
+          <a:solidFill>
+            <a:srgbClr val="F75D31"/>
+          </a:solidFill>
+          <a:ln>
+            <a:noFill/>
+          </a:ln>
+          <a:effectLst/>
+        </p:spPr>
+        <p:style>
+          <a:lnRef idx="1">
+            <a:schemeClr val="accent1"/>
+          </a:lnRef>
+          <a:fillRef idx="3">
+            <a:schemeClr val="accent1"/>
+          </a:fillRef>
+          <a:effectRef idx="2">
+            <a:schemeClr val="accent1"/>
+          </a:effectRef>
+          <a:fontRef idx="minor">
+            <a:schemeClr val="lt1"/>
+          </a:fontRef>
+        </p:style>
+        <p:txBody>
+          <a:bodyPr rtlCol="0" anchor="ctr"/>
+          <a:lstStyle/>
+          <a:p>
+            <a:pPr algn="ctr"/>
+            <a:endParaRPr kumimoji="1" lang="ja-JP" altLang="en-US"/>
+          </a:p>
+        </p:txBody>
+      </p:sp>
+      <p:sp>
+        <p:nvSpPr>
+          <p:cNvPr id="24" name="二等辺三角形 23"/>
+          <p:cNvSpPr/>
+          <p:nvPr/>
+        </p:nvSpPr>
+        <p:spPr>
+          <a:xfrm rot="5400000">
+            <a:off x="5764549" y="1684479"/>
+            <a:ext cx="179370" cy="181212"/>
+          </a:xfrm>
+          <a:prstGeom prst="triangle">
+            <a:avLst/>
+          </a:prstGeom>
+          <a:solidFill>
+            <a:srgbClr val="F75D31"/>
+          </a:solidFill>
+          <a:ln>
+            <a:noFill/>
+          </a:ln>
+          <a:effectLst/>
+        </p:spPr>
+        <p:style>
+          <a:lnRef idx="1">
+            <a:schemeClr val="accent1"/>
+          </a:lnRef>
+          <a:fillRef idx="3">
+            <a:schemeClr val="accent1"/>
+          </a:fillRef>
+          <a:effectRef idx="2">
+            <a:schemeClr val="accent1"/>
+          </a:effectRef>
+          <a:fontRef idx="minor">
+            <a:schemeClr val="lt1"/>
+          </a:fontRef>
+        </p:style>
+        <p:txBody>
+          <a:bodyPr rtlCol="0" anchor="ctr"/>
+          <a:lstStyle/>
+          <a:p>
+            <a:pPr algn="ctr"/>
+            <a:endParaRPr kumimoji="1" lang="ja-JP" altLang="en-US"/>
+          </a:p>
+        </p:txBody>
+      </p:sp>
+      <p:sp>
+        <p:nvSpPr>
+          <p:cNvPr id="25" name="二等辺三角形 24"/>
+          <p:cNvSpPr/>
+          <p:nvPr/>
+        </p:nvSpPr>
+        <p:spPr>
+          <a:xfrm rot="5400000">
+            <a:off x="5673943" y="1684479"/>
+            <a:ext cx="179370" cy="181212"/>
+          </a:xfrm>
+          <a:prstGeom prst="triangle">
+            <a:avLst/>
+          </a:prstGeom>
+          <a:solidFill>
+            <a:srgbClr val="F75D31"/>
+          </a:solidFill>
+          <a:ln>
+            <a:noFill/>
+          </a:ln>
+          <a:effectLst/>
+        </p:spPr>
+        <p:style>
+          <a:lnRef idx="1">
+            <a:schemeClr val="accent1"/>
+          </a:lnRef>
+          <a:fillRef idx="3">
+            <a:schemeClr val="accent1"/>
+          </a:fillRef>
+          <a:effectRef idx="2">
+            <a:schemeClr val="accent1"/>
+          </a:effectRef>
+          <a:fontRef idx="minor">
+            <a:schemeClr val="lt1"/>
+          </a:fontRef>
+        </p:style>
+        <p:txBody>
+          <a:bodyPr rtlCol="0" anchor="ctr"/>
+          <a:lstStyle/>
+          <a:p>
+            <a:pPr algn="ctr"/>
+            <a:endParaRPr kumimoji="1" lang="ja-JP" altLang="en-US"/>
+          </a:p>
+        </p:txBody>
+      </p:sp>
+      <p:sp>
+        <p:nvSpPr>
+          <p:cNvPr id="28" name="角丸四角形 27"/>
+          <p:cNvSpPr/>
+          <p:nvPr/>
+        </p:nvSpPr>
+        <p:spPr>
+          <a:xfrm>
+            <a:off x="1469168" y="1187601"/>
+            <a:ext cx="562830" cy="165946"/>
+          </a:xfrm>
+          <a:prstGeom prst="roundRect">
+            <a:avLst/>
+          </a:prstGeom>
+          <a:noFill/>
+          <a:ln w="25400">
+            <a:solidFill>
+              <a:schemeClr val="tx1"/>
+            </a:solidFill>
+          </a:ln>
+          <a:effectLst/>
+        </p:spPr>
+        <p:style>
+          <a:lnRef idx="1">
+            <a:schemeClr val="accent1"/>
+          </a:lnRef>
+          <a:fillRef idx="3">
+            <a:schemeClr val="accent1"/>
+          </a:fillRef>
+          <a:effectRef idx="2">
+            <a:schemeClr val="accent1"/>
+          </a:effectRef>
+          <a:fontRef idx="minor">
+            <a:schemeClr val="lt1"/>
+          </a:fontRef>
+        </p:style>
+        <p:txBody>
+          <a:bodyPr rtlCol="0" anchor="ctr"/>
+          <a:lstStyle/>
+          <a:p>
+            <a:pPr algn="ctr"/>
+            <a:endParaRPr kumimoji="1" lang="ja-JP" altLang="en-US"/>
+          </a:p>
+        </p:txBody>
+      </p:sp>
+      <p:sp>
+        <p:nvSpPr>
+          <p:cNvPr id="29" name="テキスト ボックス 28"/>
+          <p:cNvSpPr txBox="1"/>
+          <p:nvPr/>
+        </p:nvSpPr>
+        <p:spPr>
+          <a:xfrm>
+            <a:off x="890993" y="1114621"/>
+            <a:ext cx="646331" cy="276999"/>
+          </a:xfrm>
+          <a:prstGeom prst="rect">
+            <a:avLst/>
+          </a:prstGeom>
+          <a:noFill/>
+        </p:spPr>
+        <p:txBody>
+          <a:bodyPr wrap="none" rtlCol="0">
+            <a:spAutoFit/>
+          </a:bodyPr>
+          <a:lstStyle/>
+          <a:p>
+            <a:r>
+              <a:rPr kumimoji="1" lang="ja-JP" altLang="en-US" sz="1200" dirty="0" smtClean="0">
+                <a:latin typeface="メイリオ"/>
+                <a:ea typeface="メイリオ"/>
+                <a:cs typeface="メイリオ"/>
+              </a:rPr>
+              <a:t>日付：</a:t>
+            </a:r>
+            <a:endParaRPr kumimoji="1" lang="ja-JP" altLang="en-US" sz="1200" dirty="0">
+              <a:latin typeface="メイリオ"/>
+              <a:ea typeface="メイリオ"/>
+              <a:cs typeface="メイリオ"/>
+            </a:endParaRPr>
+          </a:p>
+        </p:txBody>
+      </p:sp>
+      <p:sp>
+        <p:nvSpPr>
+          <p:cNvPr id="30" name="角丸四角形 29"/>
+          <p:cNvSpPr/>
+          <p:nvPr/>
+        </p:nvSpPr>
+        <p:spPr>
+          <a:xfrm>
+            <a:off x="2646774" y="1187601"/>
+            <a:ext cx="797002" cy="165946"/>
+          </a:xfrm>
+          <a:prstGeom prst="roundRect">
+            <a:avLst/>
+          </a:prstGeom>
+          <a:noFill/>
+          <a:ln w="25400">
+            <a:solidFill>
+              <a:schemeClr val="tx1"/>
+            </a:solidFill>
+          </a:ln>
+          <a:effectLst/>
+        </p:spPr>
+        <p:style>
+          <a:lnRef idx="1">
+            <a:schemeClr val="accent1"/>
+          </a:lnRef>
+          <a:fillRef idx="3">
+            <a:schemeClr val="accent1"/>
+          </a:fillRef>
+          <a:effectRef idx="2">
+            <a:schemeClr val="accent1"/>
+          </a:effectRef>
+          <a:fontRef idx="minor">
+            <a:schemeClr val="lt1"/>
+          </a:fontRef>
+        </p:style>
+        <p:txBody>
+          <a:bodyPr rtlCol="0" anchor="ctr"/>
+          <a:lstStyle/>
+          <a:p>
+            <a:pPr algn="ctr"/>
+            <a:endParaRPr kumimoji="1" lang="ja-JP" altLang="en-US"/>
+          </a:p>
+        </p:txBody>
+      </p:sp>
+      <p:sp>
+        <p:nvSpPr>
+          <p:cNvPr id="31" name="テキスト ボックス 30"/>
+          <p:cNvSpPr txBox="1"/>
+          <p:nvPr/>
+        </p:nvSpPr>
+        <p:spPr>
+          <a:xfrm>
+            <a:off x="2046815" y="1111063"/>
+            <a:ext cx="646331" cy="276999"/>
+          </a:xfrm>
+          <a:prstGeom prst="rect">
+            <a:avLst/>
+          </a:prstGeom>
+          <a:noFill/>
+        </p:spPr>
+        <p:txBody>
+          <a:bodyPr wrap="none" rtlCol="0">
+            <a:spAutoFit/>
+          </a:bodyPr>
+          <a:lstStyle/>
+          <a:p>
+            <a:r>
+              <a:rPr lang="ja-JP" altLang="en-US" sz="1200" dirty="0" smtClean="0">
+                <a:latin typeface="メイリオ"/>
+                <a:ea typeface="メイリオ"/>
+                <a:cs typeface="メイリオ"/>
+              </a:rPr>
+              <a:t>内容</a:t>
+            </a:r>
+            <a:r>
+              <a:rPr kumimoji="1" lang="ja-JP" altLang="en-US" sz="1200" dirty="0" smtClean="0">
+                <a:latin typeface="メイリオ"/>
+                <a:ea typeface="メイリオ"/>
+                <a:cs typeface="メイリオ"/>
+              </a:rPr>
+              <a:t>：</a:t>
+            </a:r>
+            <a:endParaRPr kumimoji="1" lang="ja-JP" altLang="en-US" sz="1200" dirty="0">
+              <a:latin typeface="メイリオ"/>
+              <a:ea typeface="メイリオ"/>
+              <a:cs typeface="メイリオ"/>
+            </a:endParaRPr>
+          </a:p>
+        </p:txBody>
+      </p:sp>
+      <p:sp>
+        <p:nvSpPr>
+          <p:cNvPr id="32" name="角丸四角形 31"/>
+          <p:cNvSpPr/>
+          <p:nvPr/>
+        </p:nvSpPr>
+        <p:spPr>
+          <a:xfrm>
+            <a:off x="4369749" y="1187601"/>
+            <a:ext cx="560480" cy="165946"/>
+          </a:xfrm>
+          <a:prstGeom prst="roundRect">
+            <a:avLst/>
+          </a:prstGeom>
+          <a:noFill/>
+          <a:ln w="25400">
+            <a:solidFill>
+              <a:schemeClr val="tx1"/>
+            </a:solidFill>
+          </a:ln>
+          <a:effectLst/>
+        </p:spPr>
+        <p:style>
+          <a:lnRef idx="1">
+            <a:schemeClr val="accent1"/>
+          </a:lnRef>
+          <a:fillRef idx="3">
+            <a:schemeClr val="accent1"/>
+          </a:fillRef>
+          <a:effectRef idx="2">
+            <a:schemeClr val="accent1"/>
+          </a:effectRef>
+          <a:fontRef idx="minor">
+            <a:schemeClr val="lt1"/>
+          </a:fontRef>
+        </p:style>
+        <p:txBody>
+          <a:bodyPr rtlCol="0" anchor="ctr"/>
+          <a:lstStyle/>
+          <a:p>
+            <a:pPr algn="ctr"/>
+            <a:endParaRPr kumimoji="1" lang="ja-JP" altLang="en-US"/>
+          </a:p>
+        </p:txBody>
+      </p:sp>
+      <p:sp>
+        <p:nvSpPr>
+          <p:cNvPr id="33" name="テキスト ボックス 32"/>
+          <p:cNvSpPr txBox="1"/>
+          <p:nvPr/>
+        </p:nvSpPr>
+        <p:spPr>
+          <a:xfrm>
+            <a:off x="3461822" y="1118689"/>
+            <a:ext cx="954107" cy="276999"/>
+          </a:xfrm>
+          <a:prstGeom prst="rect">
+            <a:avLst/>
+          </a:prstGeom>
+          <a:noFill/>
+        </p:spPr>
+        <p:txBody>
+          <a:bodyPr wrap="none" rtlCol="0">
+            <a:spAutoFit/>
+          </a:bodyPr>
+          <a:lstStyle/>
+          <a:p>
+            <a:r>
+              <a:rPr lang="ja-JP" altLang="en-US" sz="1200" dirty="0" smtClean="0">
+                <a:latin typeface="メイリオ"/>
+                <a:ea typeface="メイリオ"/>
+                <a:cs typeface="メイリオ"/>
+              </a:rPr>
+              <a:t>カテゴリ</a:t>
+            </a:r>
+            <a:r>
+              <a:rPr kumimoji="1" lang="ja-JP" altLang="en-US" sz="1200" dirty="0" smtClean="0">
+                <a:latin typeface="メイリオ"/>
+                <a:ea typeface="メイリオ"/>
+                <a:cs typeface="メイリオ"/>
+              </a:rPr>
+              <a:t>：</a:t>
+            </a:r>
+            <a:endParaRPr kumimoji="1" lang="ja-JP" altLang="en-US" sz="1200" dirty="0">
+              <a:latin typeface="メイリオ"/>
+              <a:ea typeface="メイリオ"/>
+              <a:cs typeface="メイリオ"/>
+            </a:endParaRPr>
+          </a:p>
+        </p:txBody>
+      </p:sp>
+      <p:sp>
+        <p:nvSpPr>
+          <p:cNvPr id="34" name="角丸四角形 33"/>
+          <p:cNvSpPr/>
+          <p:nvPr/>
+        </p:nvSpPr>
+        <p:spPr>
+          <a:xfrm>
+            <a:off x="5569022" y="1187601"/>
+            <a:ext cx="561630" cy="165946"/>
+          </a:xfrm>
+          <a:prstGeom prst="roundRect">
+            <a:avLst/>
+          </a:prstGeom>
+          <a:noFill/>
+          <a:ln w="25400">
+            <a:solidFill>
+              <a:schemeClr val="tx1"/>
+            </a:solidFill>
+          </a:ln>
+          <a:effectLst/>
+        </p:spPr>
+        <p:style>
+          <a:lnRef idx="1">
+            <a:schemeClr val="accent1"/>
+          </a:lnRef>
+          <a:fillRef idx="3">
+            <a:schemeClr val="accent1"/>
+          </a:fillRef>
+          <a:effectRef idx="2">
+            <a:schemeClr val="accent1"/>
+          </a:effectRef>
+          <a:fontRef idx="minor">
+            <a:schemeClr val="lt1"/>
+          </a:fontRef>
+        </p:style>
+        <p:txBody>
+          <a:bodyPr rtlCol="0" anchor="ctr"/>
+          <a:lstStyle/>
+          <a:p>
+            <a:pPr algn="ctr"/>
+            <a:endParaRPr kumimoji="1" lang="ja-JP" altLang="en-US"/>
+          </a:p>
+        </p:txBody>
+      </p:sp>
+      <p:sp>
+        <p:nvSpPr>
+          <p:cNvPr id="35" name="テキスト ボックス 34"/>
+          <p:cNvSpPr txBox="1"/>
+          <p:nvPr/>
+        </p:nvSpPr>
+        <p:spPr>
+          <a:xfrm>
+            <a:off x="4957326" y="1128924"/>
+            <a:ext cx="646331" cy="276999"/>
+          </a:xfrm>
+          <a:prstGeom prst="rect">
+            <a:avLst/>
+          </a:prstGeom>
+          <a:noFill/>
+        </p:spPr>
+        <p:txBody>
+          <a:bodyPr wrap="none" rtlCol="0">
+            <a:spAutoFit/>
+          </a:bodyPr>
+          <a:lstStyle/>
+          <a:p>
+            <a:r>
+              <a:rPr lang="ja-JP" altLang="en-US" sz="1200" dirty="0" smtClean="0">
+                <a:latin typeface="メイリオ"/>
+                <a:ea typeface="メイリオ"/>
+                <a:cs typeface="メイリオ"/>
+              </a:rPr>
+              <a:t>金額</a:t>
+            </a:r>
+            <a:r>
+              <a:rPr kumimoji="1" lang="ja-JP" altLang="en-US" sz="1200" dirty="0" smtClean="0">
+                <a:latin typeface="メイリオ"/>
+                <a:ea typeface="メイリオ"/>
+                <a:cs typeface="メイリオ"/>
+              </a:rPr>
+              <a:t>：</a:t>
+            </a:r>
+            <a:endParaRPr kumimoji="1" lang="ja-JP" altLang="en-US" sz="1200" dirty="0">
+              <a:latin typeface="メイリオ"/>
+              <a:ea typeface="メイリオ"/>
+              <a:cs typeface="メイリオ"/>
+            </a:endParaRPr>
+          </a:p>
+        </p:txBody>
+      </p:sp>
+      <p:sp>
+        <p:nvSpPr>
+          <p:cNvPr id="36" name="角丸四角形 35"/>
+          <p:cNvSpPr/>
+          <p:nvPr/>
+        </p:nvSpPr>
+        <p:spPr>
+          <a:xfrm>
+            <a:off x="6515245" y="1118689"/>
+            <a:ext cx="550589" cy="299213"/>
+          </a:xfrm>
+          <a:prstGeom prst="roundRect">
+            <a:avLst/>
+          </a:prstGeom>
+          <a:noFill/>
+          <a:ln w="25400">
+            <a:solidFill>
+              <a:schemeClr val="tx1"/>
+            </a:solidFill>
+          </a:ln>
+          <a:effectLst/>
+        </p:spPr>
+        <p:style>
+          <a:lnRef idx="1">
+            <a:schemeClr val="accent1"/>
+          </a:lnRef>
+          <a:fillRef idx="3">
+            <a:schemeClr val="accent1"/>
+          </a:fillRef>
+          <a:effectRef idx="2">
+            <a:schemeClr val="accent1"/>
+          </a:effectRef>
+          <a:fontRef idx="minor">
+            <a:schemeClr val="lt1"/>
+          </a:fontRef>
+        </p:style>
+        <p:txBody>
+          <a:bodyPr rtlCol="0" anchor="ctr"/>
+          <a:lstStyle/>
+          <a:p>
+            <a:pPr algn="ctr"/>
+            <a:r>
+              <a:rPr kumimoji="1" lang="ja-JP" altLang="en-US" sz="1200" dirty="0" smtClean="0">
+                <a:solidFill>
+                  <a:schemeClr val="tx1"/>
+                </a:solidFill>
+                <a:latin typeface="メイリオ"/>
+                <a:ea typeface="メイリオ"/>
+                <a:cs typeface="メイリオ"/>
+              </a:rPr>
+              <a:t>登録</a:t>
+            </a:r>
+            <a:endParaRPr kumimoji="1" lang="ja-JP" altLang="en-US" sz="1200" dirty="0">
+              <a:solidFill>
+                <a:schemeClr val="tx1"/>
+              </a:solidFill>
+              <a:latin typeface="メイリオ"/>
+              <a:ea typeface="メイリオ"/>
+              <a:cs typeface="メイリオ"/>
+            </a:endParaRPr>
+          </a:p>
+        </p:txBody>
+      </p:sp>
+      <p:sp>
+        <p:nvSpPr>
+          <p:cNvPr id="37" name="角丸四角形 36"/>
+          <p:cNvSpPr/>
+          <p:nvPr/>
+        </p:nvSpPr>
+        <p:spPr>
+          <a:xfrm>
+            <a:off x="7239002" y="1121482"/>
+            <a:ext cx="864625" cy="299213"/>
+          </a:xfrm>
+          <a:prstGeom prst="roundRect">
+            <a:avLst/>
+          </a:prstGeom>
+          <a:noFill/>
+          <a:ln w="25400">
+            <a:solidFill>
+              <a:schemeClr val="tx1"/>
+            </a:solidFill>
+          </a:ln>
+          <a:effectLst/>
+        </p:spPr>
+        <p:style>
+          <a:lnRef idx="1">
+            <a:schemeClr val="accent1"/>
+          </a:lnRef>
+          <a:fillRef idx="3">
+            <a:schemeClr val="accent1"/>
+          </a:fillRef>
+          <a:effectRef idx="2">
+            <a:schemeClr val="accent1"/>
+          </a:effectRef>
+          <a:fontRef idx="minor">
+            <a:schemeClr val="lt1"/>
+          </a:fontRef>
+        </p:style>
+        <p:txBody>
+          <a:bodyPr rtlCol="0" anchor="ctr"/>
+          <a:lstStyle/>
+          <a:p>
+            <a:pPr algn="ctr"/>
+            <a:r>
+              <a:rPr lang="en-US" altLang="en-US" sz="1200" dirty="0" smtClean="0">
+                <a:solidFill>
+                  <a:schemeClr val="tx1"/>
+                </a:solidFill>
+                <a:latin typeface="メイリオ"/>
+                <a:ea typeface="メイリオ"/>
+                <a:cs typeface="メイリオ"/>
+              </a:rPr>
+              <a:t>リセット</a:t>
+            </a:r>
+            <a:endParaRPr kumimoji="1" lang="ja-JP" altLang="en-US" sz="1200" dirty="0">
+              <a:solidFill>
+                <a:schemeClr val="tx1"/>
+              </a:solidFill>
+              <a:latin typeface="メイリオ"/>
+              <a:ea typeface="メイリオ"/>
+              <a:cs typeface="メイリオ"/>
+            </a:endParaRPr>
+          </a:p>
+        </p:txBody>
+      </p:sp>
+      <p:cxnSp>
+        <p:nvCxnSpPr>
+          <p:cNvPr id="38" name="直線コネクタ 37"/>
+          <p:cNvCxnSpPr/>
+          <p:nvPr/>
+        </p:nvCxnSpPr>
+        <p:spPr>
+          <a:xfrm>
+            <a:off x="923931" y="1547091"/>
+            <a:ext cx="7250251" cy="0"/>
+          </a:xfrm>
+          <a:prstGeom prst="line">
+            <a:avLst/>
+          </a:prstGeom>
+          <a:ln>
+            <a:solidFill>
+              <a:schemeClr val="bg1">
+                <a:lumMod val="65000"/>
+              </a:schemeClr>
+            </a:solidFill>
+          </a:ln>
+          <a:effectLst/>
+        </p:spPr>
+        <p:style>
+          <a:lnRef idx="2">
+            <a:schemeClr val="accent1"/>
+          </a:lnRef>
+          <a:fillRef idx="0">
+            <a:schemeClr val="accent1"/>
+          </a:fillRef>
+          <a:effectRef idx="1">
+            <a:schemeClr val="accent1"/>
+          </a:effectRef>
+          <a:fontRef idx="minor">
+            <a:schemeClr val="tx1"/>
+          </a:fontRef>
+        </p:style>
+      </p:cxnSp>
+      <p:graphicFrame>
+        <p:nvGraphicFramePr>
+          <p:cNvPr id="39" name="表 38"/>
+          <p:cNvGraphicFramePr>
+            <a:graphicFrameLocks noGrp="1"/>
+          </p:cNvGraphicFramePr>
+          <p:nvPr>
+            <p:extLst>
+              <p:ext uri="{D42A27DB-BD31-4B8C-83A1-F6EECF244321}">
+                <p14:modId xmlns:p14="http://schemas.microsoft.com/office/powerpoint/2010/main" val="1452285320"/>
+              </p:ext>
+            </p:extLst>
+          </p:nvPr>
+        </p:nvGraphicFramePr>
+        <p:xfrm>
+          <a:off x="993905" y="2031998"/>
+          <a:ext cx="6891640" cy="4248728"/>
+        </p:xfrm>
+        <a:graphic>
+          <a:graphicData uri="http://schemas.openxmlformats.org/drawingml/2006/table">
+            <a:tbl>
+              <a:tblPr firstRow="1" bandRow="1">
+                <a:tableStyleId>{5C22544A-7EE6-4342-B048-85BDC9FD1C3A}</a:tableStyleId>
+              </a:tblPr>
+              <a:tblGrid>
+                <a:gridCol w="1722910"/>
+                <a:gridCol w="1722910"/>
+                <a:gridCol w="1722910"/>
+                <a:gridCol w="1722910"/>
+              </a:tblGrid>
+              <a:tr h="386248">
+                <a:tc>
+                  <a:txBody>
+                    <a:bodyPr/>
+                    <a:lstStyle/>
+                    <a:p>
+                      <a:r>
+                        <a:rPr kumimoji="1" lang="ja-JP" altLang="en-US" dirty="0" smtClean="0">
+                          <a:latin typeface="メイリオ"/>
+                          <a:ea typeface="メイリオ"/>
+                          <a:cs typeface="メイリオ"/>
+                        </a:rPr>
+                        <a:t>日付</a:t>
+                      </a:r>
+                      <a:endParaRPr kumimoji="1" lang="ja-JP" altLang="en-US" dirty="0">
+                        <a:latin typeface="メイリオ"/>
+                        <a:ea typeface="メイリオ"/>
+                        <a:cs typeface="メイリオ"/>
+                      </a:endParaRPr>
+                    </a:p>
+                  </a:txBody>
+                  <a:tcPr/>
+                </a:tc>
+                <a:tc>
+                  <a:txBody>
+                    <a:bodyPr/>
+                    <a:lstStyle/>
+                    <a:p>
+                      <a:r>
+                        <a:rPr kumimoji="1" lang="ja-JP" altLang="en-US" dirty="0" smtClean="0">
+                          <a:latin typeface="メイリオ"/>
+                          <a:ea typeface="メイリオ"/>
+                          <a:cs typeface="メイリオ"/>
+                        </a:rPr>
+                        <a:t>内容</a:t>
+                      </a:r>
+                      <a:endParaRPr kumimoji="1" lang="ja-JP" altLang="en-US" dirty="0">
+                        <a:latin typeface="メイリオ"/>
+                        <a:ea typeface="メイリオ"/>
+                        <a:cs typeface="メイリオ"/>
+                      </a:endParaRPr>
+                    </a:p>
+                  </a:txBody>
+                  <a:tcPr/>
+                </a:tc>
+                <a:tc>
+                  <a:txBody>
+                    <a:bodyPr/>
+                    <a:lstStyle/>
+                    <a:p>
+                      <a:r>
+                        <a:rPr kumimoji="1" lang="ja-JP" altLang="en-US" dirty="0" smtClean="0">
+                          <a:latin typeface="メイリオ"/>
+                          <a:ea typeface="メイリオ"/>
+                          <a:cs typeface="メイリオ"/>
+                        </a:rPr>
+                        <a:t>カテゴリ</a:t>
+                      </a:r>
+                      <a:endParaRPr kumimoji="1" lang="ja-JP" altLang="en-US" dirty="0">
+                        <a:latin typeface="メイリオ"/>
+                        <a:ea typeface="メイリオ"/>
+                        <a:cs typeface="メイリオ"/>
+                      </a:endParaRPr>
+                    </a:p>
+                  </a:txBody>
+                  <a:tcPr/>
+                </a:tc>
+                <a:tc>
+                  <a:txBody>
+                    <a:bodyPr/>
+                    <a:lstStyle/>
+                    <a:p>
+                      <a:r>
+                        <a:rPr kumimoji="1" lang="ja-JP" altLang="en-US" dirty="0" smtClean="0">
+                          <a:latin typeface="メイリオ"/>
+                          <a:ea typeface="メイリオ"/>
+                          <a:cs typeface="メイリオ"/>
+                        </a:rPr>
+                        <a:t>金額</a:t>
+                      </a:r>
+                      <a:endParaRPr kumimoji="1" lang="ja-JP" altLang="en-US" dirty="0">
+                        <a:latin typeface="メイリオ"/>
+                        <a:ea typeface="メイリオ"/>
+                        <a:cs typeface="メイリオ"/>
+                      </a:endParaRPr>
+                    </a:p>
+                  </a:txBody>
+                  <a:tcPr/>
+                </a:tc>
+              </a:tr>
+              <a:tr h="386248">
+                <a:tc>
+                  <a:txBody>
+                    <a:bodyPr/>
+                    <a:lstStyle/>
+                    <a:p>
+                      <a:endParaRPr kumimoji="1" lang="ja-JP" altLang="en-US"/>
+                    </a:p>
+                  </a:txBody>
+                  <a:tcPr/>
+                </a:tc>
+                <a:tc>
+                  <a:txBody>
+                    <a:bodyPr/>
+                    <a:lstStyle/>
+                    <a:p>
+                      <a:endParaRPr kumimoji="1" lang="ja-JP" altLang="en-US"/>
+                    </a:p>
+                  </a:txBody>
+                  <a:tcPr/>
+                </a:tc>
+                <a:tc>
+                  <a:txBody>
+                    <a:bodyPr/>
+                    <a:lstStyle/>
+                    <a:p>
+                      <a:endParaRPr kumimoji="1" lang="ja-JP" altLang="en-US"/>
+                    </a:p>
+                  </a:txBody>
+                  <a:tcPr/>
+                </a:tc>
+                <a:tc>
+                  <a:txBody>
+                    <a:bodyPr/>
+                    <a:lstStyle/>
+                    <a:p>
+                      <a:endParaRPr kumimoji="1" lang="ja-JP" altLang="en-US" dirty="0"/>
+                    </a:p>
+                  </a:txBody>
+                  <a:tcPr/>
+                </a:tc>
+              </a:tr>
+              <a:tr h="386248">
+                <a:tc>
+                  <a:txBody>
+                    <a:bodyPr/>
+                    <a:lstStyle/>
+                    <a:p>
+                      <a:endParaRPr kumimoji="1" lang="ja-JP" altLang="en-US" dirty="0"/>
+                    </a:p>
+                  </a:txBody>
+                  <a:tcPr/>
+                </a:tc>
+                <a:tc>
+                  <a:txBody>
+                    <a:bodyPr/>
+                    <a:lstStyle/>
+                    <a:p>
+                      <a:endParaRPr kumimoji="1" lang="ja-JP" altLang="en-US"/>
+                    </a:p>
+                  </a:txBody>
+                  <a:tcPr/>
+                </a:tc>
+                <a:tc>
+                  <a:txBody>
+                    <a:bodyPr/>
+                    <a:lstStyle/>
+                    <a:p>
+                      <a:endParaRPr kumimoji="1" lang="ja-JP" altLang="en-US"/>
+                    </a:p>
+                  </a:txBody>
+                  <a:tcPr/>
+                </a:tc>
+                <a:tc>
+                  <a:txBody>
+                    <a:bodyPr/>
+                    <a:lstStyle/>
+                    <a:p>
+                      <a:endParaRPr kumimoji="1" lang="ja-JP" altLang="en-US" dirty="0"/>
+                    </a:p>
+                  </a:txBody>
+                  <a:tcPr/>
+                </a:tc>
+              </a:tr>
+              <a:tr h="386248">
+                <a:tc>
+                  <a:txBody>
+                    <a:bodyPr/>
+                    <a:lstStyle/>
+                    <a:p>
+                      <a:endParaRPr kumimoji="1" lang="ja-JP" altLang="en-US" dirty="0"/>
+                    </a:p>
+                  </a:txBody>
+                  <a:tcPr/>
+                </a:tc>
+                <a:tc>
+                  <a:txBody>
+                    <a:bodyPr/>
+                    <a:lstStyle/>
+                    <a:p>
+                      <a:endParaRPr kumimoji="1" lang="ja-JP" altLang="en-US"/>
+                    </a:p>
+                  </a:txBody>
+                  <a:tcPr/>
+                </a:tc>
+                <a:tc>
+                  <a:txBody>
+                    <a:bodyPr/>
+                    <a:lstStyle/>
+                    <a:p>
+                      <a:endParaRPr kumimoji="1" lang="ja-JP" altLang="en-US"/>
+                    </a:p>
+                  </a:txBody>
+                  <a:tcPr/>
+                </a:tc>
+                <a:tc>
+                  <a:txBody>
+                    <a:bodyPr/>
+                    <a:lstStyle/>
+                    <a:p>
+                      <a:endParaRPr kumimoji="1" lang="ja-JP" altLang="en-US" dirty="0"/>
+                    </a:p>
+                  </a:txBody>
+                  <a:tcPr/>
+                </a:tc>
+              </a:tr>
+              <a:tr h="386248">
+                <a:tc>
+                  <a:txBody>
+                    <a:bodyPr/>
+                    <a:lstStyle/>
+                    <a:p>
+                      <a:endParaRPr kumimoji="1" lang="ja-JP" altLang="en-US" dirty="0"/>
+                    </a:p>
+                  </a:txBody>
+                  <a:tcPr/>
+                </a:tc>
+                <a:tc>
+                  <a:txBody>
+                    <a:bodyPr/>
+                    <a:lstStyle/>
+                    <a:p>
+                      <a:endParaRPr kumimoji="1" lang="ja-JP" altLang="en-US" dirty="0"/>
+                    </a:p>
+                  </a:txBody>
+                  <a:tcPr/>
+                </a:tc>
+                <a:tc>
+                  <a:txBody>
+                    <a:bodyPr/>
+                    <a:lstStyle/>
+                    <a:p>
+                      <a:endParaRPr kumimoji="1" lang="ja-JP" altLang="en-US"/>
+                    </a:p>
+                  </a:txBody>
+                  <a:tcPr/>
+                </a:tc>
+                <a:tc>
+                  <a:txBody>
+                    <a:bodyPr/>
+                    <a:lstStyle/>
+                    <a:p>
+                      <a:endParaRPr kumimoji="1" lang="ja-JP" altLang="en-US" dirty="0"/>
+                    </a:p>
+                  </a:txBody>
+                  <a:tcPr/>
+                </a:tc>
+              </a:tr>
+              <a:tr h="386248">
+                <a:tc>
+                  <a:txBody>
+                    <a:bodyPr/>
+                    <a:lstStyle/>
+                    <a:p>
+                      <a:endParaRPr kumimoji="1" lang="ja-JP" altLang="en-US" dirty="0"/>
+                    </a:p>
+                  </a:txBody>
+                  <a:tcPr/>
+                </a:tc>
+                <a:tc>
+                  <a:txBody>
+                    <a:bodyPr/>
+                    <a:lstStyle/>
+                    <a:p>
+                      <a:endParaRPr kumimoji="1" lang="ja-JP" altLang="en-US" dirty="0"/>
+                    </a:p>
+                  </a:txBody>
+                  <a:tcPr/>
+                </a:tc>
+                <a:tc>
+                  <a:txBody>
+                    <a:bodyPr/>
+                    <a:lstStyle/>
+                    <a:p>
+                      <a:endParaRPr kumimoji="1" lang="ja-JP" altLang="en-US"/>
+                    </a:p>
+                  </a:txBody>
+                  <a:tcPr/>
+                </a:tc>
+                <a:tc>
+                  <a:txBody>
+                    <a:bodyPr/>
+                    <a:lstStyle/>
+                    <a:p>
+                      <a:endParaRPr kumimoji="1" lang="ja-JP" altLang="en-US" dirty="0"/>
+                    </a:p>
+                  </a:txBody>
+                  <a:tcPr/>
+                </a:tc>
+              </a:tr>
+              <a:tr h="386248">
+                <a:tc>
+                  <a:txBody>
+                    <a:bodyPr/>
+                    <a:lstStyle/>
+                    <a:p>
+                      <a:endParaRPr kumimoji="1" lang="ja-JP" altLang="en-US" dirty="0"/>
+                    </a:p>
+                  </a:txBody>
+                  <a:tcPr/>
+                </a:tc>
+                <a:tc>
+                  <a:txBody>
+                    <a:bodyPr/>
+                    <a:lstStyle/>
+                    <a:p>
+                      <a:endParaRPr kumimoji="1" lang="ja-JP" altLang="en-US" dirty="0"/>
+                    </a:p>
+                  </a:txBody>
+                  <a:tcPr/>
+                </a:tc>
+                <a:tc>
+                  <a:txBody>
+                    <a:bodyPr/>
+                    <a:lstStyle/>
+                    <a:p>
+                      <a:endParaRPr kumimoji="1" lang="ja-JP" altLang="en-US"/>
+                    </a:p>
+                  </a:txBody>
+                  <a:tcPr/>
+                </a:tc>
+                <a:tc>
+                  <a:txBody>
+                    <a:bodyPr/>
+                    <a:lstStyle/>
+                    <a:p>
+                      <a:endParaRPr kumimoji="1" lang="ja-JP" altLang="en-US" dirty="0"/>
+                    </a:p>
+                  </a:txBody>
+                  <a:tcPr/>
+                </a:tc>
+              </a:tr>
+              <a:tr h="386248">
+                <a:tc>
+                  <a:txBody>
+                    <a:bodyPr/>
+                    <a:lstStyle/>
+                    <a:p>
+                      <a:endParaRPr kumimoji="1" lang="ja-JP" altLang="en-US" dirty="0"/>
+                    </a:p>
+                  </a:txBody>
+                  <a:tcPr/>
+                </a:tc>
+                <a:tc>
+                  <a:txBody>
+                    <a:bodyPr/>
+                    <a:lstStyle/>
+                    <a:p>
+                      <a:endParaRPr kumimoji="1" lang="ja-JP" altLang="en-US"/>
+                    </a:p>
+                  </a:txBody>
+                  <a:tcPr/>
+                </a:tc>
+                <a:tc>
+                  <a:txBody>
+                    <a:bodyPr/>
+                    <a:lstStyle/>
+                    <a:p>
+                      <a:endParaRPr kumimoji="1" lang="ja-JP" altLang="en-US"/>
+                    </a:p>
+                  </a:txBody>
+                  <a:tcPr/>
+                </a:tc>
+                <a:tc>
+                  <a:txBody>
+                    <a:bodyPr/>
+                    <a:lstStyle/>
+                    <a:p>
+                      <a:endParaRPr kumimoji="1" lang="ja-JP" altLang="en-US"/>
+                    </a:p>
+                  </a:txBody>
+                  <a:tcPr/>
+                </a:tc>
+              </a:tr>
+              <a:tr h="386248">
+                <a:tc>
+                  <a:txBody>
+                    <a:bodyPr/>
+                    <a:lstStyle/>
+                    <a:p>
+                      <a:endParaRPr kumimoji="1" lang="ja-JP" altLang="en-US"/>
+                    </a:p>
+                  </a:txBody>
+                  <a:tcPr/>
+                </a:tc>
+                <a:tc>
+                  <a:txBody>
+                    <a:bodyPr/>
+                    <a:lstStyle/>
+                    <a:p>
+                      <a:endParaRPr kumimoji="1" lang="ja-JP" altLang="en-US"/>
+                    </a:p>
+                  </a:txBody>
+                  <a:tcPr/>
+                </a:tc>
+                <a:tc>
+                  <a:txBody>
+                    <a:bodyPr/>
+                    <a:lstStyle/>
+                    <a:p>
+                      <a:endParaRPr kumimoji="1" lang="ja-JP" altLang="en-US"/>
+                    </a:p>
+                  </a:txBody>
+                  <a:tcPr/>
+                </a:tc>
+                <a:tc>
+                  <a:txBody>
+                    <a:bodyPr/>
+                    <a:lstStyle/>
+                    <a:p>
+                      <a:endParaRPr kumimoji="1" lang="ja-JP" altLang="en-US"/>
+                    </a:p>
+                  </a:txBody>
+                  <a:tcPr/>
+                </a:tc>
+              </a:tr>
+              <a:tr h="386248">
+                <a:tc>
+                  <a:txBody>
+                    <a:bodyPr/>
+                    <a:lstStyle/>
+                    <a:p>
+                      <a:endParaRPr kumimoji="1" lang="ja-JP" altLang="en-US"/>
+                    </a:p>
+                  </a:txBody>
+                  <a:tcPr/>
+                </a:tc>
+                <a:tc>
+                  <a:txBody>
+                    <a:bodyPr/>
+                    <a:lstStyle/>
+                    <a:p>
+                      <a:endParaRPr kumimoji="1" lang="ja-JP" altLang="en-US"/>
+                    </a:p>
+                  </a:txBody>
+                  <a:tcPr/>
+                </a:tc>
+                <a:tc>
+                  <a:txBody>
+                    <a:bodyPr/>
+                    <a:lstStyle/>
+                    <a:p>
+                      <a:endParaRPr kumimoji="1" lang="ja-JP" altLang="en-US"/>
+                    </a:p>
+                  </a:txBody>
+                  <a:tcPr/>
+                </a:tc>
+                <a:tc>
+                  <a:txBody>
+                    <a:bodyPr/>
+                    <a:lstStyle/>
+                    <a:p>
+                      <a:endParaRPr kumimoji="1" lang="ja-JP" altLang="en-US"/>
+                    </a:p>
+                  </a:txBody>
+                  <a:tcPr/>
+                </a:tc>
+              </a:tr>
+              <a:tr h="386248">
+                <a:tc>
+                  <a:txBody>
+                    <a:bodyPr/>
+                    <a:lstStyle/>
+                    <a:p>
+                      <a:endParaRPr kumimoji="1" lang="ja-JP" altLang="en-US"/>
+                    </a:p>
+                  </a:txBody>
+                  <a:tcPr/>
+                </a:tc>
+                <a:tc>
+                  <a:txBody>
+                    <a:bodyPr/>
+                    <a:lstStyle/>
+                    <a:p>
+                      <a:endParaRPr kumimoji="1" lang="ja-JP" altLang="en-US" dirty="0"/>
+                    </a:p>
+                  </a:txBody>
+                  <a:tcPr/>
+                </a:tc>
+                <a:tc>
+                  <a:txBody>
+                    <a:bodyPr/>
+                    <a:lstStyle/>
+                    <a:p>
+                      <a:endParaRPr kumimoji="1" lang="ja-JP" altLang="en-US" dirty="0"/>
+                    </a:p>
+                  </a:txBody>
+                  <a:tcPr/>
+                </a:tc>
+                <a:tc>
+                  <a:txBody>
+                    <a:bodyPr/>
+                    <a:lstStyle/>
+                    <a:p>
+                      <a:endParaRPr kumimoji="1" lang="ja-JP" altLang="en-US" dirty="0"/>
+                    </a:p>
+                  </a:txBody>
+                  <a:tcPr/>
+                </a:tc>
+              </a:tr>
+            </a:tbl>
+          </a:graphicData>
+        </a:graphic>
+      </p:graphicFrame>
+      <p:sp>
+        <p:nvSpPr>
+          <p:cNvPr id="41" name="円柱 40"/>
+          <p:cNvSpPr/>
+          <p:nvPr/>
+        </p:nvSpPr>
+        <p:spPr>
+          <a:xfrm>
+            <a:off x="8017036" y="2447634"/>
+            <a:ext cx="173182" cy="288636"/>
+          </a:xfrm>
+          <a:prstGeom prst="can">
+            <a:avLst/>
+          </a:prstGeom>
+          <a:noFill/>
+          <a:ln w="25400">
+            <a:solidFill>
+              <a:schemeClr val="tx1"/>
+            </a:solidFill>
+          </a:ln>
+          <a:effectLst/>
+        </p:spPr>
+        <p:style>
+          <a:lnRef idx="1">
+            <a:schemeClr val="accent1"/>
+          </a:lnRef>
+          <a:fillRef idx="3">
+            <a:schemeClr val="accent1"/>
+          </a:fillRef>
+          <a:effectRef idx="2">
+            <a:schemeClr val="accent1"/>
+          </a:effectRef>
+          <a:fontRef idx="minor">
+            <a:schemeClr val="lt1"/>
+          </a:fontRef>
+        </p:style>
+        <p:txBody>
+          <a:bodyPr rtlCol="0" anchor="ctr"/>
+          <a:lstStyle/>
+          <a:p>
+            <a:pPr algn="ctr"/>
+            <a:endParaRPr kumimoji="1" lang="ja-JP" altLang="en-US"/>
+          </a:p>
+        </p:txBody>
+      </p:sp>
+      <p:sp>
+        <p:nvSpPr>
+          <p:cNvPr id="42" name="円柱 41"/>
+          <p:cNvSpPr/>
+          <p:nvPr/>
+        </p:nvSpPr>
+        <p:spPr>
+          <a:xfrm>
+            <a:off x="8017036" y="2856340"/>
+            <a:ext cx="173182" cy="288636"/>
+          </a:xfrm>
+          <a:prstGeom prst="can">
+            <a:avLst/>
+          </a:prstGeom>
+          <a:noFill/>
+          <a:ln w="25400">
+            <a:solidFill>
+              <a:schemeClr val="tx1"/>
+            </a:solidFill>
+          </a:ln>
+          <a:effectLst/>
+        </p:spPr>
+        <p:style>
+          <a:lnRef idx="1">
+            <a:schemeClr val="accent1"/>
+          </a:lnRef>
+          <a:fillRef idx="3">
+            <a:schemeClr val="accent1"/>
+          </a:fillRef>
+          <a:effectRef idx="2">
+            <a:schemeClr val="accent1"/>
+          </a:effectRef>
+          <a:fontRef idx="minor">
+            <a:schemeClr val="lt1"/>
+          </a:fontRef>
+        </p:style>
+        <p:txBody>
+          <a:bodyPr rtlCol="0" anchor="ctr"/>
+          <a:lstStyle/>
+          <a:p>
+            <a:pPr algn="ctr"/>
+            <a:endParaRPr kumimoji="1" lang="ja-JP" altLang="en-US"/>
+          </a:p>
+        </p:txBody>
+      </p:sp>
+      <p:sp>
+        <p:nvSpPr>
+          <p:cNvPr id="45" name="円柱 44"/>
+          <p:cNvSpPr/>
+          <p:nvPr/>
+        </p:nvSpPr>
+        <p:spPr>
+          <a:xfrm>
+            <a:off x="8017036" y="3235027"/>
+            <a:ext cx="173182" cy="288636"/>
+          </a:xfrm>
+          <a:prstGeom prst="can">
+            <a:avLst/>
+          </a:prstGeom>
+          <a:noFill/>
+          <a:ln w="25400">
+            <a:solidFill>
+              <a:schemeClr val="tx1"/>
+            </a:solidFill>
+          </a:ln>
+          <a:effectLst/>
+        </p:spPr>
+        <p:style>
+          <a:lnRef idx="1">
+            <a:schemeClr val="accent1"/>
+          </a:lnRef>
+          <a:fillRef idx="3">
+            <a:schemeClr val="accent1"/>
+          </a:fillRef>
+          <a:effectRef idx="2">
+            <a:schemeClr val="accent1"/>
+          </a:effectRef>
+          <a:fontRef idx="minor">
+            <a:schemeClr val="lt1"/>
+          </a:fontRef>
+        </p:style>
+        <p:txBody>
+          <a:bodyPr rtlCol="0" anchor="ctr"/>
+          <a:lstStyle/>
+          <a:p>
+            <a:pPr algn="ctr"/>
+            <a:endParaRPr kumimoji="1" lang="ja-JP" altLang="en-US"/>
+          </a:p>
+        </p:txBody>
+      </p:sp>
+      <p:sp>
+        <p:nvSpPr>
+          <p:cNvPr id="46" name="円柱 45"/>
+          <p:cNvSpPr/>
+          <p:nvPr/>
+        </p:nvSpPr>
+        <p:spPr>
+          <a:xfrm>
+            <a:off x="8017036" y="3624105"/>
+            <a:ext cx="173182" cy="288636"/>
+          </a:xfrm>
+          <a:prstGeom prst="can">
+            <a:avLst/>
+          </a:prstGeom>
+          <a:noFill/>
+          <a:ln w="25400">
+            <a:solidFill>
+              <a:schemeClr val="tx1"/>
+            </a:solidFill>
+          </a:ln>
+          <a:effectLst/>
+        </p:spPr>
+        <p:style>
+          <a:lnRef idx="1">
+            <a:schemeClr val="accent1"/>
+          </a:lnRef>
+          <a:fillRef idx="3">
+            <a:schemeClr val="accent1"/>
+          </a:fillRef>
+          <a:effectRef idx="2">
+            <a:schemeClr val="accent1"/>
+          </a:effectRef>
+          <a:fontRef idx="minor">
+            <a:schemeClr val="lt1"/>
+          </a:fontRef>
+        </p:style>
+        <p:txBody>
+          <a:bodyPr rtlCol="0" anchor="ctr"/>
+          <a:lstStyle/>
+          <a:p>
+            <a:pPr algn="ctr"/>
+            <a:endParaRPr kumimoji="1" lang="ja-JP" altLang="en-US"/>
+          </a:p>
+        </p:txBody>
+      </p:sp>
+      <p:sp>
+        <p:nvSpPr>
+          <p:cNvPr id="47" name="円柱 46"/>
+          <p:cNvSpPr/>
+          <p:nvPr/>
+        </p:nvSpPr>
+        <p:spPr>
+          <a:xfrm>
+            <a:off x="8017036" y="4008555"/>
+            <a:ext cx="173182" cy="288636"/>
+          </a:xfrm>
+          <a:prstGeom prst="can">
+            <a:avLst/>
+          </a:prstGeom>
+          <a:noFill/>
+          <a:ln w="25400">
+            <a:solidFill>
+              <a:schemeClr val="tx1"/>
+            </a:solidFill>
+          </a:ln>
+          <a:effectLst/>
+        </p:spPr>
+        <p:style>
+          <a:lnRef idx="1">
+            <a:schemeClr val="accent1"/>
+          </a:lnRef>
+          <a:fillRef idx="3">
+            <a:schemeClr val="accent1"/>
+          </a:fillRef>
+          <a:effectRef idx="2">
+            <a:schemeClr val="accent1"/>
+          </a:effectRef>
+          <a:fontRef idx="minor">
+            <a:schemeClr val="lt1"/>
+          </a:fontRef>
+        </p:style>
+        <p:txBody>
+          <a:bodyPr rtlCol="0" anchor="ctr"/>
+          <a:lstStyle/>
+          <a:p>
+            <a:pPr algn="ctr"/>
+            <a:endParaRPr kumimoji="1" lang="ja-JP" altLang="en-US"/>
+          </a:p>
+        </p:txBody>
+      </p:sp>
+      <p:sp>
+        <p:nvSpPr>
+          <p:cNvPr id="48" name="円柱 47"/>
+          <p:cNvSpPr/>
+          <p:nvPr/>
+        </p:nvSpPr>
+        <p:spPr>
+          <a:xfrm>
+            <a:off x="8017036" y="4397633"/>
+            <a:ext cx="173182" cy="288636"/>
+          </a:xfrm>
+          <a:prstGeom prst="can">
+            <a:avLst/>
+          </a:prstGeom>
+          <a:noFill/>
+          <a:ln w="25400">
+            <a:solidFill>
+              <a:schemeClr val="tx1"/>
+            </a:solidFill>
+          </a:ln>
+          <a:effectLst/>
+        </p:spPr>
+        <p:style>
+          <a:lnRef idx="1">
+            <a:schemeClr val="accent1"/>
+          </a:lnRef>
+          <a:fillRef idx="3">
+            <a:schemeClr val="accent1"/>
+          </a:fillRef>
+          <a:effectRef idx="2">
+            <a:schemeClr val="accent1"/>
+          </a:effectRef>
+          <a:fontRef idx="minor">
+            <a:schemeClr val="lt1"/>
+          </a:fontRef>
+        </p:style>
+        <p:txBody>
+          <a:bodyPr rtlCol="0" anchor="ctr"/>
+          <a:lstStyle/>
+          <a:p>
+            <a:pPr algn="ctr"/>
+            <a:endParaRPr kumimoji="1" lang="ja-JP" altLang="en-US"/>
+          </a:p>
+        </p:txBody>
+      </p:sp>
+      <p:sp>
+        <p:nvSpPr>
+          <p:cNvPr id="49" name="円柱 48"/>
+          <p:cNvSpPr/>
+          <p:nvPr/>
+        </p:nvSpPr>
+        <p:spPr>
+          <a:xfrm>
+            <a:off x="8017036" y="4782067"/>
+            <a:ext cx="173182" cy="288636"/>
+          </a:xfrm>
+          <a:prstGeom prst="can">
+            <a:avLst/>
+          </a:prstGeom>
+          <a:noFill/>
+          <a:ln w="25400">
+            <a:solidFill>
+              <a:schemeClr val="tx1"/>
+            </a:solidFill>
+          </a:ln>
+          <a:effectLst/>
+        </p:spPr>
+        <p:style>
+          <a:lnRef idx="1">
+            <a:schemeClr val="accent1"/>
+          </a:lnRef>
+          <a:fillRef idx="3">
+            <a:schemeClr val="accent1"/>
+          </a:fillRef>
+          <a:effectRef idx="2">
+            <a:schemeClr val="accent1"/>
+          </a:effectRef>
+          <a:fontRef idx="minor">
+            <a:schemeClr val="lt1"/>
+          </a:fontRef>
+        </p:style>
+        <p:txBody>
+          <a:bodyPr rtlCol="0" anchor="ctr"/>
+          <a:lstStyle/>
+          <a:p>
+            <a:pPr algn="ctr"/>
+            <a:endParaRPr kumimoji="1" lang="ja-JP" altLang="en-US"/>
+          </a:p>
+        </p:txBody>
+      </p:sp>
+      <p:sp>
+        <p:nvSpPr>
+          <p:cNvPr id="50" name="円柱 49"/>
+          <p:cNvSpPr/>
+          <p:nvPr/>
+        </p:nvSpPr>
+        <p:spPr>
+          <a:xfrm>
+            <a:off x="8017036" y="5169935"/>
+            <a:ext cx="173182" cy="288636"/>
+          </a:xfrm>
+          <a:prstGeom prst="can">
+            <a:avLst/>
+          </a:prstGeom>
+          <a:noFill/>
+          <a:ln w="25400">
+            <a:solidFill>
+              <a:schemeClr val="tx1"/>
+            </a:solidFill>
+          </a:ln>
+          <a:effectLst/>
+        </p:spPr>
+        <p:style>
+          <a:lnRef idx="1">
+            <a:schemeClr val="accent1"/>
+          </a:lnRef>
+          <a:fillRef idx="3">
+            <a:schemeClr val="accent1"/>
+          </a:fillRef>
+          <a:effectRef idx="2">
+            <a:schemeClr val="accent1"/>
+          </a:effectRef>
+          <a:fontRef idx="minor">
+            <a:schemeClr val="lt1"/>
+          </a:fontRef>
+        </p:style>
+        <p:txBody>
+          <a:bodyPr rtlCol="0" anchor="ctr"/>
+          <a:lstStyle/>
+          <a:p>
+            <a:pPr algn="ctr"/>
+            <a:endParaRPr kumimoji="1" lang="ja-JP" altLang="en-US"/>
+          </a:p>
+        </p:txBody>
+      </p:sp>
+      <p:sp>
+        <p:nvSpPr>
+          <p:cNvPr id="51" name="円柱 50"/>
+          <p:cNvSpPr/>
+          <p:nvPr/>
+        </p:nvSpPr>
+        <p:spPr>
+          <a:xfrm>
+            <a:off x="8017036" y="5559013"/>
+            <a:ext cx="173182" cy="288636"/>
+          </a:xfrm>
+          <a:prstGeom prst="can">
+            <a:avLst/>
+          </a:prstGeom>
+          <a:noFill/>
+          <a:ln w="25400">
+            <a:solidFill>
+              <a:schemeClr val="tx1"/>
+            </a:solidFill>
+          </a:ln>
+          <a:effectLst/>
+        </p:spPr>
+        <p:style>
+          <a:lnRef idx="1">
+            <a:schemeClr val="accent1"/>
+          </a:lnRef>
+          <a:fillRef idx="3">
+            <a:schemeClr val="accent1"/>
+          </a:fillRef>
+          <a:effectRef idx="2">
+            <a:schemeClr val="accent1"/>
+          </a:effectRef>
+          <a:fontRef idx="minor">
+            <a:schemeClr val="lt1"/>
+          </a:fontRef>
+        </p:style>
+        <p:txBody>
+          <a:bodyPr rtlCol="0" anchor="ctr"/>
+          <a:lstStyle/>
+          <a:p>
+            <a:pPr algn="ctr"/>
+            <a:endParaRPr kumimoji="1" lang="ja-JP" altLang="en-US"/>
+          </a:p>
+        </p:txBody>
+      </p:sp>
+      <p:sp>
+        <p:nvSpPr>
+          <p:cNvPr id="54" name="円柱 53"/>
+          <p:cNvSpPr/>
+          <p:nvPr/>
+        </p:nvSpPr>
+        <p:spPr>
+          <a:xfrm>
+            <a:off x="8017036" y="5930778"/>
+            <a:ext cx="173182" cy="288636"/>
+          </a:xfrm>
+          <a:prstGeom prst="can">
+            <a:avLst/>
+          </a:prstGeom>
+          <a:noFill/>
+          <a:ln w="25400">
+            <a:solidFill>
+              <a:schemeClr val="tx1"/>
+            </a:solidFill>
+          </a:ln>
+          <a:effectLst/>
+        </p:spPr>
+        <p:style>
+          <a:lnRef idx="1">
+            <a:schemeClr val="accent1"/>
+          </a:lnRef>
+          <a:fillRef idx="3">
+            <a:schemeClr val="accent1"/>
+          </a:fillRef>
+          <a:effectRef idx="2">
+            <a:schemeClr val="accent1"/>
+          </a:effectRef>
+          <a:fontRef idx="minor">
+            <a:schemeClr val="lt1"/>
+          </a:fontRef>
+        </p:style>
+        <p:txBody>
+          <a:bodyPr rtlCol="0" anchor="ctr"/>
+          <a:lstStyle/>
+          <a:p>
+            <a:pPr algn="ctr"/>
+            <a:endParaRPr kumimoji="1" lang="ja-JP" altLang="en-US"/>
+          </a:p>
+        </p:txBody>
+      </p:sp>
+      <p:sp>
+        <p:nvSpPr>
+          <p:cNvPr id="55" name="正方形/長方形 54"/>
+          <p:cNvSpPr/>
+          <p:nvPr/>
+        </p:nvSpPr>
+        <p:spPr>
+          <a:xfrm>
+            <a:off x="783269" y="935182"/>
+            <a:ext cx="7575640" cy="5541817"/>
+          </a:xfrm>
+          <a:prstGeom prst="rect">
+            <a:avLst/>
+          </a:prstGeom>
+          <a:solidFill>
+            <a:schemeClr val="bg1">
+              <a:lumMod val="75000"/>
+              <a:alpha val="50000"/>
+            </a:schemeClr>
+          </a:solidFill>
+          <a:ln w="25400">
+            <a:solidFill>
+              <a:schemeClr val="tx1"/>
+            </a:solidFill>
+          </a:ln>
+          <a:effectLst/>
+        </p:spPr>
+        <p:style>
+          <a:lnRef idx="1">
+            <a:schemeClr val="accent1"/>
+          </a:lnRef>
+          <a:fillRef idx="3">
+            <a:schemeClr val="accent1"/>
+          </a:fillRef>
+          <a:effectRef idx="2">
+            <a:schemeClr val="accent1"/>
+          </a:effectRef>
+          <a:fontRef idx="minor">
+            <a:schemeClr val="lt1"/>
+          </a:fontRef>
+        </p:style>
+        <p:txBody>
+          <a:bodyPr rtlCol="0" anchor="ctr"/>
+          <a:lstStyle/>
+          <a:p>
+            <a:pPr algn="ctr"/>
+            <a:endParaRPr kumimoji="1" lang="ja-JP" altLang="en-US" sz="2800" dirty="0">
+              <a:solidFill>
+                <a:schemeClr val="tx1"/>
+              </a:solidFill>
+              <a:latin typeface="メイリオ"/>
+              <a:ea typeface="メイリオ"/>
+              <a:cs typeface="メイリオ"/>
+            </a:endParaRPr>
+          </a:p>
+        </p:txBody>
+      </p:sp>
+      <p:grpSp>
+        <p:nvGrpSpPr>
+          <p:cNvPr id="5" name="図形グループ 4"/>
+          <p:cNvGrpSpPr/>
+          <p:nvPr/>
+        </p:nvGrpSpPr>
+        <p:grpSpPr>
+          <a:xfrm>
+            <a:off x="3017146" y="2447634"/>
+            <a:ext cx="2989891" cy="875242"/>
+            <a:chOff x="3017146" y="2447634"/>
+            <a:chExt cx="2989891" cy="875242"/>
+          </a:xfrm>
+        </p:grpSpPr>
+        <p:grpSp>
+          <p:nvGrpSpPr>
+            <p:cNvPr id="6" name="図形グループ 5"/>
+            <p:cNvGrpSpPr/>
+            <p:nvPr/>
+          </p:nvGrpSpPr>
+          <p:grpSpPr>
+            <a:xfrm>
+              <a:off x="3017146" y="2447634"/>
+              <a:ext cx="2989891" cy="875242"/>
+              <a:chOff x="1834387" y="2031998"/>
+              <a:chExt cx="5525476" cy="1981328"/>
+            </a:xfrm>
+          </p:grpSpPr>
+          <p:sp>
+            <p:nvSpPr>
+              <p:cNvPr id="2" name="角丸四角形 1"/>
+              <p:cNvSpPr/>
+              <p:nvPr/>
+            </p:nvSpPr>
+            <p:spPr>
+              <a:xfrm>
+                <a:off x="1834387" y="2031998"/>
+                <a:ext cx="5525476" cy="1981328"/>
+              </a:xfrm>
+              <a:prstGeom prst="roundRect">
+                <a:avLst/>
+              </a:prstGeom>
+              <a:solidFill>
+                <a:schemeClr val="bg1"/>
+              </a:solidFill>
+              <a:ln>
+                <a:solidFill>
+                  <a:schemeClr val="tx1"/>
+                </a:solidFill>
+              </a:ln>
+            </p:spPr>
+            <p:style>
+              <a:lnRef idx="1">
+                <a:schemeClr val="accent1"/>
+              </a:lnRef>
+              <a:fillRef idx="3">
+                <a:schemeClr val="accent1"/>
+              </a:fillRef>
+              <a:effectRef idx="2">
+                <a:schemeClr val="accent1"/>
+              </a:effectRef>
+              <a:fontRef idx="minor">
+                <a:schemeClr val="lt1"/>
+              </a:fontRef>
+            </p:style>
+            <p:txBody>
+              <a:bodyPr rtlCol="0" anchor="ctr"/>
+              <a:lstStyle/>
+              <a:p>
+                <a:pPr algn="ctr"/>
+                <a:endParaRPr kumimoji="1" lang="ja-JP" altLang="en-US"/>
+              </a:p>
+            </p:txBody>
+          </p:sp>
+          <p:sp>
+            <p:nvSpPr>
+              <p:cNvPr id="27" name="角丸四角形 26"/>
+              <p:cNvSpPr/>
+              <p:nvPr/>
+            </p:nvSpPr>
+            <p:spPr>
+              <a:xfrm>
+                <a:off x="2935935" y="3094434"/>
+                <a:ext cx="1522149" cy="552982"/>
+              </a:xfrm>
+              <a:prstGeom prst="roundRect">
+                <a:avLst/>
+              </a:prstGeom>
+              <a:solidFill>
+                <a:schemeClr val="accent1">
+                  <a:lumMod val="40000"/>
+                  <a:lumOff val="60000"/>
+                </a:schemeClr>
+              </a:solidFill>
+              <a:ln w="25400">
+                <a:solidFill>
+                  <a:schemeClr val="accent1"/>
+                </a:solidFill>
+              </a:ln>
+              <a:effectLst/>
+            </p:spPr>
+            <p:style>
+              <a:lnRef idx="1">
+                <a:schemeClr val="accent1"/>
+              </a:lnRef>
+              <a:fillRef idx="3">
+                <a:schemeClr val="accent1"/>
+              </a:fillRef>
+              <a:effectRef idx="2">
+                <a:schemeClr val="accent1"/>
+              </a:effectRef>
+              <a:fontRef idx="minor">
+                <a:schemeClr val="lt1"/>
+              </a:fontRef>
+            </p:style>
+            <p:txBody>
+              <a:bodyPr rtlCol="0" anchor="ctr"/>
+              <a:lstStyle/>
+              <a:p>
+                <a:pPr algn="ctr"/>
+                <a:r>
+                  <a:rPr lang="ja-JP" altLang="en-US" sz="1200" dirty="0" smtClean="0">
+                    <a:solidFill>
+                      <a:schemeClr val="tx1"/>
+                    </a:solidFill>
+                    <a:latin typeface="メイリオ"/>
+                    <a:ea typeface="メイリオ"/>
+                    <a:cs typeface="メイリオ"/>
+                  </a:rPr>
+                  <a:t>はい</a:t>
+                </a:r>
+                <a:endParaRPr kumimoji="1" lang="ja-JP" altLang="en-US" sz="1200" dirty="0">
+                  <a:solidFill>
+                    <a:schemeClr val="tx1"/>
+                  </a:solidFill>
+                  <a:latin typeface="メイリオ"/>
+                  <a:ea typeface="メイリオ"/>
+                  <a:cs typeface="メイリオ"/>
+                </a:endParaRPr>
+              </a:p>
+            </p:txBody>
+          </p:sp>
+          <p:sp>
+            <p:nvSpPr>
+              <p:cNvPr id="44" name="テキスト ボックス 43"/>
+              <p:cNvSpPr txBox="1"/>
+              <p:nvPr/>
+            </p:nvSpPr>
+            <p:spPr>
+              <a:xfrm>
+                <a:off x="2058312" y="2119080"/>
+                <a:ext cx="1980029" cy="696730"/>
+              </a:xfrm>
+              <a:prstGeom prst="rect">
+                <a:avLst/>
+              </a:prstGeom>
+              <a:noFill/>
+            </p:spPr>
+            <p:txBody>
+              <a:bodyPr wrap="none" rtlCol="0">
+                <a:spAutoFit/>
+              </a:bodyPr>
+              <a:lstStyle/>
+              <a:p>
+                <a:r>
+                  <a:rPr lang="en-US" altLang="en-US" sz="1400" dirty="0" smtClean="0">
+                    <a:latin typeface="メイリオ"/>
+                    <a:ea typeface="メイリオ"/>
+                    <a:cs typeface="メイリオ"/>
+                  </a:rPr>
+                  <a:t>本当に削除しますか？</a:t>
+                </a:r>
+                <a:endParaRPr kumimoji="1" lang="ja-JP" altLang="en-US" sz="1400" dirty="0">
+                  <a:latin typeface="メイリオ"/>
+                  <a:ea typeface="メイリオ"/>
+                  <a:cs typeface="メイリオ"/>
+                </a:endParaRPr>
+              </a:p>
+            </p:txBody>
+          </p:sp>
+        </p:grpSp>
+        <p:sp>
+          <p:nvSpPr>
+            <p:cNvPr id="52" name="角丸四角形 51"/>
+            <p:cNvSpPr/>
+            <p:nvPr/>
+          </p:nvSpPr>
+          <p:spPr>
+            <a:xfrm>
+              <a:off x="4680034" y="2916960"/>
+              <a:ext cx="823650" cy="244277"/>
+            </a:xfrm>
+            <a:prstGeom prst="roundRect">
+              <a:avLst/>
+            </a:prstGeom>
+            <a:solidFill>
+              <a:schemeClr val="accent1">
+                <a:lumMod val="40000"/>
+                <a:lumOff val="60000"/>
+              </a:schemeClr>
+            </a:solidFill>
+            <a:ln w="25400">
+              <a:solidFill>
+                <a:schemeClr val="accent1"/>
+              </a:solidFill>
+            </a:ln>
+            <a:effectLst/>
+          </p:spPr>
+          <p:style>
+            <a:lnRef idx="1">
+              <a:schemeClr val="accent1"/>
+            </a:lnRef>
+            <a:fillRef idx="3">
+              <a:schemeClr val="accent1"/>
+            </a:fillRef>
+            <a:effectRef idx="2">
+              <a:schemeClr val="accent1"/>
+            </a:effectRef>
+            <a:fontRef idx="minor">
+              <a:schemeClr val="lt1"/>
+            </a:fontRef>
+          </p:style>
+          <p:txBody>
+            <a:bodyPr rtlCol="0" anchor="ctr"/>
+            <a:lstStyle/>
+            <a:p>
+              <a:pPr algn="ctr"/>
+              <a:r>
+                <a:rPr lang="ja-JP" altLang="en-US" sz="1200" dirty="0" smtClean="0">
+                  <a:solidFill>
+                    <a:schemeClr val="tx1"/>
+                  </a:solidFill>
+                  <a:latin typeface="メイリオ"/>
+                  <a:ea typeface="メイリオ"/>
+                  <a:cs typeface="メイリオ"/>
+                </a:rPr>
+                <a:t>いいえ</a:t>
+              </a:r>
+              <a:endParaRPr kumimoji="1" lang="ja-JP" altLang="en-US" sz="1200" dirty="0">
+                <a:solidFill>
+                  <a:schemeClr val="tx1"/>
+                </a:solidFill>
+                <a:latin typeface="メイリオ"/>
+                <a:ea typeface="メイリオ"/>
+                <a:cs typeface="メイリオ"/>
+              </a:endParaRPr>
+            </a:p>
+          </p:txBody>
+        </p:sp>
+      </p:grpSp>
+    </p:spTree>
+    <p:extLst>
+      <p:ext uri="{BB962C8B-B14F-4D97-AF65-F5344CB8AC3E}">
+        <p14:creationId xmlns:p14="http://schemas.microsoft.com/office/powerpoint/2010/main" val="2696243459"/>
       </p:ext>
     </p:extLst>
   </p:cSld>

</xml_diff>

<commit_message>
Algieba confirm delete (#112)
* add confirmation to ui spec

* update external spec

* add confirmation to ui spec

* update external spec

* update ui spec

* update version
</commit_message>
<xml_diff>
--- a/bin/algieba.pptx
+++ b/bin/algieba.pptx
@@ -5,7 +5,7 @@
     <p:sldMasterId id="2147483648" r:id="rId1"/>
   </p:sldMasterIdLst>
   <p:notesMasterIdLst>
-    <p:notesMasterId r:id="rId7"/>
+    <p:notesMasterId r:id="rId8"/>
   </p:notesMasterIdLst>
   <p:sldIdLst>
     <p:sldId id="256" r:id="rId2"/>
@@ -13,6 +13,7 @@
     <p:sldId id="266" r:id="rId4"/>
     <p:sldId id="265" r:id="rId5"/>
     <p:sldId id="267" r:id="rId6"/>
+    <p:sldId id="268" r:id="rId7"/>
   </p:sldIdLst>
   <p:sldSz cx="9144000" cy="6858000" type="screen4x3"/>
   <p:notesSz cx="6858000" cy="9144000"/>
@@ -196,7 +197,7 @@
           <a:p>
             <a:fld id="{EE82FEE5-269B-9B49-A8C4-823C45BE6055}" type="datetimeFigureOut">
               <a:rPr kumimoji="1" lang="ja-JP" altLang="en-US" smtClean="0"/>
-              <a:t>17/02/12</a:t>
+              <a:t>17/07/29</a:t>
             </a:fld>
             <a:endParaRPr kumimoji="1" lang="ja-JP" altLang="en-US"/>
           </a:p>
@@ -832,6 +833,90 @@
 </p:notes>
 </file>
 
+<file path=ppt/notesSlides/notesSlide5.xml><?xml version="1.0" encoding="utf-8"?>
+<p:notes xmlns:a="http://schemas.openxmlformats.org/drawingml/2006/main" xmlns:r="http://schemas.openxmlformats.org/officeDocument/2006/relationships" xmlns:p="http://schemas.openxmlformats.org/presentationml/2006/main">
+  <p:cSld>
+    <p:spTree>
+      <p:nvGrpSpPr>
+        <p:cNvPr id="1" name=""/>
+        <p:cNvGrpSpPr/>
+        <p:nvPr/>
+      </p:nvGrpSpPr>
+      <p:grpSpPr>
+        <a:xfrm>
+          <a:off x="0" y="0"/>
+          <a:ext cx="0" cy="0"/>
+          <a:chOff x="0" y="0"/>
+          <a:chExt cx="0" cy="0"/>
+        </a:xfrm>
+      </p:grpSpPr>
+      <p:sp>
+        <p:nvSpPr>
+          <p:cNvPr id="2" name="スライド イメージ プレースホルダー 1"/>
+          <p:cNvSpPr>
+            <a:spLocks noGrp="1" noRot="1" noChangeAspect="1"/>
+          </p:cNvSpPr>
+          <p:nvPr>
+            <p:ph type="sldImg"/>
+          </p:nvPr>
+        </p:nvSpPr>
+        <p:spPr/>
+      </p:sp>
+      <p:sp>
+        <p:nvSpPr>
+          <p:cNvPr id="3" name="ノート プレースホルダー 2"/>
+          <p:cNvSpPr>
+            <a:spLocks noGrp="1"/>
+          </p:cNvSpPr>
+          <p:nvPr>
+            <p:ph type="body" idx="1"/>
+          </p:nvPr>
+        </p:nvSpPr>
+        <p:spPr/>
+        <p:txBody>
+          <a:bodyPr/>
+          <a:lstStyle/>
+          <a:p>
+            <a:endParaRPr kumimoji="1" lang="ja-JP" altLang="en-US" dirty="0"/>
+          </a:p>
+        </p:txBody>
+      </p:sp>
+      <p:sp>
+        <p:nvSpPr>
+          <p:cNvPr id="4" name="スライド番号プレースホルダー 3"/>
+          <p:cNvSpPr>
+            <a:spLocks noGrp="1"/>
+          </p:cNvSpPr>
+          <p:nvPr>
+            <p:ph type="sldNum" sz="quarter" idx="10"/>
+          </p:nvPr>
+        </p:nvSpPr>
+        <p:spPr/>
+        <p:txBody>
+          <a:bodyPr/>
+          <a:lstStyle/>
+          <a:p>
+            <a:fld id="{A9E1B25B-30E5-7A42-A56A-DF1A6F86BC06}" type="slidenum">
+              <a:rPr kumimoji="1" lang="ja-JP" altLang="en-US" smtClean="0"/>
+              <a:t>6</a:t>
+            </a:fld>
+            <a:endParaRPr kumimoji="1" lang="ja-JP" altLang="en-US"/>
+          </a:p>
+        </p:txBody>
+      </p:sp>
+    </p:spTree>
+    <p:extLst>
+      <p:ext uri="{BB962C8B-B14F-4D97-AF65-F5344CB8AC3E}">
+        <p14:creationId xmlns:p14="http://schemas.microsoft.com/office/powerpoint/2010/main" val="3631066132"/>
+      </p:ext>
+    </p:extLst>
+  </p:cSld>
+  <p:clrMapOvr>
+    <a:masterClrMapping/>
+  </p:clrMapOvr>
+</p:notes>
+</file>
+
 <file path=ppt/slideLayouts/slideLayout1.xml><?xml version="1.0" encoding="utf-8"?>
 <p:sldLayout xmlns:a="http://schemas.openxmlformats.org/drawingml/2006/main" xmlns:r="http://schemas.openxmlformats.org/officeDocument/2006/relationships" xmlns:p="http://schemas.openxmlformats.org/presentationml/2006/main" type="title" preserve="1">
   <p:cSld name="タイトル スライド">
@@ -1013,7 +1098,7 @@
           <a:p>
             <a:fld id="{3ABA01A1-4899-9944-833D-6A66CDE659CB}" type="datetimeFigureOut">
               <a:rPr kumimoji="1" lang="ja-JP" altLang="en-US" smtClean="0"/>
-              <a:t>17/02/12</a:t>
+              <a:t>17/07/29</a:t>
             </a:fld>
             <a:endParaRPr kumimoji="1" lang="ja-JP" altLang="en-US"/>
           </a:p>
@@ -1215,7 +1300,7 @@
           <a:p>
             <a:fld id="{3ABA01A1-4899-9944-833D-6A66CDE659CB}" type="datetimeFigureOut">
               <a:rPr kumimoji="1" lang="ja-JP" altLang="en-US" smtClean="0"/>
-              <a:t>17/02/12</a:t>
+              <a:t>17/07/29</a:t>
             </a:fld>
             <a:endParaRPr kumimoji="1" lang="ja-JP" altLang="en-US"/>
           </a:p>
@@ -1427,7 +1512,7 @@
           <a:p>
             <a:fld id="{3ABA01A1-4899-9944-833D-6A66CDE659CB}" type="datetimeFigureOut">
               <a:rPr kumimoji="1" lang="ja-JP" altLang="en-US" smtClean="0"/>
-              <a:t>17/02/12</a:t>
+              <a:t>17/07/29</a:t>
             </a:fld>
             <a:endParaRPr kumimoji="1" lang="ja-JP" altLang="en-US"/>
           </a:p>
@@ -1629,7 +1714,7 @@
           <a:p>
             <a:fld id="{3ABA01A1-4899-9944-833D-6A66CDE659CB}" type="datetimeFigureOut">
               <a:rPr kumimoji="1" lang="ja-JP" altLang="en-US" smtClean="0"/>
-              <a:t>17/02/12</a:t>
+              <a:t>17/07/29</a:t>
             </a:fld>
             <a:endParaRPr kumimoji="1" lang="ja-JP" altLang="en-US"/>
           </a:p>
@@ -1875,7 +1960,7 @@
           <a:p>
             <a:fld id="{3ABA01A1-4899-9944-833D-6A66CDE659CB}" type="datetimeFigureOut">
               <a:rPr kumimoji="1" lang="ja-JP" altLang="en-US" smtClean="0"/>
-              <a:t>17/02/12</a:t>
+              <a:t>17/07/29</a:t>
             </a:fld>
             <a:endParaRPr kumimoji="1" lang="ja-JP" altLang="en-US"/>
           </a:p>
@@ -2227,7 +2312,7 @@
           <a:p>
             <a:fld id="{3ABA01A1-4899-9944-833D-6A66CDE659CB}" type="datetimeFigureOut">
               <a:rPr kumimoji="1" lang="ja-JP" altLang="en-US" smtClean="0"/>
-              <a:t>17/02/12</a:t>
+              <a:t>17/07/29</a:t>
             </a:fld>
             <a:endParaRPr kumimoji="1" lang="ja-JP" altLang="en-US"/>
           </a:p>
@@ -2713,7 +2798,7 @@
           <a:p>
             <a:fld id="{3ABA01A1-4899-9944-833D-6A66CDE659CB}" type="datetimeFigureOut">
               <a:rPr kumimoji="1" lang="ja-JP" altLang="en-US" smtClean="0"/>
-              <a:t>17/02/12</a:t>
+              <a:t>17/07/29</a:t>
             </a:fld>
             <a:endParaRPr kumimoji="1" lang="ja-JP" altLang="en-US"/>
           </a:p>
@@ -2831,7 +2916,7 @@
           <a:p>
             <a:fld id="{3ABA01A1-4899-9944-833D-6A66CDE659CB}" type="datetimeFigureOut">
               <a:rPr kumimoji="1" lang="ja-JP" altLang="en-US" smtClean="0"/>
-              <a:t>17/02/12</a:t>
+              <a:t>17/07/29</a:t>
             </a:fld>
             <a:endParaRPr kumimoji="1" lang="ja-JP" altLang="en-US"/>
           </a:p>
@@ -2926,7 +3011,7 @@
           <a:p>
             <a:fld id="{3ABA01A1-4899-9944-833D-6A66CDE659CB}" type="datetimeFigureOut">
               <a:rPr kumimoji="1" lang="ja-JP" altLang="en-US" smtClean="0"/>
-              <a:t>17/02/12</a:t>
+              <a:t>17/07/29</a:t>
             </a:fld>
             <a:endParaRPr kumimoji="1" lang="ja-JP" altLang="en-US"/>
           </a:p>
@@ -3235,7 +3320,7 @@
           <a:p>
             <a:fld id="{3ABA01A1-4899-9944-833D-6A66CDE659CB}" type="datetimeFigureOut">
               <a:rPr kumimoji="1" lang="ja-JP" altLang="en-US" smtClean="0"/>
-              <a:t>17/02/12</a:t>
+              <a:t>17/07/29</a:t>
             </a:fld>
             <a:endParaRPr kumimoji="1" lang="ja-JP" altLang="en-US"/>
           </a:p>
@@ -3488,7 +3573,7 @@
           <a:p>
             <a:fld id="{3ABA01A1-4899-9944-833D-6A66CDE659CB}" type="datetimeFigureOut">
               <a:rPr kumimoji="1" lang="ja-JP" altLang="en-US" smtClean="0"/>
-              <a:t>17/02/12</a:t>
+              <a:t>17/07/29</a:t>
             </a:fld>
             <a:endParaRPr kumimoji="1" lang="ja-JP" altLang="en-US"/>
           </a:p>
@@ -3733,7 +3818,7 @@
           <a:p>
             <a:fld id="{3ABA01A1-4899-9944-833D-6A66CDE659CB}" type="datetimeFigureOut">
               <a:rPr kumimoji="1" lang="ja-JP" altLang="en-US" smtClean="0"/>
-              <a:t>17/02/12</a:t>
+              <a:t>17/07/29</a:t>
             </a:fld>
             <a:endParaRPr kumimoji="1" lang="ja-JP" altLang="en-US"/>
           </a:p>
@@ -4177,7 +4262,15 @@
             </a:r>
             <a:r>
               <a:rPr lang="en-US" altLang="ja-JP" sz="2800" dirty="0" smtClean="0"/>
-              <a:t>2017/02/12</a:t>
+              <a:t>2017/07</a:t>
+            </a:r>
+            <a:r>
+              <a:rPr lang="en-US" altLang="ja-JP" sz="2800" dirty="0" smtClean="0"/>
+              <a:t>/</a:t>
+            </a:r>
+            <a:r>
+              <a:rPr lang="en-US" altLang="ja-JP" sz="2800" dirty="0" smtClean="0"/>
+              <a:t>29</a:t>
             </a:r>
             <a:r>
               <a:rPr lang="en-US" altLang="ja-JP" sz="2800" dirty="0" smtClean="0"/>
@@ -4196,7 +4289,7 @@
             </a:r>
             <a:r>
               <a:rPr lang="en-US" altLang="ja-JP" sz="2800" dirty="0" smtClean="0"/>
-              <a:t>2.4.0</a:t>
+              <a:t>2.6.0</a:t>
             </a:r>
             <a:endParaRPr kumimoji="1" lang="ja-JP" altLang="en-US" dirty="0"/>
           </a:p>
@@ -4279,7 +4372,7 @@
         <p:spPr>
           <a:xfrm>
             <a:off x="646545" y="969818"/>
-            <a:ext cx="7378943" cy="3970318"/>
+            <a:ext cx="8071440" cy="4524316"/>
           </a:xfrm>
           <a:prstGeom prst="rect">
             <a:avLst/>
@@ -4419,7 +4512,7 @@
                 <a:ea typeface="メイリオ"/>
                 <a:cs typeface="メイリオ"/>
               </a:rPr>
-              <a:t>画面上部の入力フォームから家計簿を入力する</a:t>
+              <a:t>画面上部の入力フォームから収支情報を入力する</a:t>
             </a:r>
             <a:endParaRPr lang="en-US" altLang="ja-JP" dirty="0">
               <a:latin typeface="メイリオ"/>
@@ -4438,7 +4531,46 @@
                 <a:ea typeface="メイリオ"/>
                 <a:cs typeface="メイリオ"/>
               </a:rPr>
-              <a:t>家計簿情報を入力後、登録ボタンを押すと家計簿が登録される</a:t>
+              <a:t>収支情報を入力後、登録ボタンを押す</a:t>
+            </a:r>
+            <a:r>
+              <a:rPr lang="ja-JP" altLang="en-US" dirty="0">
+                <a:latin typeface="メイリオ"/>
+                <a:ea typeface="メイリオ"/>
+                <a:cs typeface="メイリオ"/>
+              </a:rPr>
+              <a:t>と</a:t>
+            </a:r>
+            <a:r>
+              <a:rPr lang="ja-JP" altLang="en-US" dirty="0" smtClean="0">
+                <a:latin typeface="メイリオ"/>
+                <a:ea typeface="メイリオ"/>
+                <a:cs typeface="メイリオ"/>
+              </a:rPr>
+              <a:t>収支情報が登録され、表が</a:t>
+            </a:r>
+            <a:r>
+              <a:rPr lang="en-US" altLang="ja-JP" dirty="0">
+                <a:latin typeface="メイリオ"/>
+                <a:ea typeface="メイリオ"/>
+                <a:cs typeface="メイリオ"/>
+              </a:rPr>
+              <a:t/>
+            </a:r>
+            <a:br>
+              <a:rPr lang="en-US" altLang="ja-JP" dirty="0">
+                <a:latin typeface="メイリオ"/>
+                <a:ea typeface="メイリオ"/>
+                <a:cs typeface="メイリオ"/>
+              </a:rPr>
+            </a:br>
+            <a:r>
+              <a:rPr lang="ja-JP" altLang="en-US" dirty="0" smtClean="0">
+                <a:latin typeface="メイリオ"/>
+                <a:ea typeface="メイリオ"/>
+                <a:cs typeface="メイリオ"/>
+              </a:rPr>
+              <a:t>更新される</a:t>
             </a:r>
             <a:endParaRPr lang="en-US" altLang="ja-JP" dirty="0" smtClean="0">
               <a:latin typeface="メイリオ"/>
@@ -4452,12 +4584,20 @@
               <a:buChar char="•"/>
             </a:pPr>
             <a:r>
+              <a:rPr lang="ja-JP" altLang="en-US" dirty="0">
+                <a:latin typeface="メイリオ"/>
+                <a:ea typeface="メイリオ"/>
+                <a:cs typeface="メイリオ"/>
+              </a:rPr>
+              <a:t>収支情報</a:t>
+            </a:r>
+            <a:r>
               <a:rPr lang="ja-JP" altLang="en-US" dirty="0" smtClean="0">
                 <a:latin typeface="メイリオ"/>
                 <a:ea typeface="メイリオ"/>
                 <a:cs typeface="メイリオ"/>
               </a:rPr>
-              <a:t>家計簿情報が不正な場合、エラーを通知する</a:t>
+              <a:t>が不正な場合、エラーを通知する</a:t>
             </a:r>
             <a:endParaRPr lang="en-US" altLang="ja-JP" dirty="0" smtClean="0">
               <a:latin typeface="メイリオ"/>
@@ -4476,26 +4616,23 @@
                 <a:ea typeface="メイリオ"/>
                 <a:cs typeface="メイリオ"/>
               </a:rPr>
-              <a:t>登録成功時、画面遷移なしで家計簿表の上部に表示される</a:t>
-            </a:r>
-            <a:endParaRPr lang="en-US" altLang="ja-JP" dirty="0">
-              <a:latin typeface="メイリオ"/>
-              <a:ea typeface="メイリオ"/>
-              <a:cs typeface="メイリオ"/>
-            </a:endParaRPr>
-          </a:p>
-          <a:p>
-            <a:pPr marL="742950" lvl="1" indent="-285750">
-              <a:buFont typeface="Arial"/>
-              <a:buChar char="•"/>
-            </a:pPr>
+              <a:t>１ページあたり</a:t>
+            </a:r>
+            <a:r>
+              <a:rPr lang="en-US" altLang="ja-JP" dirty="0" smtClean="0">
+                <a:latin typeface="メイリオ"/>
+                <a:ea typeface="メイリオ"/>
+                <a:cs typeface="メイリオ"/>
+              </a:rPr>
+              <a:t>50</a:t>
+            </a:r>
             <a:r>
               <a:rPr lang="ja-JP" altLang="en-US" dirty="0" smtClean="0">
                 <a:latin typeface="メイリオ"/>
                 <a:ea typeface="メイリオ"/>
                 <a:cs typeface="メイリオ"/>
               </a:rPr>
-              <a:t>１ページ</a:t>
+              <a:t>件の収支情報が</a:t>
             </a:r>
             <a:r>
               <a:rPr lang="ja-JP" altLang="en-US" dirty="0">
@@ -4503,23 +4640,7 @@
                 <a:ea typeface="メイリオ"/>
                 <a:cs typeface="メイリオ"/>
               </a:rPr>
-              <a:t>に</a:t>
-            </a:r>
-            <a:r>
-              <a:rPr lang="en-US" altLang="ja-JP" dirty="0">
-                <a:latin typeface="メイリオ"/>
-                <a:ea typeface="メイリオ"/>
-                <a:cs typeface="メイリオ"/>
-              </a:rPr>
-              <a:t>50</a:t>
-            </a:r>
-            <a:r>
-              <a:rPr lang="ja-JP" altLang="en-US" dirty="0">
-                <a:latin typeface="メイリオ"/>
-                <a:ea typeface="メイリオ"/>
-                <a:cs typeface="メイリオ"/>
-              </a:rPr>
-              <a:t>件の家計簿が表示</a:t>
+              <a:t>表示</a:t>
             </a:r>
             <a:r>
               <a:rPr lang="ja-JP" altLang="en-US" dirty="0" smtClean="0">
@@ -4581,7 +4702,45 @@
                 <a:ea typeface="メイリオ"/>
                 <a:cs typeface="メイリオ"/>
               </a:rPr>
-              <a:t>削除ボタンを押すと、対応する家計簿が削除される</a:t>
+              <a:t>削除ボタンを押すと、削除確認画面が表示される</a:t>
+            </a:r>
+            <a:endParaRPr lang="en-US" altLang="ja-JP" dirty="0" smtClean="0">
+              <a:latin typeface="メイリオ"/>
+              <a:ea typeface="メイリオ"/>
+              <a:cs typeface="メイリオ"/>
+            </a:endParaRPr>
+          </a:p>
+          <a:p>
+            <a:pPr marL="1200150" lvl="2" indent="-285750">
+              <a:buFont typeface="Arial"/>
+              <a:buChar char="•"/>
+            </a:pPr>
+            <a:r>
+              <a:rPr lang="ja-JP" altLang="en-US" dirty="0" smtClean="0">
+                <a:latin typeface="メイリオ"/>
+                <a:ea typeface="メイリオ"/>
+                <a:cs typeface="メイリオ"/>
+              </a:rPr>
+              <a:t>「はい」を選択すると対応する収支情報が削除される</a:t>
+            </a:r>
+            <a:endParaRPr lang="en-US" altLang="ja-JP" dirty="0" smtClean="0">
+              <a:latin typeface="メイリオ"/>
+              <a:ea typeface="メイリオ"/>
+              <a:cs typeface="メイリオ"/>
+            </a:endParaRPr>
+          </a:p>
+          <a:p>
+            <a:pPr marL="1200150" lvl="2" indent="-285750">
+              <a:buFont typeface="Arial"/>
+              <a:buChar char="•"/>
+            </a:pPr>
+            <a:r>
+              <a:rPr lang="ja-JP" altLang="en-US" dirty="0" smtClean="0">
+                <a:latin typeface="メイリオ"/>
+                <a:ea typeface="メイリオ"/>
+                <a:cs typeface="メイリオ"/>
+              </a:rPr>
+              <a:t>「いいえ」を選択すると管理画面に戻る</a:t>
             </a:r>
             <a:endParaRPr lang="ja-JP" altLang="en-US" dirty="0">
               <a:latin typeface="メイリオ"/>
@@ -9775,6 +9934,2458 @@
     <p:extLst>
       <p:ext uri="{BB962C8B-B14F-4D97-AF65-F5344CB8AC3E}">
         <p14:creationId xmlns:p14="http://schemas.microsoft.com/office/powerpoint/2010/main" val="4276026136"/>
+      </p:ext>
+    </p:extLst>
+  </p:cSld>
+  <p:clrMapOvr>
+    <a:masterClrMapping/>
+  </p:clrMapOvr>
+</p:sld>
+</file>
+
+<file path=ppt/slides/slide6.xml><?xml version="1.0" encoding="utf-8"?>
+<p:sld xmlns:a="http://schemas.openxmlformats.org/drawingml/2006/main" xmlns:r="http://schemas.openxmlformats.org/officeDocument/2006/relationships" xmlns:p="http://schemas.openxmlformats.org/presentationml/2006/main">
+  <p:cSld>
+    <p:spTree>
+      <p:nvGrpSpPr>
+        <p:cNvPr id="1" name=""/>
+        <p:cNvGrpSpPr/>
+        <p:nvPr/>
+      </p:nvGrpSpPr>
+      <p:grpSpPr>
+        <a:xfrm>
+          <a:off x="0" y="0"/>
+          <a:ext cx="0" cy="0"/>
+          <a:chOff x="0" y="0"/>
+          <a:chExt cx="0" cy="0"/>
+        </a:xfrm>
+      </p:grpSpPr>
+      <p:sp>
+        <p:nvSpPr>
+          <p:cNvPr id="4" name="テキスト ボックス 3"/>
+          <p:cNvSpPr txBox="1"/>
+          <p:nvPr/>
+        </p:nvSpPr>
+        <p:spPr>
+          <a:xfrm>
+            <a:off x="200532" y="187161"/>
+            <a:ext cx="4134465" cy="523220"/>
+          </a:xfrm>
+          <a:prstGeom prst="rect">
+            <a:avLst/>
+          </a:prstGeom>
+          <a:noFill/>
+        </p:spPr>
+        <p:txBody>
+          <a:bodyPr wrap="none" rtlCol="0">
+            <a:spAutoFit/>
+          </a:bodyPr>
+          <a:lstStyle/>
+          <a:p>
+            <a:r>
+              <a:rPr lang="ja-JP" altLang="en-US" sz="2800" dirty="0" smtClean="0">
+                <a:latin typeface="メイリオ"/>
+                <a:ea typeface="メイリオ"/>
+                <a:cs typeface="メイリオ"/>
+              </a:rPr>
+              <a:t>管理画面（</a:t>
+            </a:r>
+            <a:r>
+              <a:rPr lang="en-US" altLang="en-US" sz="2800" dirty="0" smtClean="0">
+                <a:latin typeface="メイリオ"/>
+                <a:ea typeface="メイリオ"/>
+                <a:cs typeface="メイリオ"/>
+              </a:rPr>
+              <a:t>削除確認</a:t>
+            </a:r>
+            <a:r>
+              <a:rPr lang="ja-JP" altLang="en-US" sz="2800" dirty="0" smtClean="0">
+                <a:latin typeface="メイリオ"/>
+                <a:ea typeface="メイリオ"/>
+                <a:cs typeface="メイリオ"/>
+              </a:rPr>
+              <a:t>時）</a:t>
+            </a:r>
+            <a:endParaRPr kumimoji="1" lang="ja-JP" altLang="en-US" sz="2000" dirty="0">
+              <a:latin typeface="メイリオ"/>
+              <a:ea typeface="メイリオ"/>
+              <a:cs typeface="メイリオ"/>
+            </a:endParaRPr>
+          </a:p>
+        </p:txBody>
+      </p:sp>
+      <p:sp>
+        <p:nvSpPr>
+          <p:cNvPr id="64" name="テキスト ボックス 63"/>
+          <p:cNvSpPr txBox="1"/>
+          <p:nvPr/>
+        </p:nvSpPr>
+        <p:spPr>
+          <a:xfrm>
+            <a:off x="4124211" y="1630084"/>
+            <a:ext cx="296175" cy="307777"/>
+          </a:xfrm>
+          <a:prstGeom prst="rect">
+            <a:avLst/>
+          </a:prstGeom>
+          <a:noFill/>
+        </p:spPr>
+        <p:txBody>
+          <a:bodyPr wrap="none" rtlCol="0">
+            <a:spAutoFit/>
+          </a:bodyPr>
+          <a:lstStyle/>
+          <a:p>
+            <a:r>
+              <a:rPr lang="en-US" altLang="ja-JP" sz="1400" dirty="0">
+                <a:latin typeface="メイリオ"/>
+                <a:ea typeface="メイリオ"/>
+                <a:cs typeface="メイリオ"/>
+              </a:rPr>
+              <a:t>1</a:t>
+            </a:r>
+            <a:endParaRPr kumimoji="1" lang="ja-JP" altLang="en-US" sz="1400" dirty="0">
+              <a:latin typeface="メイリオ"/>
+              <a:ea typeface="メイリオ"/>
+              <a:cs typeface="メイリオ"/>
+            </a:endParaRPr>
+          </a:p>
+        </p:txBody>
+      </p:sp>
+      <p:sp>
+        <p:nvSpPr>
+          <p:cNvPr id="65" name="テキスト ボックス 64"/>
+          <p:cNvSpPr txBox="1"/>
+          <p:nvPr/>
+        </p:nvSpPr>
+        <p:spPr>
+          <a:xfrm>
+            <a:off x="4356158" y="1632399"/>
+            <a:ext cx="296175" cy="307777"/>
+          </a:xfrm>
+          <a:prstGeom prst="rect">
+            <a:avLst/>
+          </a:prstGeom>
+          <a:noFill/>
+        </p:spPr>
+        <p:txBody>
+          <a:bodyPr wrap="none" rtlCol="0">
+            <a:spAutoFit/>
+          </a:bodyPr>
+          <a:lstStyle/>
+          <a:p>
+            <a:r>
+              <a:rPr lang="en-US" altLang="ja-JP" sz="1400" dirty="0" smtClean="0">
+                <a:latin typeface="メイリオ"/>
+                <a:ea typeface="メイリオ"/>
+                <a:cs typeface="メイリオ"/>
+              </a:rPr>
+              <a:t>2</a:t>
+            </a:r>
+            <a:endParaRPr kumimoji="1" lang="ja-JP" altLang="en-US" sz="1400" dirty="0">
+              <a:latin typeface="メイリオ"/>
+              <a:ea typeface="メイリオ"/>
+              <a:cs typeface="メイリオ"/>
+            </a:endParaRPr>
+          </a:p>
+        </p:txBody>
+      </p:sp>
+      <p:sp>
+        <p:nvSpPr>
+          <p:cNvPr id="66" name="テキスト ボックス 65"/>
+          <p:cNvSpPr txBox="1"/>
+          <p:nvPr/>
+        </p:nvSpPr>
+        <p:spPr>
+          <a:xfrm>
+            <a:off x="4597125" y="1632399"/>
+            <a:ext cx="494734" cy="307777"/>
+          </a:xfrm>
+          <a:prstGeom prst="rect">
+            <a:avLst/>
+          </a:prstGeom>
+          <a:noFill/>
+        </p:spPr>
+        <p:txBody>
+          <a:bodyPr wrap="none" rtlCol="0">
+            <a:spAutoFit/>
+          </a:bodyPr>
+          <a:lstStyle/>
+          <a:p>
+            <a:r>
+              <a:rPr lang="en-US" altLang="ja-JP" sz="1400" dirty="0" smtClean="0">
+                <a:latin typeface="メイリオ"/>
+                <a:ea typeface="メイリオ"/>
+                <a:cs typeface="メイリオ"/>
+              </a:rPr>
+              <a:t>. . .</a:t>
+            </a:r>
+            <a:endParaRPr kumimoji="1" lang="ja-JP" altLang="en-US" sz="1400" dirty="0">
+              <a:latin typeface="メイリオ"/>
+              <a:ea typeface="メイリオ"/>
+              <a:cs typeface="メイリオ"/>
+            </a:endParaRPr>
+          </a:p>
+        </p:txBody>
+      </p:sp>
+      <p:sp>
+        <p:nvSpPr>
+          <p:cNvPr id="67" name="二等辺三角形 66"/>
+          <p:cNvSpPr/>
+          <p:nvPr/>
+        </p:nvSpPr>
+        <p:spPr>
+          <a:xfrm rot="5400000">
+            <a:off x="5439130" y="1683849"/>
+            <a:ext cx="179370" cy="181212"/>
+          </a:xfrm>
+          <a:prstGeom prst="triangle">
+            <a:avLst/>
+          </a:prstGeom>
+          <a:solidFill>
+            <a:srgbClr val="F75D31"/>
+          </a:solidFill>
+          <a:ln>
+            <a:noFill/>
+          </a:ln>
+          <a:effectLst/>
+        </p:spPr>
+        <p:style>
+          <a:lnRef idx="1">
+            <a:schemeClr val="accent1"/>
+          </a:lnRef>
+          <a:fillRef idx="3">
+            <a:schemeClr val="accent1"/>
+          </a:fillRef>
+          <a:effectRef idx="2">
+            <a:schemeClr val="accent1"/>
+          </a:effectRef>
+          <a:fontRef idx="minor">
+            <a:schemeClr val="lt1"/>
+          </a:fontRef>
+        </p:style>
+        <p:txBody>
+          <a:bodyPr rtlCol="0" anchor="ctr"/>
+          <a:lstStyle/>
+          <a:p>
+            <a:pPr algn="ctr"/>
+            <a:endParaRPr kumimoji="1" lang="ja-JP" altLang="en-US"/>
+          </a:p>
+        </p:txBody>
+      </p:sp>
+      <p:sp>
+        <p:nvSpPr>
+          <p:cNvPr id="68" name="二等辺三角形 67"/>
+          <p:cNvSpPr/>
+          <p:nvPr/>
+        </p:nvSpPr>
+        <p:spPr>
+          <a:xfrm rot="16200000">
+            <a:off x="3923520" y="1684770"/>
+            <a:ext cx="180000" cy="180000"/>
+          </a:xfrm>
+          <a:prstGeom prst="triangle">
+            <a:avLst/>
+          </a:prstGeom>
+          <a:solidFill>
+            <a:srgbClr val="F75D31"/>
+          </a:solidFill>
+          <a:ln>
+            <a:noFill/>
+          </a:ln>
+          <a:effectLst/>
+        </p:spPr>
+        <p:style>
+          <a:lnRef idx="1">
+            <a:schemeClr val="accent1"/>
+          </a:lnRef>
+          <a:fillRef idx="3">
+            <a:schemeClr val="accent1"/>
+          </a:fillRef>
+          <a:effectRef idx="2">
+            <a:schemeClr val="accent1"/>
+          </a:effectRef>
+          <a:fontRef idx="minor">
+            <a:schemeClr val="lt1"/>
+          </a:fontRef>
+        </p:style>
+        <p:txBody>
+          <a:bodyPr rtlCol="0" anchor="ctr"/>
+          <a:lstStyle/>
+          <a:p>
+            <a:pPr algn="ctr"/>
+            <a:endParaRPr kumimoji="1" lang="ja-JP" altLang="en-US"/>
+          </a:p>
+        </p:txBody>
+      </p:sp>
+      <p:sp>
+        <p:nvSpPr>
+          <p:cNvPr id="69" name="テキスト ボックス 68"/>
+          <p:cNvSpPr txBox="1"/>
+          <p:nvPr/>
+        </p:nvSpPr>
+        <p:spPr>
+          <a:xfrm>
+            <a:off x="5013885" y="1632399"/>
+            <a:ext cx="407684" cy="307777"/>
+          </a:xfrm>
+          <a:prstGeom prst="rect">
+            <a:avLst/>
+          </a:prstGeom>
+          <a:noFill/>
+        </p:spPr>
+        <p:txBody>
+          <a:bodyPr wrap="none" rtlCol="0">
+            <a:spAutoFit/>
+          </a:bodyPr>
+          <a:lstStyle/>
+          <a:p>
+            <a:r>
+              <a:rPr lang="en-US" altLang="ja-JP" sz="1400" dirty="0" smtClean="0">
+                <a:latin typeface="メイリオ"/>
+                <a:ea typeface="メイリオ"/>
+                <a:cs typeface="メイリオ"/>
+              </a:rPr>
+              <a:t>20</a:t>
+            </a:r>
+            <a:endParaRPr kumimoji="1" lang="ja-JP" altLang="en-US" sz="1400" dirty="0">
+              <a:latin typeface="メイリオ"/>
+              <a:ea typeface="メイリオ"/>
+              <a:cs typeface="メイリオ"/>
+            </a:endParaRPr>
+          </a:p>
+        </p:txBody>
+      </p:sp>
+      <p:sp>
+        <p:nvSpPr>
+          <p:cNvPr id="21" name="テキスト ボックス 20"/>
+          <p:cNvSpPr txBox="1"/>
+          <p:nvPr/>
+        </p:nvSpPr>
+        <p:spPr>
+          <a:xfrm>
+            <a:off x="993905" y="1630084"/>
+            <a:ext cx="2623046" cy="307777"/>
+          </a:xfrm>
+          <a:prstGeom prst="rect">
+            <a:avLst/>
+          </a:prstGeom>
+          <a:noFill/>
+        </p:spPr>
+        <p:txBody>
+          <a:bodyPr wrap="none" rtlCol="0">
+            <a:spAutoFit/>
+          </a:bodyPr>
+          <a:lstStyle/>
+          <a:p>
+            <a:r>
+              <a:rPr lang="en-US" altLang="ja-JP" sz="1400" dirty="0" smtClean="0">
+                <a:latin typeface="メイリオ"/>
+                <a:ea typeface="メイリオ"/>
+                <a:cs typeface="メイリオ"/>
+              </a:rPr>
+              <a:t>xxx </a:t>
+            </a:r>
+            <a:r>
+              <a:rPr lang="ja-JP" altLang="en-US" sz="1400" dirty="0" smtClean="0">
+                <a:latin typeface="メイリオ"/>
+                <a:ea typeface="メイリオ"/>
+                <a:cs typeface="メイリオ"/>
+              </a:rPr>
+              <a:t>件中</a:t>
+            </a:r>
+            <a:r>
+              <a:rPr lang="en-US" altLang="ja-JP" sz="1400" dirty="0" smtClean="0">
+                <a:latin typeface="メイリオ"/>
+                <a:ea typeface="メイリオ"/>
+                <a:cs typeface="メイリオ"/>
+              </a:rPr>
+              <a:t> </a:t>
+            </a:r>
+            <a:r>
+              <a:rPr lang="en-US" altLang="ja-JP" sz="1400" dirty="0" err="1" smtClean="0">
+                <a:latin typeface="メイリオ"/>
+                <a:ea typeface="メイリオ"/>
+                <a:cs typeface="メイリオ"/>
+              </a:rPr>
+              <a:t>yyy</a:t>
+            </a:r>
+            <a:r>
+              <a:rPr lang="en-US" altLang="ja-JP" sz="1400" dirty="0" smtClean="0">
+                <a:latin typeface="メイリオ"/>
+                <a:ea typeface="メイリオ"/>
+                <a:cs typeface="メイリオ"/>
+              </a:rPr>
+              <a:t> 〜 </a:t>
+            </a:r>
+            <a:r>
+              <a:rPr lang="en-US" altLang="ja-JP" sz="1400" dirty="0" err="1" smtClean="0">
+                <a:latin typeface="メイリオ"/>
+                <a:ea typeface="メイリオ"/>
+                <a:cs typeface="メイリオ"/>
+              </a:rPr>
+              <a:t>zzz</a:t>
+            </a:r>
+            <a:r>
+              <a:rPr lang="en-US" altLang="ja-JP" sz="1400" dirty="0" smtClean="0">
+                <a:latin typeface="メイリオ"/>
+                <a:ea typeface="メイリオ"/>
+                <a:cs typeface="メイリオ"/>
+              </a:rPr>
+              <a:t> </a:t>
+            </a:r>
+            <a:r>
+              <a:rPr lang="ja-JP" altLang="en-US" sz="1400" dirty="0" smtClean="0">
+                <a:latin typeface="メイリオ"/>
+                <a:ea typeface="メイリオ"/>
+                <a:cs typeface="メイリオ"/>
+              </a:rPr>
+              <a:t>件を表示</a:t>
+            </a:r>
+            <a:endParaRPr kumimoji="1" lang="ja-JP" altLang="en-US" sz="1400" dirty="0">
+              <a:latin typeface="メイリオ"/>
+              <a:ea typeface="メイリオ"/>
+              <a:cs typeface="メイリオ"/>
+            </a:endParaRPr>
+          </a:p>
+        </p:txBody>
+      </p:sp>
+      <p:sp>
+        <p:nvSpPr>
+          <p:cNvPr id="22" name="二等辺三角形 21"/>
+          <p:cNvSpPr/>
+          <p:nvPr/>
+        </p:nvSpPr>
+        <p:spPr>
+          <a:xfrm rot="16200000">
+            <a:off x="3596344" y="1684770"/>
+            <a:ext cx="180000" cy="180000"/>
+          </a:xfrm>
+          <a:prstGeom prst="triangle">
+            <a:avLst/>
+          </a:prstGeom>
+          <a:solidFill>
+            <a:srgbClr val="F75D31"/>
+          </a:solidFill>
+          <a:ln>
+            <a:noFill/>
+          </a:ln>
+          <a:effectLst/>
+        </p:spPr>
+        <p:style>
+          <a:lnRef idx="1">
+            <a:schemeClr val="accent1"/>
+          </a:lnRef>
+          <a:fillRef idx="3">
+            <a:schemeClr val="accent1"/>
+          </a:fillRef>
+          <a:effectRef idx="2">
+            <a:schemeClr val="accent1"/>
+          </a:effectRef>
+          <a:fontRef idx="minor">
+            <a:schemeClr val="lt1"/>
+          </a:fontRef>
+        </p:style>
+        <p:txBody>
+          <a:bodyPr rtlCol="0" anchor="ctr"/>
+          <a:lstStyle/>
+          <a:p>
+            <a:pPr algn="ctr"/>
+            <a:endParaRPr kumimoji="1" lang="ja-JP" altLang="en-US"/>
+          </a:p>
+        </p:txBody>
+      </p:sp>
+      <p:sp>
+        <p:nvSpPr>
+          <p:cNvPr id="23" name="二等辺三角形 22"/>
+          <p:cNvSpPr/>
+          <p:nvPr/>
+        </p:nvSpPr>
+        <p:spPr>
+          <a:xfrm rot="16200000">
+            <a:off x="3693379" y="1684140"/>
+            <a:ext cx="180000" cy="180000"/>
+          </a:xfrm>
+          <a:prstGeom prst="triangle">
+            <a:avLst/>
+          </a:prstGeom>
+          <a:solidFill>
+            <a:srgbClr val="F75D31"/>
+          </a:solidFill>
+          <a:ln>
+            <a:noFill/>
+          </a:ln>
+          <a:effectLst/>
+        </p:spPr>
+        <p:style>
+          <a:lnRef idx="1">
+            <a:schemeClr val="accent1"/>
+          </a:lnRef>
+          <a:fillRef idx="3">
+            <a:schemeClr val="accent1"/>
+          </a:fillRef>
+          <a:effectRef idx="2">
+            <a:schemeClr val="accent1"/>
+          </a:effectRef>
+          <a:fontRef idx="minor">
+            <a:schemeClr val="lt1"/>
+          </a:fontRef>
+        </p:style>
+        <p:txBody>
+          <a:bodyPr rtlCol="0" anchor="ctr"/>
+          <a:lstStyle/>
+          <a:p>
+            <a:pPr algn="ctr"/>
+            <a:endParaRPr kumimoji="1" lang="ja-JP" altLang="en-US"/>
+          </a:p>
+        </p:txBody>
+      </p:sp>
+      <p:sp>
+        <p:nvSpPr>
+          <p:cNvPr id="24" name="二等辺三角形 23"/>
+          <p:cNvSpPr/>
+          <p:nvPr/>
+        </p:nvSpPr>
+        <p:spPr>
+          <a:xfrm rot="5400000">
+            <a:off x="5764549" y="1684479"/>
+            <a:ext cx="179370" cy="181212"/>
+          </a:xfrm>
+          <a:prstGeom prst="triangle">
+            <a:avLst/>
+          </a:prstGeom>
+          <a:solidFill>
+            <a:srgbClr val="F75D31"/>
+          </a:solidFill>
+          <a:ln>
+            <a:noFill/>
+          </a:ln>
+          <a:effectLst/>
+        </p:spPr>
+        <p:style>
+          <a:lnRef idx="1">
+            <a:schemeClr val="accent1"/>
+          </a:lnRef>
+          <a:fillRef idx="3">
+            <a:schemeClr val="accent1"/>
+          </a:fillRef>
+          <a:effectRef idx="2">
+            <a:schemeClr val="accent1"/>
+          </a:effectRef>
+          <a:fontRef idx="minor">
+            <a:schemeClr val="lt1"/>
+          </a:fontRef>
+        </p:style>
+        <p:txBody>
+          <a:bodyPr rtlCol="0" anchor="ctr"/>
+          <a:lstStyle/>
+          <a:p>
+            <a:pPr algn="ctr"/>
+            <a:endParaRPr kumimoji="1" lang="ja-JP" altLang="en-US"/>
+          </a:p>
+        </p:txBody>
+      </p:sp>
+      <p:sp>
+        <p:nvSpPr>
+          <p:cNvPr id="25" name="二等辺三角形 24"/>
+          <p:cNvSpPr/>
+          <p:nvPr/>
+        </p:nvSpPr>
+        <p:spPr>
+          <a:xfrm rot="5400000">
+            <a:off x="5673943" y="1684479"/>
+            <a:ext cx="179370" cy="181212"/>
+          </a:xfrm>
+          <a:prstGeom prst="triangle">
+            <a:avLst/>
+          </a:prstGeom>
+          <a:solidFill>
+            <a:srgbClr val="F75D31"/>
+          </a:solidFill>
+          <a:ln>
+            <a:noFill/>
+          </a:ln>
+          <a:effectLst/>
+        </p:spPr>
+        <p:style>
+          <a:lnRef idx="1">
+            <a:schemeClr val="accent1"/>
+          </a:lnRef>
+          <a:fillRef idx="3">
+            <a:schemeClr val="accent1"/>
+          </a:fillRef>
+          <a:effectRef idx="2">
+            <a:schemeClr val="accent1"/>
+          </a:effectRef>
+          <a:fontRef idx="minor">
+            <a:schemeClr val="lt1"/>
+          </a:fontRef>
+        </p:style>
+        <p:txBody>
+          <a:bodyPr rtlCol="0" anchor="ctr"/>
+          <a:lstStyle/>
+          <a:p>
+            <a:pPr algn="ctr"/>
+            <a:endParaRPr kumimoji="1" lang="ja-JP" altLang="en-US"/>
+          </a:p>
+        </p:txBody>
+      </p:sp>
+      <p:sp>
+        <p:nvSpPr>
+          <p:cNvPr id="28" name="角丸四角形 27"/>
+          <p:cNvSpPr/>
+          <p:nvPr/>
+        </p:nvSpPr>
+        <p:spPr>
+          <a:xfrm>
+            <a:off x="1469168" y="1187601"/>
+            <a:ext cx="562830" cy="165946"/>
+          </a:xfrm>
+          <a:prstGeom prst="roundRect">
+            <a:avLst/>
+          </a:prstGeom>
+          <a:noFill/>
+          <a:ln w="25400">
+            <a:solidFill>
+              <a:schemeClr val="tx1"/>
+            </a:solidFill>
+          </a:ln>
+          <a:effectLst/>
+        </p:spPr>
+        <p:style>
+          <a:lnRef idx="1">
+            <a:schemeClr val="accent1"/>
+          </a:lnRef>
+          <a:fillRef idx="3">
+            <a:schemeClr val="accent1"/>
+          </a:fillRef>
+          <a:effectRef idx="2">
+            <a:schemeClr val="accent1"/>
+          </a:effectRef>
+          <a:fontRef idx="minor">
+            <a:schemeClr val="lt1"/>
+          </a:fontRef>
+        </p:style>
+        <p:txBody>
+          <a:bodyPr rtlCol="0" anchor="ctr"/>
+          <a:lstStyle/>
+          <a:p>
+            <a:pPr algn="ctr"/>
+            <a:endParaRPr kumimoji="1" lang="ja-JP" altLang="en-US"/>
+          </a:p>
+        </p:txBody>
+      </p:sp>
+      <p:sp>
+        <p:nvSpPr>
+          <p:cNvPr id="29" name="テキスト ボックス 28"/>
+          <p:cNvSpPr txBox="1"/>
+          <p:nvPr/>
+        </p:nvSpPr>
+        <p:spPr>
+          <a:xfrm>
+            <a:off x="890993" y="1114621"/>
+            <a:ext cx="646331" cy="276999"/>
+          </a:xfrm>
+          <a:prstGeom prst="rect">
+            <a:avLst/>
+          </a:prstGeom>
+          <a:noFill/>
+        </p:spPr>
+        <p:txBody>
+          <a:bodyPr wrap="none" rtlCol="0">
+            <a:spAutoFit/>
+          </a:bodyPr>
+          <a:lstStyle/>
+          <a:p>
+            <a:r>
+              <a:rPr kumimoji="1" lang="ja-JP" altLang="en-US" sz="1200" dirty="0" smtClean="0">
+                <a:latin typeface="メイリオ"/>
+                <a:ea typeface="メイリオ"/>
+                <a:cs typeface="メイリオ"/>
+              </a:rPr>
+              <a:t>日付：</a:t>
+            </a:r>
+            <a:endParaRPr kumimoji="1" lang="ja-JP" altLang="en-US" sz="1200" dirty="0">
+              <a:latin typeface="メイリオ"/>
+              <a:ea typeface="メイリオ"/>
+              <a:cs typeface="メイリオ"/>
+            </a:endParaRPr>
+          </a:p>
+        </p:txBody>
+      </p:sp>
+      <p:sp>
+        <p:nvSpPr>
+          <p:cNvPr id="30" name="角丸四角形 29"/>
+          <p:cNvSpPr/>
+          <p:nvPr/>
+        </p:nvSpPr>
+        <p:spPr>
+          <a:xfrm>
+            <a:off x="2646774" y="1187601"/>
+            <a:ext cx="797002" cy="165946"/>
+          </a:xfrm>
+          <a:prstGeom prst="roundRect">
+            <a:avLst/>
+          </a:prstGeom>
+          <a:noFill/>
+          <a:ln w="25400">
+            <a:solidFill>
+              <a:schemeClr val="tx1"/>
+            </a:solidFill>
+          </a:ln>
+          <a:effectLst/>
+        </p:spPr>
+        <p:style>
+          <a:lnRef idx="1">
+            <a:schemeClr val="accent1"/>
+          </a:lnRef>
+          <a:fillRef idx="3">
+            <a:schemeClr val="accent1"/>
+          </a:fillRef>
+          <a:effectRef idx="2">
+            <a:schemeClr val="accent1"/>
+          </a:effectRef>
+          <a:fontRef idx="minor">
+            <a:schemeClr val="lt1"/>
+          </a:fontRef>
+        </p:style>
+        <p:txBody>
+          <a:bodyPr rtlCol="0" anchor="ctr"/>
+          <a:lstStyle/>
+          <a:p>
+            <a:pPr algn="ctr"/>
+            <a:endParaRPr kumimoji="1" lang="ja-JP" altLang="en-US"/>
+          </a:p>
+        </p:txBody>
+      </p:sp>
+      <p:sp>
+        <p:nvSpPr>
+          <p:cNvPr id="31" name="テキスト ボックス 30"/>
+          <p:cNvSpPr txBox="1"/>
+          <p:nvPr/>
+        </p:nvSpPr>
+        <p:spPr>
+          <a:xfrm>
+            <a:off x="2046815" y="1111063"/>
+            <a:ext cx="646331" cy="276999"/>
+          </a:xfrm>
+          <a:prstGeom prst="rect">
+            <a:avLst/>
+          </a:prstGeom>
+          <a:noFill/>
+        </p:spPr>
+        <p:txBody>
+          <a:bodyPr wrap="none" rtlCol="0">
+            <a:spAutoFit/>
+          </a:bodyPr>
+          <a:lstStyle/>
+          <a:p>
+            <a:r>
+              <a:rPr lang="ja-JP" altLang="en-US" sz="1200" dirty="0" smtClean="0">
+                <a:latin typeface="メイリオ"/>
+                <a:ea typeface="メイリオ"/>
+                <a:cs typeface="メイリオ"/>
+              </a:rPr>
+              <a:t>内容</a:t>
+            </a:r>
+            <a:r>
+              <a:rPr kumimoji="1" lang="ja-JP" altLang="en-US" sz="1200" dirty="0" smtClean="0">
+                <a:latin typeface="メイリオ"/>
+                <a:ea typeface="メイリオ"/>
+                <a:cs typeface="メイリオ"/>
+              </a:rPr>
+              <a:t>：</a:t>
+            </a:r>
+            <a:endParaRPr kumimoji="1" lang="ja-JP" altLang="en-US" sz="1200" dirty="0">
+              <a:latin typeface="メイリオ"/>
+              <a:ea typeface="メイリオ"/>
+              <a:cs typeface="メイリオ"/>
+            </a:endParaRPr>
+          </a:p>
+        </p:txBody>
+      </p:sp>
+      <p:sp>
+        <p:nvSpPr>
+          <p:cNvPr id="32" name="角丸四角形 31"/>
+          <p:cNvSpPr/>
+          <p:nvPr/>
+        </p:nvSpPr>
+        <p:spPr>
+          <a:xfrm>
+            <a:off x="4369749" y="1187601"/>
+            <a:ext cx="560480" cy="165946"/>
+          </a:xfrm>
+          <a:prstGeom prst="roundRect">
+            <a:avLst/>
+          </a:prstGeom>
+          <a:noFill/>
+          <a:ln w="25400">
+            <a:solidFill>
+              <a:schemeClr val="tx1"/>
+            </a:solidFill>
+          </a:ln>
+          <a:effectLst/>
+        </p:spPr>
+        <p:style>
+          <a:lnRef idx="1">
+            <a:schemeClr val="accent1"/>
+          </a:lnRef>
+          <a:fillRef idx="3">
+            <a:schemeClr val="accent1"/>
+          </a:fillRef>
+          <a:effectRef idx="2">
+            <a:schemeClr val="accent1"/>
+          </a:effectRef>
+          <a:fontRef idx="minor">
+            <a:schemeClr val="lt1"/>
+          </a:fontRef>
+        </p:style>
+        <p:txBody>
+          <a:bodyPr rtlCol="0" anchor="ctr"/>
+          <a:lstStyle/>
+          <a:p>
+            <a:pPr algn="ctr"/>
+            <a:endParaRPr kumimoji="1" lang="ja-JP" altLang="en-US"/>
+          </a:p>
+        </p:txBody>
+      </p:sp>
+      <p:sp>
+        <p:nvSpPr>
+          <p:cNvPr id="33" name="テキスト ボックス 32"/>
+          <p:cNvSpPr txBox="1"/>
+          <p:nvPr/>
+        </p:nvSpPr>
+        <p:spPr>
+          <a:xfrm>
+            <a:off x="3461822" y="1118689"/>
+            <a:ext cx="954107" cy="276999"/>
+          </a:xfrm>
+          <a:prstGeom prst="rect">
+            <a:avLst/>
+          </a:prstGeom>
+          <a:noFill/>
+        </p:spPr>
+        <p:txBody>
+          <a:bodyPr wrap="none" rtlCol="0">
+            <a:spAutoFit/>
+          </a:bodyPr>
+          <a:lstStyle/>
+          <a:p>
+            <a:r>
+              <a:rPr lang="ja-JP" altLang="en-US" sz="1200" dirty="0" smtClean="0">
+                <a:latin typeface="メイリオ"/>
+                <a:ea typeface="メイリオ"/>
+                <a:cs typeface="メイリオ"/>
+              </a:rPr>
+              <a:t>カテゴリ</a:t>
+            </a:r>
+            <a:r>
+              <a:rPr kumimoji="1" lang="ja-JP" altLang="en-US" sz="1200" dirty="0" smtClean="0">
+                <a:latin typeface="メイリオ"/>
+                <a:ea typeface="メイリオ"/>
+                <a:cs typeface="メイリオ"/>
+              </a:rPr>
+              <a:t>：</a:t>
+            </a:r>
+            <a:endParaRPr kumimoji="1" lang="ja-JP" altLang="en-US" sz="1200" dirty="0">
+              <a:latin typeface="メイリオ"/>
+              <a:ea typeface="メイリオ"/>
+              <a:cs typeface="メイリオ"/>
+            </a:endParaRPr>
+          </a:p>
+        </p:txBody>
+      </p:sp>
+      <p:sp>
+        <p:nvSpPr>
+          <p:cNvPr id="34" name="角丸四角形 33"/>
+          <p:cNvSpPr/>
+          <p:nvPr/>
+        </p:nvSpPr>
+        <p:spPr>
+          <a:xfrm>
+            <a:off x="5569022" y="1187601"/>
+            <a:ext cx="561630" cy="165946"/>
+          </a:xfrm>
+          <a:prstGeom prst="roundRect">
+            <a:avLst/>
+          </a:prstGeom>
+          <a:noFill/>
+          <a:ln w="25400">
+            <a:solidFill>
+              <a:schemeClr val="tx1"/>
+            </a:solidFill>
+          </a:ln>
+          <a:effectLst/>
+        </p:spPr>
+        <p:style>
+          <a:lnRef idx="1">
+            <a:schemeClr val="accent1"/>
+          </a:lnRef>
+          <a:fillRef idx="3">
+            <a:schemeClr val="accent1"/>
+          </a:fillRef>
+          <a:effectRef idx="2">
+            <a:schemeClr val="accent1"/>
+          </a:effectRef>
+          <a:fontRef idx="minor">
+            <a:schemeClr val="lt1"/>
+          </a:fontRef>
+        </p:style>
+        <p:txBody>
+          <a:bodyPr rtlCol="0" anchor="ctr"/>
+          <a:lstStyle/>
+          <a:p>
+            <a:pPr algn="ctr"/>
+            <a:endParaRPr kumimoji="1" lang="ja-JP" altLang="en-US"/>
+          </a:p>
+        </p:txBody>
+      </p:sp>
+      <p:sp>
+        <p:nvSpPr>
+          <p:cNvPr id="35" name="テキスト ボックス 34"/>
+          <p:cNvSpPr txBox="1"/>
+          <p:nvPr/>
+        </p:nvSpPr>
+        <p:spPr>
+          <a:xfrm>
+            <a:off x="4957326" y="1128924"/>
+            <a:ext cx="646331" cy="276999"/>
+          </a:xfrm>
+          <a:prstGeom prst="rect">
+            <a:avLst/>
+          </a:prstGeom>
+          <a:noFill/>
+        </p:spPr>
+        <p:txBody>
+          <a:bodyPr wrap="none" rtlCol="0">
+            <a:spAutoFit/>
+          </a:bodyPr>
+          <a:lstStyle/>
+          <a:p>
+            <a:r>
+              <a:rPr lang="ja-JP" altLang="en-US" sz="1200" dirty="0" smtClean="0">
+                <a:latin typeface="メイリオ"/>
+                <a:ea typeface="メイリオ"/>
+                <a:cs typeface="メイリオ"/>
+              </a:rPr>
+              <a:t>金額</a:t>
+            </a:r>
+            <a:r>
+              <a:rPr kumimoji="1" lang="ja-JP" altLang="en-US" sz="1200" dirty="0" smtClean="0">
+                <a:latin typeface="メイリオ"/>
+                <a:ea typeface="メイリオ"/>
+                <a:cs typeface="メイリオ"/>
+              </a:rPr>
+              <a:t>：</a:t>
+            </a:r>
+            <a:endParaRPr kumimoji="1" lang="ja-JP" altLang="en-US" sz="1200" dirty="0">
+              <a:latin typeface="メイリオ"/>
+              <a:ea typeface="メイリオ"/>
+              <a:cs typeface="メイリオ"/>
+            </a:endParaRPr>
+          </a:p>
+        </p:txBody>
+      </p:sp>
+      <p:sp>
+        <p:nvSpPr>
+          <p:cNvPr id="36" name="角丸四角形 35"/>
+          <p:cNvSpPr/>
+          <p:nvPr/>
+        </p:nvSpPr>
+        <p:spPr>
+          <a:xfrm>
+            <a:off x="6515245" y="1118689"/>
+            <a:ext cx="550589" cy="299213"/>
+          </a:xfrm>
+          <a:prstGeom prst="roundRect">
+            <a:avLst/>
+          </a:prstGeom>
+          <a:noFill/>
+          <a:ln w="25400">
+            <a:solidFill>
+              <a:schemeClr val="tx1"/>
+            </a:solidFill>
+          </a:ln>
+          <a:effectLst/>
+        </p:spPr>
+        <p:style>
+          <a:lnRef idx="1">
+            <a:schemeClr val="accent1"/>
+          </a:lnRef>
+          <a:fillRef idx="3">
+            <a:schemeClr val="accent1"/>
+          </a:fillRef>
+          <a:effectRef idx="2">
+            <a:schemeClr val="accent1"/>
+          </a:effectRef>
+          <a:fontRef idx="minor">
+            <a:schemeClr val="lt1"/>
+          </a:fontRef>
+        </p:style>
+        <p:txBody>
+          <a:bodyPr rtlCol="0" anchor="ctr"/>
+          <a:lstStyle/>
+          <a:p>
+            <a:pPr algn="ctr"/>
+            <a:r>
+              <a:rPr kumimoji="1" lang="ja-JP" altLang="en-US" sz="1200" dirty="0" smtClean="0">
+                <a:solidFill>
+                  <a:schemeClr val="tx1"/>
+                </a:solidFill>
+                <a:latin typeface="メイリオ"/>
+                <a:ea typeface="メイリオ"/>
+                <a:cs typeface="メイリオ"/>
+              </a:rPr>
+              <a:t>登録</a:t>
+            </a:r>
+            <a:endParaRPr kumimoji="1" lang="ja-JP" altLang="en-US" sz="1200" dirty="0">
+              <a:solidFill>
+                <a:schemeClr val="tx1"/>
+              </a:solidFill>
+              <a:latin typeface="メイリオ"/>
+              <a:ea typeface="メイリオ"/>
+              <a:cs typeface="メイリオ"/>
+            </a:endParaRPr>
+          </a:p>
+        </p:txBody>
+      </p:sp>
+      <p:sp>
+        <p:nvSpPr>
+          <p:cNvPr id="37" name="角丸四角形 36"/>
+          <p:cNvSpPr/>
+          <p:nvPr/>
+        </p:nvSpPr>
+        <p:spPr>
+          <a:xfrm>
+            <a:off x="7239002" y="1121482"/>
+            <a:ext cx="864625" cy="299213"/>
+          </a:xfrm>
+          <a:prstGeom prst="roundRect">
+            <a:avLst/>
+          </a:prstGeom>
+          <a:noFill/>
+          <a:ln w="25400">
+            <a:solidFill>
+              <a:schemeClr val="tx1"/>
+            </a:solidFill>
+          </a:ln>
+          <a:effectLst/>
+        </p:spPr>
+        <p:style>
+          <a:lnRef idx="1">
+            <a:schemeClr val="accent1"/>
+          </a:lnRef>
+          <a:fillRef idx="3">
+            <a:schemeClr val="accent1"/>
+          </a:fillRef>
+          <a:effectRef idx="2">
+            <a:schemeClr val="accent1"/>
+          </a:effectRef>
+          <a:fontRef idx="minor">
+            <a:schemeClr val="lt1"/>
+          </a:fontRef>
+        </p:style>
+        <p:txBody>
+          <a:bodyPr rtlCol="0" anchor="ctr"/>
+          <a:lstStyle/>
+          <a:p>
+            <a:pPr algn="ctr"/>
+            <a:r>
+              <a:rPr lang="en-US" altLang="en-US" sz="1200" dirty="0" smtClean="0">
+                <a:solidFill>
+                  <a:schemeClr val="tx1"/>
+                </a:solidFill>
+                <a:latin typeface="メイリオ"/>
+                <a:ea typeface="メイリオ"/>
+                <a:cs typeface="メイリオ"/>
+              </a:rPr>
+              <a:t>リセット</a:t>
+            </a:r>
+            <a:endParaRPr kumimoji="1" lang="ja-JP" altLang="en-US" sz="1200" dirty="0">
+              <a:solidFill>
+                <a:schemeClr val="tx1"/>
+              </a:solidFill>
+              <a:latin typeface="メイリオ"/>
+              <a:ea typeface="メイリオ"/>
+              <a:cs typeface="メイリオ"/>
+            </a:endParaRPr>
+          </a:p>
+        </p:txBody>
+      </p:sp>
+      <p:cxnSp>
+        <p:nvCxnSpPr>
+          <p:cNvPr id="38" name="直線コネクタ 37"/>
+          <p:cNvCxnSpPr/>
+          <p:nvPr/>
+        </p:nvCxnSpPr>
+        <p:spPr>
+          <a:xfrm>
+            <a:off x="923931" y="1547091"/>
+            <a:ext cx="7250251" cy="0"/>
+          </a:xfrm>
+          <a:prstGeom prst="line">
+            <a:avLst/>
+          </a:prstGeom>
+          <a:ln>
+            <a:solidFill>
+              <a:schemeClr val="bg1">
+                <a:lumMod val="65000"/>
+              </a:schemeClr>
+            </a:solidFill>
+          </a:ln>
+          <a:effectLst/>
+        </p:spPr>
+        <p:style>
+          <a:lnRef idx="2">
+            <a:schemeClr val="accent1"/>
+          </a:lnRef>
+          <a:fillRef idx="0">
+            <a:schemeClr val="accent1"/>
+          </a:fillRef>
+          <a:effectRef idx="1">
+            <a:schemeClr val="accent1"/>
+          </a:effectRef>
+          <a:fontRef idx="minor">
+            <a:schemeClr val="tx1"/>
+          </a:fontRef>
+        </p:style>
+      </p:cxnSp>
+      <p:graphicFrame>
+        <p:nvGraphicFramePr>
+          <p:cNvPr id="39" name="表 38"/>
+          <p:cNvGraphicFramePr>
+            <a:graphicFrameLocks noGrp="1"/>
+          </p:cNvGraphicFramePr>
+          <p:nvPr>
+            <p:extLst>
+              <p:ext uri="{D42A27DB-BD31-4B8C-83A1-F6EECF244321}">
+                <p14:modId xmlns:p14="http://schemas.microsoft.com/office/powerpoint/2010/main" val="1012184571"/>
+              </p:ext>
+            </p:extLst>
+          </p:nvPr>
+        </p:nvGraphicFramePr>
+        <p:xfrm>
+          <a:off x="993905" y="2031998"/>
+          <a:ext cx="6891640" cy="4248728"/>
+        </p:xfrm>
+        <a:graphic>
+          <a:graphicData uri="http://schemas.openxmlformats.org/drawingml/2006/table">
+            <a:tbl>
+              <a:tblPr firstRow="1" bandRow="1">
+                <a:tableStyleId>{5C22544A-7EE6-4342-B048-85BDC9FD1C3A}</a:tableStyleId>
+              </a:tblPr>
+              <a:tblGrid>
+                <a:gridCol w="1722910"/>
+                <a:gridCol w="1722910"/>
+                <a:gridCol w="1722910"/>
+                <a:gridCol w="1722910"/>
+              </a:tblGrid>
+              <a:tr h="386248">
+                <a:tc>
+                  <a:txBody>
+                    <a:bodyPr/>
+                    <a:lstStyle/>
+                    <a:p>
+                      <a:r>
+                        <a:rPr kumimoji="1" lang="ja-JP" altLang="en-US" dirty="0" smtClean="0">
+                          <a:latin typeface="メイリオ"/>
+                          <a:ea typeface="メイリオ"/>
+                          <a:cs typeface="メイリオ"/>
+                        </a:rPr>
+                        <a:t>日付</a:t>
+                      </a:r>
+                      <a:endParaRPr kumimoji="1" lang="ja-JP" altLang="en-US" dirty="0">
+                        <a:latin typeface="メイリオ"/>
+                        <a:ea typeface="メイリオ"/>
+                        <a:cs typeface="メイリオ"/>
+                      </a:endParaRPr>
+                    </a:p>
+                  </a:txBody>
+                  <a:tcPr/>
+                </a:tc>
+                <a:tc>
+                  <a:txBody>
+                    <a:bodyPr/>
+                    <a:lstStyle/>
+                    <a:p>
+                      <a:r>
+                        <a:rPr kumimoji="1" lang="ja-JP" altLang="en-US" dirty="0" smtClean="0">
+                          <a:latin typeface="メイリオ"/>
+                          <a:ea typeface="メイリオ"/>
+                          <a:cs typeface="メイリオ"/>
+                        </a:rPr>
+                        <a:t>内容</a:t>
+                      </a:r>
+                      <a:endParaRPr kumimoji="1" lang="ja-JP" altLang="en-US" dirty="0">
+                        <a:latin typeface="メイリオ"/>
+                        <a:ea typeface="メイリオ"/>
+                        <a:cs typeface="メイリオ"/>
+                      </a:endParaRPr>
+                    </a:p>
+                  </a:txBody>
+                  <a:tcPr/>
+                </a:tc>
+                <a:tc>
+                  <a:txBody>
+                    <a:bodyPr/>
+                    <a:lstStyle/>
+                    <a:p>
+                      <a:r>
+                        <a:rPr kumimoji="1" lang="ja-JP" altLang="en-US" dirty="0" smtClean="0">
+                          <a:latin typeface="メイリオ"/>
+                          <a:ea typeface="メイリオ"/>
+                          <a:cs typeface="メイリオ"/>
+                        </a:rPr>
+                        <a:t>カテゴリ</a:t>
+                      </a:r>
+                      <a:endParaRPr kumimoji="1" lang="ja-JP" altLang="en-US" dirty="0">
+                        <a:latin typeface="メイリオ"/>
+                        <a:ea typeface="メイリオ"/>
+                        <a:cs typeface="メイリオ"/>
+                      </a:endParaRPr>
+                    </a:p>
+                  </a:txBody>
+                  <a:tcPr/>
+                </a:tc>
+                <a:tc>
+                  <a:txBody>
+                    <a:bodyPr/>
+                    <a:lstStyle/>
+                    <a:p>
+                      <a:r>
+                        <a:rPr kumimoji="1" lang="ja-JP" altLang="en-US" dirty="0" smtClean="0">
+                          <a:latin typeface="メイリオ"/>
+                          <a:ea typeface="メイリオ"/>
+                          <a:cs typeface="メイリオ"/>
+                        </a:rPr>
+                        <a:t>金額</a:t>
+                      </a:r>
+                      <a:endParaRPr kumimoji="1" lang="ja-JP" altLang="en-US" dirty="0">
+                        <a:latin typeface="メイリオ"/>
+                        <a:ea typeface="メイリオ"/>
+                        <a:cs typeface="メイリオ"/>
+                      </a:endParaRPr>
+                    </a:p>
+                  </a:txBody>
+                  <a:tcPr/>
+                </a:tc>
+              </a:tr>
+              <a:tr h="386248">
+                <a:tc>
+                  <a:txBody>
+                    <a:bodyPr/>
+                    <a:lstStyle/>
+                    <a:p>
+                      <a:endParaRPr kumimoji="1" lang="ja-JP" altLang="en-US"/>
+                    </a:p>
+                  </a:txBody>
+                  <a:tcPr/>
+                </a:tc>
+                <a:tc>
+                  <a:txBody>
+                    <a:bodyPr/>
+                    <a:lstStyle/>
+                    <a:p>
+                      <a:endParaRPr kumimoji="1" lang="ja-JP" altLang="en-US"/>
+                    </a:p>
+                  </a:txBody>
+                  <a:tcPr/>
+                </a:tc>
+                <a:tc>
+                  <a:txBody>
+                    <a:bodyPr/>
+                    <a:lstStyle/>
+                    <a:p>
+                      <a:endParaRPr kumimoji="1" lang="ja-JP" altLang="en-US"/>
+                    </a:p>
+                  </a:txBody>
+                  <a:tcPr/>
+                </a:tc>
+                <a:tc>
+                  <a:txBody>
+                    <a:bodyPr/>
+                    <a:lstStyle/>
+                    <a:p>
+                      <a:endParaRPr kumimoji="1" lang="ja-JP" altLang="en-US" dirty="0"/>
+                    </a:p>
+                  </a:txBody>
+                  <a:tcPr/>
+                </a:tc>
+              </a:tr>
+              <a:tr h="386248">
+                <a:tc>
+                  <a:txBody>
+                    <a:bodyPr/>
+                    <a:lstStyle/>
+                    <a:p>
+                      <a:endParaRPr kumimoji="1" lang="ja-JP" altLang="en-US" dirty="0"/>
+                    </a:p>
+                  </a:txBody>
+                  <a:tcPr/>
+                </a:tc>
+                <a:tc>
+                  <a:txBody>
+                    <a:bodyPr/>
+                    <a:lstStyle/>
+                    <a:p>
+                      <a:endParaRPr kumimoji="1" lang="ja-JP" altLang="en-US"/>
+                    </a:p>
+                  </a:txBody>
+                  <a:tcPr/>
+                </a:tc>
+                <a:tc>
+                  <a:txBody>
+                    <a:bodyPr/>
+                    <a:lstStyle/>
+                    <a:p>
+                      <a:endParaRPr kumimoji="1" lang="ja-JP" altLang="en-US"/>
+                    </a:p>
+                  </a:txBody>
+                  <a:tcPr/>
+                </a:tc>
+                <a:tc>
+                  <a:txBody>
+                    <a:bodyPr/>
+                    <a:lstStyle/>
+                    <a:p>
+                      <a:endParaRPr kumimoji="1" lang="ja-JP" altLang="en-US" dirty="0"/>
+                    </a:p>
+                  </a:txBody>
+                  <a:tcPr/>
+                </a:tc>
+              </a:tr>
+              <a:tr h="386248">
+                <a:tc>
+                  <a:txBody>
+                    <a:bodyPr/>
+                    <a:lstStyle/>
+                    <a:p>
+                      <a:endParaRPr kumimoji="1" lang="ja-JP" altLang="en-US" dirty="0"/>
+                    </a:p>
+                  </a:txBody>
+                  <a:tcPr/>
+                </a:tc>
+                <a:tc>
+                  <a:txBody>
+                    <a:bodyPr/>
+                    <a:lstStyle/>
+                    <a:p>
+                      <a:endParaRPr kumimoji="1" lang="ja-JP" altLang="en-US"/>
+                    </a:p>
+                  </a:txBody>
+                  <a:tcPr/>
+                </a:tc>
+                <a:tc>
+                  <a:txBody>
+                    <a:bodyPr/>
+                    <a:lstStyle/>
+                    <a:p>
+                      <a:endParaRPr kumimoji="1" lang="ja-JP" altLang="en-US"/>
+                    </a:p>
+                  </a:txBody>
+                  <a:tcPr/>
+                </a:tc>
+                <a:tc>
+                  <a:txBody>
+                    <a:bodyPr/>
+                    <a:lstStyle/>
+                    <a:p>
+                      <a:endParaRPr kumimoji="1" lang="ja-JP" altLang="en-US" dirty="0"/>
+                    </a:p>
+                  </a:txBody>
+                  <a:tcPr/>
+                </a:tc>
+              </a:tr>
+              <a:tr h="386248">
+                <a:tc>
+                  <a:txBody>
+                    <a:bodyPr/>
+                    <a:lstStyle/>
+                    <a:p>
+                      <a:endParaRPr kumimoji="1" lang="ja-JP" altLang="en-US" dirty="0"/>
+                    </a:p>
+                  </a:txBody>
+                  <a:tcPr/>
+                </a:tc>
+                <a:tc>
+                  <a:txBody>
+                    <a:bodyPr/>
+                    <a:lstStyle/>
+                    <a:p>
+                      <a:endParaRPr kumimoji="1" lang="ja-JP" altLang="en-US" dirty="0"/>
+                    </a:p>
+                  </a:txBody>
+                  <a:tcPr/>
+                </a:tc>
+                <a:tc>
+                  <a:txBody>
+                    <a:bodyPr/>
+                    <a:lstStyle/>
+                    <a:p>
+                      <a:endParaRPr kumimoji="1" lang="ja-JP" altLang="en-US"/>
+                    </a:p>
+                  </a:txBody>
+                  <a:tcPr/>
+                </a:tc>
+                <a:tc>
+                  <a:txBody>
+                    <a:bodyPr/>
+                    <a:lstStyle/>
+                    <a:p>
+                      <a:endParaRPr kumimoji="1" lang="ja-JP" altLang="en-US" dirty="0"/>
+                    </a:p>
+                  </a:txBody>
+                  <a:tcPr/>
+                </a:tc>
+              </a:tr>
+              <a:tr h="386248">
+                <a:tc>
+                  <a:txBody>
+                    <a:bodyPr/>
+                    <a:lstStyle/>
+                    <a:p>
+                      <a:endParaRPr kumimoji="1" lang="ja-JP" altLang="en-US" dirty="0"/>
+                    </a:p>
+                  </a:txBody>
+                  <a:tcPr/>
+                </a:tc>
+                <a:tc>
+                  <a:txBody>
+                    <a:bodyPr/>
+                    <a:lstStyle/>
+                    <a:p>
+                      <a:endParaRPr kumimoji="1" lang="ja-JP" altLang="en-US" dirty="0"/>
+                    </a:p>
+                  </a:txBody>
+                  <a:tcPr/>
+                </a:tc>
+                <a:tc>
+                  <a:txBody>
+                    <a:bodyPr/>
+                    <a:lstStyle/>
+                    <a:p>
+                      <a:endParaRPr kumimoji="1" lang="ja-JP" altLang="en-US"/>
+                    </a:p>
+                  </a:txBody>
+                  <a:tcPr/>
+                </a:tc>
+                <a:tc>
+                  <a:txBody>
+                    <a:bodyPr/>
+                    <a:lstStyle/>
+                    <a:p>
+                      <a:endParaRPr kumimoji="1" lang="ja-JP" altLang="en-US" dirty="0"/>
+                    </a:p>
+                  </a:txBody>
+                  <a:tcPr/>
+                </a:tc>
+              </a:tr>
+              <a:tr h="386248">
+                <a:tc>
+                  <a:txBody>
+                    <a:bodyPr/>
+                    <a:lstStyle/>
+                    <a:p>
+                      <a:endParaRPr kumimoji="1" lang="ja-JP" altLang="en-US" dirty="0"/>
+                    </a:p>
+                  </a:txBody>
+                  <a:tcPr/>
+                </a:tc>
+                <a:tc>
+                  <a:txBody>
+                    <a:bodyPr/>
+                    <a:lstStyle/>
+                    <a:p>
+                      <a:endParaRPr kumimoji="1" lang="ja-JP" altLang="en-US" dirty="0"/>
+                    </a:p>
+                  </a:txBody>
+                  <a:tcPr/>
+                </a:tc>
+                <a:tc>
+                  <a:txBody>
+                    <a:bodyPr/>
+                    <a:lstStyle/>
+                    <a:p>
+                      <a:endParaRPr kumimoji="1" lang="ja-JP" altLang="en-US"/>
+                    </a:p>
+                  </a:txBody>
+                  <a:tcPr/>
+                </a:tc>
+                <a:tc>
+                  <a:txBody>
+                    <a:bodyPr/>
+                    <a:lstStyle/>
+                    <a:p>
+                      <a:endParaRPr kumimoji="1" lang="ja-JP" altLang="en-US" dirty="0"/>
+                    </a:p>
+                  </a:txBody>
+                  <a:tcPr/>
+                </a:tc>
+              </a:tr>
+              <a:tr h="386248">
+                <a:tc>
+                  <a:txBody>
+                    <a:bodyPr/>
+                    <a:lstStyle/>
+                    <a:p>
+                      <a:endParaRPr kumimoji="1" lang="ja-JP" altLang="en-US" dirty="0"/>
+                    </a:p>
+                  </a:txBody>
+                  <a:tcPr/>
+                </a:tc>
+                <a:tc>
+                  <a:txBody>
+                    <a:bodyPr/>
+                    <a:lstStyle/>
+                    <a:p>
+                      <a:endParaRPr kumimoji="1" lang="ja-JP" altLang="en-US"/>
+                    </a:p>
+                  </a:txBody>
+                  <a:tcPr/>
+                </a:tc>
+                <a:tc>
+                  <a:txBody>
+                    <a:bodyPr/>
+                    <a:lstStyle/>
+                    <a:p>
+                      <a:endParaRPr kumimoji="1" lang="ja-JP" altLang="en-US"/>
+                    </a:p>
+                  </a:txBody>
+                  <a:tcPr/>
+                </a:tc>
+                <a:tc>
+                  <a:txBody>
+                    <a:bodyPr/>
+                    <a:lstStyle/>
+                    <a:p>
+                      <a:endParaRPr kumimoji="1" lang="ja-JP" altLang="en-US"/>
+                    </a:p>
+                  </a:txBody>
+                  <a:tcPr/>
+                </a:tc>
+              </a:tr>
+              <a:tr h="386248">
+                <a:tc>
+                  <a:txBody>
+                    <a:bodyPr/>
+                    <a:lstStyle/>
+                    <a:p>
+                      <a:endParaRPr kumimoji="1" lang="ja-JP" altLang="en-US"/>
+                    </a:p>
+                  </a:txBody>
+                  <a:tcPr/>
+                </a:tc>
+                <a:tc>
+                  <a:txBody>
+                    <a:bodyPr/>
+                    <a:lstStyle/>
+                    <a:p>
+                      <a:endParaRPr kumimoji="1" lang="ja-JP" altLang="en-US"/>
+                    </a:p>
+                  </a:txBody>
+                  <a:tcPr/>
+                </a:tc>
+                <a:tc>
+                  <a:txBody>
+                    <a:bodyPr/>
+                    <a:lstStyle/>
+                    <a:p>
+                      <a:endParaRPr kumimoji="1" lang="ja-JP" altLang="en-US"/>
+                    </a:p>
+                  </a:txBody>
+                  <a:tcPr/>
+                </a:tc>
+                <a:tc>
+                  <a:txBody>
+                    <a:bodyPr/>
+                    <a:lstStyle/>
+                    <a:p>
+                      <a:endParaRPr kumimoji="1" lang="ja-JP" altLang="en-US"/>
+                    </a:p>
+                  </a:txBody>
+                  <a:tcPr/>
+                </a:tc>
+              </a:tr>
+              <a:tr h="386248">
+                <a:tc>
+                  <a:txBody>
+                    <a:bodyPr/>
+                    <a:lstStyle/>
+                    <a:p>
+                      <a:endParaRPr kumimoji="1" lang="ja-JP" altLang="en-US"/>
+                    </a:p>
+                  </a:txBody>
+                  <a:tcPr/>
+                </a:tc>
+                <a:tc>
+                  <a:txBody>
+                    <a:bodyPr/>
+                    <a:lstStyle/>
+                    <a:p>
+                      <a:endParaRPr kumimoji="1" lang="ja-JP" altLang="en-US"/>
+                    </a:p>
+                  </a:txBody>
+                  <a:tcPr/>
+                </a:tc>
+                <a:tc>
+                  <a:txBody>
+                    <a:bodyPr/>
+                    <a:lstStyle/>
+                    <a:p>
+                      <a:endParaRPr kumimoji="1" lang="ja-JP" altLang="en-US"/>
+                    </a:p>
+                  </a:txBody>
+                  <a:tcPr/>
+                </a:tc>
+                <a:tc>
+                  <a:txBody>
+                    <a:bodyPr/>
+                    <a:lstStyle/>
+                    <a:p>
+                      <a:endParaRPr kumimoji="1" lang="ja-JP" altLang="en-US"/>
+                    </a:p>
+                  </a:txBody>
+                  <a:tcPr/>
+                </a:tc>
+              </a:tr>
+              <a:tr h="386248">
+                <a:tc>
+                  <a:txBody>
+                    <a:bodyPr/>
+                    <a:lstStyle/>
+                    <a:p>
+                      <a:endParaRPr kumimoji="1" lang="ja-JP" altLang="en-US"/>
+                    </a:p>
+                  </a:txBody>
+                  <a:tcPr/>
+                </a:tc>
+                <a:tc>
+                  <a:txBody>
+                    <a:bodyPr/>
+                    <a:lstStyle/>
+                    <a:p>
+                      <a:endParaRPr kumimoji="1" lang="ja-JP" altLang="en-US" dirty="0"/>
+                    </a:p>
+                  </a:txBody>
+                  <a:tcPr/>
+                </a:tc>
+                <a:tc>
+                  <a:txBody>
+                    <a:bodyPr/>
+                    <a:lstStyle/>
+                    <a:p>
+                      <a:endParaRPr kumimoji="1" lang="ja-JP" altLang="en-US" dirty="0"/>
+                    </a:p>
+                  </a:txBody>
+                  <a:tcPr/>
+                </a:tc>
+                <a:tc>
+                  <a:txBody>
+                    <a:bodyPr/>
+                    <a:lstStyle/>
+                    <a:p>
+                      <a:endParaRPr kumimoji="1" lang="ja-JP" altLang="en-US" dirty="0"/>
+                    </a:p>
+                  </a:txBody>
+                  <a:tcPr/>
+                </a:tc>
+              </a:tr>
+            </a:tbl>
+          </a:graphicData>
+        </a:graphic>
+      </p:graphicFrame>
+      <p:sp>
+        <p:nvSpPr>
+          <p:cNvPr id="41" name="円柱 40"/>
+          <p:cNvSpPr/>
+          <p:nvPr/>
+        </p:nvSpPr>
+        <p:spPr>
+          <a:xfrm>
+            <a:off x="8017036" y="2447634"/>
+            <a:ext cx="173182" cy="288636"/>
+          </a:xfrm>
+          <a:prstGeom prst="can">
+            <a:avLst/>
+          </a:prstGeom>
+          <a:noFill/>
+          <a:ln w="25400">
+            <a:solidFill>
+              <a:schemeClr val="tx1"/>
+            </a:solidFill>
+          </a:ln>
+          <a:effectLst/>
+        </p:spPr>
+        <p:style>
+          <a:lnRef idx="1">
+            <a:schemeClr val="accent1"/>
+          </a:lnRef>
+          <a:fillRef idx="3">
+            <a:schemeClr val="accent1"/>
+          </a:fillRef>
+          <a:effectRef idx="2">
+            <a:schemeClr val="accent1"/>
+          </a:effectRef>
+          <a:fontRef idx="minor">
+            <a:schemeClr val="lt1"/>
+          </a:fontRef>
+        </p:style>
+        <p:txBody>
+          <a:bodyPr rtlCol="0" anchor="ctr"/>
+          <a:lstStyle/>
+          <a:p>
+            <a:pPr algn="ctr"/>
+            <a:endParaRPr kumimoji="1" lang="ja-JP" altLang="en-US"/>
+          </a:p>
+        </p:txBody>
+      </p:sp>
+      <p:sp>
+        <p:nvSpPr>
+          <p:cNvPr id="42" name="円柱 41"/>
+          <p:cNvSpPr/>
+          <p:nvPr/>
+        </p:nvSpPr>
+        <p:spPr>
+          <a:xfrm>
+            <a:off x="8017036" y="2856340"/>
+            <a:ext cx="173182" cy="288636"/>
+          </a:xfrm>
+          <a:prstGeom prst="can">
+            <a:avLst/>
+          </a:prstGeom>
+          <a:noFill/>
+          <a:ln w="25400">
+            <a:solidFill>
+              <a:schemeClr val="tx1"/>
+            </a:solidFill>
+          </a:ln>
+          <a:effectLst/>
+        </p:spPr>
+        <p:style>
+          <a:lnRef idx="1">
+            <a:schemeClr val="accent1"/>
+          </a:lnRef>
+          <a:fillRef idx="3">
+            <a:schemeClr val="accent1"/>
+          </a:fillRef>
+          <a:effectRef idx="2">
+            <a:schemeClr val="accent1"/>
+          </a:effectRef>
+          <a:fontRef idx="minor">
+            <a:schemeClr val="lt1"/>
+          </a:fontRef>
+        </p:style>
+        <p:txBody>
+          <a:bodyPr rtlCol="0" anchor="ctr"/>
+          <a:lstStyle/>
+          <a:p>
+            <a:pPr algn="ctr"/>
+            <a:endParaRPr kumimoji="1" lang="ja-JP" altLang="en-US"/>
+          </a:p>
+        </p:txBody>
+      </p:sp>
+      <p:sp>
+        <p:nvSpPr>
+          <p:cNvPr id="45" name="円柱 44"/>
+          <p:cNvSpPr/>
+          <p:nvPr/>
+        </p:nvSpPr>
+        <p:spPr>
+          <a:xfrm>
+            <a:off x="8017036" y="3235027"/>
+            <a:ext cx="173182" cy="288636"/>
+          </a:xfrm>
+          <a:prstGeom prst="can">
+            <a:avLst/>
+          </a:prstGeom>
+          <a:noFill/>
+          <a:ln w="25400">
+            <a:solidFill>
+              <a:schemeClr val="tx1"/>
+            </a:solidFill>
+          </a:ln>
+          <a:effectLst/>
+        </p:spPr>
+        <p:style>
+          <a:lnRef idx="1">
+            <a:schemeClr val="accent1"/>
+          </a:lnRef>
+          <a:fillRef idx="3">
+            <a:schemeClr val="accent1"/>
+          </a:fillRef>
+          <a:effectRef idx="2">
+            <a:schemeClr val="accent1"/>
+          </a:effectRef>
+          <a:fontRef idx="minor">
+            <a:schemeClr val="lt1"/>
+          </a:fontRef>
+        </p:style>
+        <p:txBody>
+          <a:bodyPr rtlCol="0" anchor="ctr"/>
+          <a:lstStyle/>
+          <a:p>
+            <a:pPr algn="ctr"/>
+            <a:endParaRPr kumimoji="1" lang="ja-JP" altLang="en-US"/>
+          </a:p>
+        </p:txBody>
+      </p:sp>
+      <p:sp>
+        <p:nvSpPr>
+          <p:cNvPr id="46" name="円柱 45"/>
+          <p:cNvSpPr/>
+          <p:nvPr/>
+        </p:nvSpPr>
+        <p:spPr>
+          <a:xfrm>
+            <a:off x="8017036" y="3624105"/>
+            <a:ext cx="173182" cy="288636"/>
+          </a:xfrm>
+          <a:prstGeom prst="can">
+            <a:avLst/>
+          </a:prstGeom>
+          <a:noFill/>
+          <a:ln w="25400">
+            <a:solidFill>
+              <a:schemeClr val="tx1"/>
+            </a:solidFill>
+          </a:ln>
+          <a:effectLst/>
+        </p:spPr>
+        <p:style>
+          <a:lnRef idx="1">
+            <a:schemeClr val="accent1"/>
+          </a:lnRef>
+          <a:fillRef idx="3">
+            <a:schemeClr val="accent1"/>
+          </a:fillRef>
+          <a:effectRef idx="2">
+            <a:schemeClr val="accent1"/>
+          </a:effectRef>
+          <a:fontRef idx="minor">
+            <a:schemeClr val="lt1"/>
+          </a:fontRef>
+        </p:style>
+        <p:txBody>
+          <a:bodyPr rtlCol="0" anchor="ctr"/>
+          <a:lstStyle/>
+          <a:p>
+            <a:pPr algn="ctr"/>
+            <a:endParaRPr kumimoji="1" lang="ja-JP" altLang="en-US"/>
+          </a:p>
+        </p:txBody>
+      </p:sp>
+      <p:sp>
+        <p:nvSpPr>
+          <p:cNvPr id="47" name="円柱 46"/>
+          <p:cNvSpPr/>
+          <p:nvPr/>
+        </p:nvSpPr>
+        <p:spPr>
+          <a:xfrm>
+            <a:off x="8017036" y="4008555"/>
+            <a:ext cx="173182" cy="288636"/>
+          </a:xfrm>
+          <a:prstGeom prst="can">
+            <a:avLst/>
+          </a:prstGeom>
+          <a:noFill/>
+          <a:ln w="25400">
+            <a:solidFill>
+              <a:schemeClr val="tx1"/>
+            </a:solidFill>
+          </a:ln>
+          <a:effectLst/>
+        </p:spPr>
+        <p:style>
+          <a:lnRef idx="1">
+            <a:schemeClr val="accent1"/>
+          </a:lnRef>
+          <a:fillRef idx="3">
+            <a:schemeClr val="accent1"/>
+          </a:fillRef>
+          <a:effectRef idx="2">
+            <a:schemeClr val="accent1"/>
+          </a:effectRef>
+          <a:fontRef idx="minor">
+            <a:schemeClr val="lt1"/>
+          </a:fontRef>
+        </p:style>
+        <p:txBody>
+          <a:bodyPr rtlCol="0" anchor="ctr"/>
+          <a:lstStyle/>
+          <a:p>
+            <a:pPr algn="ctr"/>
+            <a:endParaRPr kumimoji="1" lang="ja-JP" altLang="en-US"/>
+          </a:p>
+        </p:txBody>
+      </p:sp>
+      <p:sp>
+        <p:nvSpPr>
+          <p:cNvPr id="48" name="円柱 47"/>
+          <p:cNvSpPr/>
+          <p:nvPr/>
+        </p:nvSpPr>
+        <p:spPr>
+          <a:xfrm>
+            <a:off x="8017036" y="4397633"/>
+            <a:ext cx="173182" cy="288636"/>
+          </a:xfrm>
+          <a:prstGeom prst="can">
+            <a:avLst/>
+          </a:prstGeom>
+          <a:noFill/>
+          <a:ln w="25400">
+            <a:solidFill>
+              <a:schemeClr val="tx1"/>
+            </a:solidFill>
+          </a:ln>
+          <a:effectLst/>
+        </p:spPr>
+        <p:style>
+          <a:lnRef idx="1">
+            <a:schemeClr val="accent1"/>
+          </a:lnRef>
+          <a:fillRef idx="3">
+            <a:schemeClr val="accent1"/>
+          </a:fillRef>
+          <a:effectRef idx="2">
+            <a:schemeClr val="accent1"/>
+          </a:effectRef>
+          <a:fontRef idx="minor">
+            <a:schemeClr val="lt1"/>
+          </a:fontRef>
+        </p:style>
+        <p:txBody>
+          <a:bodyPr rtlCol="0" anchor="ctr"/>
+          <a:lstStyle/>
+          <a:p>
+            <a:pPr algn="ctr"/>
+            <a:endParaRPr kumimoji="1" lang="ja-JP" altLang="en-US"/>
+          </a:p>
+        </p:txBody>
+      </p:sp>
+      <p:sp>
+        <p:nvSpPr>
+          <p:cNvPr id="49" name="円柱 48"/>
+          <p:cNvSpPr/>
+          <p:nvPr/>
+        </p:nvSpPr>
+        <p:spPr>
+          <a:xfrm>
+            <a:off x="8017036" y="4782067"/>
+            <a:ext cx="173182" cy="288636"/>
+          </a:xfrm>
+          <a:prstGeom prst="can">
+            <a:avLst/>
+          </a:prstGeom>
+          <a:noFill/>
+          <a:ln w="25400">
+            <a:solidFill>
+              <a:schemeClr val="tx1"/>
+            </a:solidFill>
+          </a:ln>
+          <a:effectLst/>
+        </p:spPr>
+        <p:style>
+          <a:lnRef idx="1">
+            <a:schemeClr val="accent1"/>
+          </a:lnRef>
+          <a:fillRef idx="3">
+            <a:schemeClr val="accent1"/>
+          </a:fillRef>
+          <a:effectRef idx="2">
+            <a:schemeClr val="accent1"/>
+          </a:effectRef>
+          <a:fontRef idx="minor">
+            <a:schemeClr val="lt1"/>
+          </a:fontRef>
+        </p:style>
+        <p:txBody>
+          <a:bodyPr rtlCol="0" anchor="ctr"/>
+          <a:lstStyle/>
+          <a:p>
+            <a:pPr algn="ctr"/>
+            <a:endParaRPr kumimoji="1" lang="ja-JP" altLang="en-US"/>
+          </a:p>
+        </p:txBody>
+      </p:sp>
+      <p:sp>
+        <p:nvSpPr>
+          <p:cNvPr id="50" name="円柱 49"/>
+          <p:cNvSpPr/>
+          <p:nvPr/>
+        </p:nvSpPr>
+        <p:spPr>
+          <a:xfrm>
+            <a:off x="8017036" y="5169935"/>
+            <a:ext cx="173182" cy="288636"/>
+          </a:xfrm>
+          <a:prstGeom prst="can">
+            <a:avLst/>
+          </a:prstGeom>
+          <a:noFill/>
+          <a:ln w="25400">
+            <a:solidFill>
+              <a:schemeClr val="tx1"/>
+            </a:solidFill>
+          </a:ln>
+          <a:effectLst/>
+        </p:spPr>
+        <p:style>
+          <a:lnRef idx="1">
+            <a:schemeClr val="accent1"/>
+          </a:lnRef>
+          <a:fillRef idx="3">
+            <a:schemeClr val="accent1"/>
+          </a:fillRef>
+          <a:effectRef idx="2">
+            <a:schemeClr val="accent1"/>
+          </a:effectRef>
+          <a:fontRef idx="minor">
+            <a:schemeClr val="lt1"/>
+          </a:fontRef>
+        </p:style>
+        <p:txBody>
+          <a:bodyPr rtlCol="0" anchor="ctr"/>
+          <a:lstStyle/>
+          <a:p>
+            <a:pPr algn="ctr"/>
+            <a:endParaRPr kumimoji="1" lang="ja-JP" altLang="en-US"/>
+          </a:p>
+        </p:txBody>
+      </p:sp>
+      <p:sp>
+        <p:nvSpPr>
+          <p:cNvPr id="51" name="円柱 50"/>
+          <p:cNvSpPr/>
+          <p:nvPr/>
+        </p:nvSpPr>
+        <p:spPr>
+          <a:xfrm>
+            <a:off x="8017036" y="5559013"/>
+            <a:ext cx="173182" cy="288636"/>
+          </a:xfrm>
+          <a:prstGeom prst="can">
+            <a:avLst/>
+          </a:prstGeom>
+          <a:noFill/>
+          <a:ln w="25400">
+            <a:solidFill>
+              <a:schemeClr val="tx1"/>
+            </a:solidFill>
+          </a:ln>
+          <a:effectLst/>
+        </p:spPr>
+        <p:style>
+          <a:lnRef idx="1">
+            <a:schemeClr val="accent1"/>
+          </a:lnRef>
+          <a:fillRef idx="3">
+            <a:schemeClr val="accent1"/>
+          </a:fillRef>
+          <a:effectRef idx="2">
+            <a:schemeClr val="accent1"/>
+          </a:effectRef>
+          <a:fontRef idx="minor">
+            <a:schemeClr val="lt1"/>
+          </a:fontRef>
+        </p:style>
+        <p:txBody>
+          <a:bodyPr rtlCol="0" anchor="ctr"/>
+          <a:lstStyle/>
+          <a:p>
+            <a:pPr algn="ctr"/>
+            <a:endParaRPr kumimoji="1" lang="ja-JP" altLang="en-US"/>
+          </a:p>
+        </p:txBody>
+      </p:sp>
+      <p:sp>
+        <p:nvSpPr>
+          <p:cNvPr id="54" name="円柱 53"/>
+          <p:cNvSpPr/>
+          <p:nvPr/>
+        </p:nvSpPr>
+        <p:spPr>
+          <a:xfrm>
+            <a:off x="8017036" y="5930778"/>
+            <a:ext cx="173182" cy="288636"/>
+          </a:xfrm>
+          <a:prstGeom prst="can">
+            <a:avLst/>
+          </a:prstGeom>
+          <a:noFill/>
+          <a:ln w="25400">
+            <a:solidFill>
+              <a:schemeClr val="tx1"/>
+            </a:solidFill>
+          </a:ln>
+          <a:effectLst/>
+        </p:spPr>
+        <p:style>
+          <a:lnRef idx="1">
+            <a:schemeClr val="accent1"/>
+          </a:lnRef>
+          <a:fillRef idx="3">
+            <a:schemeClr val="accent1"/>
+          </a:fillRef>
+          <a:effectRef idx="2">
+            <a:schemeClr val="accent1"/>
+          </a:effectRef>
+          <a:fontRef idx="minor">
+            <a:schemeClr val="lt1"/>
+          </a:fontRef>
+        </p:style>
+        <p:txBody>
+          <a:bodyPr rtlCol="0" anchor="ctr"/>
+          <a:lstStyle/>
+          <a:p>
+            <a:pPr algn="ctr"/>
+            <a:endParaRPr kumimoji="1" lang="ja-JP" altLang="en-US"/>
+          </a:p>
+        </p:txBody>
+      </p:sp>
+      <p:sp>
+        <p:nvSpPr>
+          <p:cNvPr id="55" name="正方形/長方形 54"/>
+          <p:cNvSpPr/>
+          <p:nvPr/>
+        </p:nvSpPr>
+        <p:spPr>
+          <a:xfrm>
+            <a:off x="783269" y="935182"/>
+            <a:ext cx="7575640" cy="5541817"/>
+          </a:xfrm>
+          <a:prstGeom prst="rect">
+            <a:avLst/>
+          </a:prstGeom>
+          <a:solidFill>
+            <a:schemeClr val="bg1">
+              <a:lumMod val="75000"/>
+              <a:alpha val="50000"/>
+            </a:schemeClr>
+          </a:solidFill>
+          <a:ln w="25400">
+            <a:solidFill>
+              <a:schemeClr val="tx1"/>
+            </a:solidFill>
+          </a:ln>
+          <a:effectLst/>
+        </p:spPr>
+        <p:style>
+          <a:lnRef idx="1">
+            <a:schemeClr val="accent1"/>
+          </a:lnRef>
+          <a:fillRef idx="3">
+            <a:schemeClr val="accent1"/>
+          </a:fillRef>
+          <a:effectRef idx="2">
+            <a:schemeClr val="accent1"/>
+          </a:effectRef>
+          <a:fontRef idx="minor">
+            <a:schemeClr val="lt1"/>
+          </a:fontRef>
+        </p:style>
+        <p:txBody>
+          <a:bodyPr rtlCol="0" anchor="ctr"/>
+          <a:lstStyle/>
+          <a:p>
+            <a:pPr algn="ctr"/>
+            <a:endParaRPr kumimoji="1" lang="ja-JP" altLang="en-US" sz="2800" dirty="0">
+              <a:solidFill>
+                <a:schemeClr val="tx1"/>
+              </a:solidFill>
+              <a:latin typeface="メイリオ"/>
+              <a:ea typeface="メイリオ"/>
+              <a:cs typeface="メイリオ"/>
+            </a:endParaRPr>
+          </a:p>
+        </p:txBody>
+      </p:sp>
+      <p:grpSp>
+        <p:nvGrpSpPr>
+          <p:cNvPr id="5" name="図形グループ 4"/>
+          <p:cNvGrpSpPr/>
+          <p:nvPr/>
+        </p:nvGrpSpPr>
+        <p:grpSpPr>
+          <a:xfrm>
+            <a:off x="3017146" y="2447634"/>
+            <a:ext cx="2989891" cy="875242"/>
+            <a:chOff x="3017146" y="2447634"/>
+            <a:chExt cx="2989891" cy="875242"/>
+          </a:xfrm>
+        </p:grpSpPr>
+        <p:grpSp>
+          <p:nvGrpSpPr>
+            <p:cNvPr id="6" name="図形グループ 5"/>
+            <p:cNvGrpSpPr/>
+            <p:nvPr/>
+          </p:nvGrpSpPr>
+          <p:grpSpPr>
+            <a:xfrm>
+              <a:off x="3017146" y="2447634"/>
+              <a:ext cx="2989891" cy="875242"/>
+              <a:chOff x="1834387" y="2031998"/>
+              <a:chExt cx="5525476" cy="1981328"/>
+            </a:xfrm>
+          </p:grpSpPr>
+          <p:sp>
+            <p:nvSpPr>
+              <p:cNvPr id="2" name="角丸四角形 1"/>
+              <p:cNvSpPr/>
+              <p:nvPr/>
+            </p:nvSpPr>
+            <p:spPr>
+              <a:xfrm>
+                <a:off x="1834387" y="2031998"/>
+                <a:ext cx="5525476" cy="1981328"/>
+              </a:xfrm>
+              <a:prstGeom prst="roundRect">
+                <a:avLst/>
+              </a:prstGeom>
+              <a:solidFill>
+                <a:schemeClr val="bg1"/>
+              </a:solidFill>
+              <a:ln>
+                <a:solidFill>
+                  <a:schemeClr val="tx1"/>
+                </a:solidFill>
+              </a:ln>
+            </p:spPr>
+            <p:style>
+              <a:lnRef idx="1">
+                <a:schemeClr val="accent1"/>
+              </a:lnRef>
+              <a:fillRef idx="3">
+                <a:schemeClr val="accent1"/>
+              </a:fillRef>
+              <a:effectRef idx="2">
+                <a:schemeClr val="accent1"/>
+              </a:effectRef>
+              <a:fontRef idx="minor">
+                <a:schemeClr val="lt1"/>
+              </a:fontRef>
+            </p:style>
+            <p:txBody>
+              <a:bodyPr rtlCol="0" anchor="ctr"/>
+              <a:lstStyle/>
+              <a:p>
+                <a:pPr algn="ctr"/>
+                <a:endParaRPr kumimoji="1" lang="ja-JP" altLang="en-US"/>
+              </a:p>
+            </p:txBody>
+          </p:sp>
+          <p:sp>
+            <p:nvSpPr>
+              <p:cNvPr id="27" name="角丸四角形 26"/>
+              <p:cNvSpPr/>
+              <p:nvPr/>
+            </p:nvSpPr>
+            <p:spPr>
+              <a:xfrm>
+                <a:off x="5667601" y="3225109"/>
+                <a:ext cx="1522149" cy="552982"/>
+              </a:xfrm>
+              <a:prstGeom prst="roundRect">
+                <a:avLst/>
+              </a:prstGeom>
+              <a:solidFill>
+                <a:srgbClr val="008000"/>
+              </a:solidFill>
+              <a:ln w="25400">
+                <a:noFill/>
+              </a:ln>
+              <a:effectLst/>
+            </p:spPr>
+            <p:style>
+              <a:lnRef idx="1">
+                <a:schemeClr val="accent1"/>
+              </a:lnRef>
+              <a:fillRef idx="3">
+                <a:schemeClr val="accent1"/>
+              </a:fillRef>
+              <a:effectRef idx="2">
+                <a:schemeClr val="accent1"/>
+              </a:effectRef>
+              <a:fontRef idx="minor">
+                <a:schemeClr val="lt1"/>
+              </a:fontRef>
+            </p:style>
+            <p:txBody>
+              <a:bodyPr rtlCol="0" anchor="ctr"/>
+              <a:lstStyle/>
+              <a:p>
+                <a:pPr algn="ctr"/>
+                <a:r>
+                  <a:rPr lang="ja-JP" altLang="en-US" sz="1200" dirty="0" smtClean="0">
+                    <a:solidFill>
+                      <a:srgbClr val="FFFFFF"/>
+                    </a:solidFill>
+                    <a:latin typeface="メイリオ"/>
+                    <a:ea typeface="メイリオ"/>
+                    <a:cs typeface="メイリオ"/>
+                  </a:rPr>
+                  <a:t>はい</a:t>
+                </a:r>
+                <a:endParaRPr kumimoji="1" lang="ja-JP" altLang="en-US" sz="1200" dirty="0">
+                  <a:solidFill>
+                    <a:srgbClr val="FFFFFF"/>
+                  </a:solidFill>
+                  <a:latin typeface="メイリオ"/>
+                  <a:ea typeface="メイリオ"/>
+                  <a:cs typeface="メイリオ"/>
+                </a:endParaRPr>
+              </a:p>
+            </p:txBody>
+          </p:sp>
+          <p:sp>
+            <p:nvSpPr>
+              <p:cNvPr id="44" name="テキスト ボックス 43"/>
+              <p:cNvSpPr txBox="1"/>
+              <p:nvPr/>
+            </p:nvSpPr>
+            <p:spPr>
+              <a:xfrm>
+                <a:off x="2058312" y="2119080"/>
+                <a:ext cx="1980029" cy="696730"/>
+              </a:xfrm>
+              <a:prstGeom prst="rect">
+                <a:avLst/>
+              </a:prstGeom>
+              <a:noFill/>
+            </p:spPr>
+            <p:txBody>
+              <a:bodyPr wrap="none" rtlCol="0">
+                <a:spAutoFit/>
+              </a:bodyPr>
+              <a:lstStyle/>
+              <a:p>
+                <a:r>
+                  <a:rPr lang="en-US" altLang="en-US" sz="1400" dirty="0" smtClean="0">
+                    <a:latin typeface="メイリオ"/>
+                    <a:ea typeface="メイリオ"/>
+                    <a:cs typeface="メイリオ"/>
+                  </a:rPr>
+                  <a:t>本当に削除しますか？</a:t>
+                </a:r>
+                <a:endParaRPr kumimoji="1" lang="ja-JP" altLang="en-US" sz="1400" dirty="0">
+                  <a:latin typeface="メイリオ"/>
+                  <a:ea typeface="メイリオ"/>
+                  <a:cs typeface="メイリオ"/>
+                </a:endParaRPr>
+              </a:p>
+            </p:txBody>
+          </p:sp>
+        </p:grpSp>
+        <p:sp>
+          <p:nvSpPr>
+            <p:cNvPr id="52" name="角丸四角形 51"/>
+            <p:cNvSpPr/>
+            <p:nvPr/>
+          </p:nvSpPr>
+          <p:spPr>
+            <a:xfrm>
+              <a:off x="4172054" y="2974685"/>
+              <a:ext cx="823650" cy="244277"/>
+            </a:xfrm>
+            <a:prstGeom prst="roundRect">
+              <a:avLst/>
+            </a:prstGeom>
+            <a:solidFill>
+              <a:srgbClr val="FF0000"/>
+            </a:solidFill>
+            <a:ln w="25400">
+              <a:noFill/>
+            </a:ln>
+            <a:effectLst/>
+          </p:spPr>
+          <p:style>
+            <a:lnRef idx="1">
+              <a:schemeClr val="accent1"/>
+            </a:lnRef>
+            <a:fillRef idx="3">
+              <a:schemeClr val="accent1"/>
+            </a:fillRef>
+            <a:effectRef idx="2">
+              <a:schemeClr val="accent1"/>
+            </a:effectRef>
+            <a:fontRef idx="minor">
+              <a:schemeClr val="lt1"/>
+            </a:fontRef>
+          </p:style>
+          <p:txBody>
+            <a:bodyPr rtlCol="0" anchor="ctr"/>
+            <a:lstStyle/>
+            <a:p>
+              <a:pPr algn="ctr"/>
+              <a:r>
+                <a:rPr lang="ja-JP" altLang="en-US" sz="1200" dirty="0" smtClean="0">
+                  <a:solidFill>
+                    <a:schemeClr val="bg1"/>
+                  </a:solidFill>
+                  <a:latin typeface="メイリオ"/>
+                  <a:ea typeface="メイリオ"/>
+                  <a:cs typeface="メイリオ"/>
+                </a:rPr>
+                <a:t>いいえ</a:t>
+              </a:r>
+              <a:endParaRPr kumimoji="1" lang="ja-JP" altLang="en-US" sz="1200" dirty="0">
+                <a:solidFill>
+                  <a:schemeClr val="bg1"/>
+                </a:solidFill>
+                <a:latin typeface="メイリオ"/>
+                <a:ea typeface="メイリオ"/>
+                <a:cs typeface="メイリオ"/>
+              </a:endParaRPr>
+            </a:p>
+          </p:txBody>
+        </p:sp>
+      </p:grpSp>
+      <p:cxnSp>
+        <p:nvCxnSpPr>
+          <p:cNvPr id="43" name="直線コネクタ 42"/>
+          <p:cNvCxnSpPr>
+            <a:stCxn id="2" idx="1"/>
+            <a:endCxn id="2" idx="3"/>
+          </p:cNvCxnSpPr>
+          <p:nvPr/>
+        </p:nvCxnSpPr>
+        <p:spPr>
+          <a:xfrm>
+            <a:off x="3017146" y="2885255"/>
+            <a:ext cx="2989891" cy="0"/>
+          </a:xfrm>
+          <a:prstGeom prst="line">
+            <a:avLst/>
+          </a:prstGeom>
+          <a:ln>
+            <a:solidFill>
+              <a:schemeClr val="bg1">
+                <a:lumMod val="65000"/>
+              </a:schemeClr>
+            </a:solidFill>
+          </a:ln>
+          <a:effectLst/>
+        </p:spPr>
+        <p:style>
+          <a:lnRef idx="2">
+            <a:schemeClr val="accent1"/>
+          </a:lnRef>
+          <a:fillRef idx="0">
+            <a:schemeClr val="accent1"/>
+          </a:fillRef>
+          <a:effectRef idx="1">
+            <a:schemeClr val="accent1"/>
+          </a:effectRef>
+          <a:fontRef idx="minor">
+            <a:schemeClr val="tx1"/>
+          </a:fontRef>
+        </p:style>
+      </p:cxnSp>
+    </p:spTree>
+    <p:extLst>
+      <p:ext uri="{BB962C8B-B14F-4D97-AF65-F5344CB8AC3E}">
+        <p14:creationId xmlns:p14="http://schemas.microsoft.com/office/powerpoint/2010/main" val="2696243459"/>
       </p:ext>
     </p:extLst>
   </p:cSld>

</xml_diff>

<commit_message>
Algieba show calendar (#114)
* add calendar view

* update external spec

* update version to 4.8.0

* update CHANGELOG.md
</commit_message>
<xml_diff>
--- a/bin/algieba.pptx
+++ b/bin/algieba.pptx
@@ -5,15 +5,16 @@
     <p:sldMasterId id="2147483648" r:id="rId1"/>
   </p:sldMasterIdLst>
   <p:notesMasterIdLst>
-    <p:notesMasterId r:id="rId8"/>
+    <p:notesMasterId r:id="rId9"/>
   </p:notesMasterIdLst>
   <p:sldIdLst>
     <p:sldId id="256" r:id="rId2"/>
     <p:sldId id="263" r:id="rId3"/>
     <p:sldId id="266" r:id="rId4"/>
     <p:sldId id="265" r:id="rId5"/>
-    <p:sldId id="267" r:id="rId6"/>
-    <p:sldId id="268" r:id="rId7"/>
+    <p:sldId id="269" r:id="rId6"/>
+    <p:sldId id="267" r:id="rId7"/>
+    <p:sldId id="268" r:id="rId8"/>
   </p:sldIdLst>
   <p:sldSz cx="9144000" cy="6858000" type="screen4x3"/>
   <p:notesSz cx="6858000" cy="9144000"/>
@@ -197,7 +198,7 @@
           <a:p>
             <a:fld id="{EE82FEE5-269B-9B49-A8C4-823C45BE6055}" type="datetimeFigureOut">
               <a:rPr kumimoji="1" lang="ja-JP" altLang="en-US" smtClean="0"/>
-              <a:t>17/07/29</a:t>
+              <a:t>17/08/05</a:t>
             </a:fld>
             <a:endParaRPr kumimoji="1" lang="ja-JP" altLang="en-US"/>
           </a:p>
@@ -917,6 +918,90 @@
 </p:notes>
 </file>
 
+<file path=ppt/notesSlides/notesSlide6.xml><?xml version="1.0" encoding="utf-8"?>
+<p:notes xmlns:a="http://schemas.openxmlformats.org/drawingml/2006/main" xmlns:r="http://schemas.openxmlformats.org/officeDocument/2006/relationships" xmlns:p="http://schemas.openxmlformats.org/presentationml/2006/main">
+  <p:cSld>
+    <p:spTree>
+      <p:nvGrpSpPr>
+        <p:cNvPr id="1" name=""/>
+        <p:cNvGrpSpPr/>
+        <p:nvPr/>
+      </p:nvGrpSpPr>
+      <p:grpSpPr>
+        <a:xfrm>
+          <a:off x="0" y="0"/>
+          <a:ext cx="0" cy="0"/>
+          <a:chOff x="0" y="0"/>
+          <a:chExt cx="0" cy="0"/>
+        </a:xfrm>
+      </p:grpSpPr>
+      <p:sp>
+        <p:nvSpPr>
+          <p:cNvPr id="2" name="スライド イメージ プレースホルダー 1"/>
+          <p:cNvSpPr>
+            <a:spLocks noGrp="1" noRot="1" noChangeAspect="1"/>
+          </p:cNvSpPr>
+          <p:nvPr>
+            <p:ph type="sldImg"/>
+          </p:nvPr>
+        </p:nvSpPr>
+        <p:spPr/>
+      </p:sp>
+      <p:sp>
+        <p:nvSpPr>
+          <p:cNvPr id="3" name="ノート プレースホルダー 2"/>
+          <p:cNvSpPr>
+            <a:spLocks noGrp="1"/>
+          </p:cNvSpPr>
+          <p:nvPr>
+            <p:ph type="body" idx="1"/>
+          </p:nvPr>
+        </p:nvSpPr>
+        <p:spPr/>
+        <p:txBody>
+          <a:bodyPr/>
+          <a:lstStyle/>
+          <a:p>
+            <a:endParaRPr kumimoji="1" lang="ja-JP" altLang="en-US" dirty="0"/>
+          </a:p>
+        </p:txBody>
+      </p:sp>
+      <p:sp>
+        <p:nvSpPr>
+          <p:cNvPr id="4" name="スライド番号プレースホルダー 3"/>
+          <p:cNvSpPr>
+            <a:spLocks noGrp="1"/>
+          </p:cNvSpPr>
+          <p:nvPr>
+            <p:ph type="sldNum" sz="quarter" idx="10"/>
+          </p:nvPr>
+        </p:nvSpPr>
+        <p:spPr/>
+        <p:txBody>
+          <a:bodyPr/>
+          <a:lstStyle/>
+          <a:p>
+            <a:fld id="{A9E1B25B-30E5-7A42-A56A-DF1A6F86BC06}" type="slidenum">
+              <a:rPr kumimoji="1" lang="ja-JP" altLang="en-US" smtClean="0"/>
+              <a:t>7</a:t>
+            </a:fld>
+            <a:endParaRPr kumimoji="1" lang="ja-JP" altLang="en-US"/>
+          </a:p>
+        </p:txBody>
+      </p:sp>
+    </p:spTree>
+    <p:extLst>
+      <p:ext uri="{BB962C8B-B14F-4D97-AF65-F5344CB8AC3E}">
+        <p14:creationId xmlns:p14="http://schemas.microsoft.com/office/powerpoint/2010/main" val="3631066132"/>
+      </p:ext>
+    </p:extLst>
+  </p:cSld>
+  <p:clrMapOvr>
+    <a:masterClrMapping/>
+  </p:clrMapOvr>
+</p:notes>
+</file>
+
 <file path=ppt/slideLayouts/slideLayout1.xml><?xml version="1.0" encoding="utf-8"?>
 <p:sldLayout xmlns:a="http://schemas.openxmlformats.org/drawingml/2006/main" xmlns:r="http://schemas.openxmlformats.org/officeDocument/2006/relationships" xmlns:p="http://schemas.openxmlformats.org/presentationml/2006/main" type="title" preserve="1">
   <p:cSld name="タイトル スライド">
@@ -1098,7 +1183,7 @@
           <a:p>
             <a:fld id="{3ABA01A1-4899-9944-833D-6A66CDE659CB}" type="datetimeFigureOut">
               <a:rPr kumimoji="1" lang="ja-JP" altLang="en-US" smtClean="0"/>
-              <a:t>17/07/29</a:t>
+              <a:t>17/08/05</a:t>
             </a:fld>
             <a:endParaRPr kumimoji="1" lang="ja-JP" altLang="en-US"/>
           </a:p>
@@ -1300,7 +1385,7 @@
           <a:p>
             <a:fld id="{3ABA01A1-4899-9944-833D-6A66CDE659CB}" type="datetimeFigureOut">
               <a:rPr kumimoji="1" lang="ja-JP" altLang="en-US" smtClean="0"/>
-              <a:t>17/07/29</a:t>
+              <a:t>17/08/05</a:t>
             </a:fld>
             <a:endParaRPr kumimoji="1" lang="ja-JP" altLang="en-US"/>
           </a:p>
@@ -1512,7 +1597,7 @@
           <a:p>
             <a:fld id="{3ABA01A1-4899-9944-833D-6A66CDE659CB}" type="datetimeFigureOut">
               <a:rPr kumimoji="1" lang="ja-JP" altLang="en-US" smtClean="0"/>
-              <a:t>17/07/29</a:t>
+              <a:t>17/08/05</a:t>
             </a:fld>
             <a:endParaRPr kumimoji="1" lang="ja-JP" altLang="en-US"/>
           </a:p>
@@ -1714,7 +1799,7 @@
           <a:p>
             <a:fld id="{3ABA01A1-4899-9944-833D-6A66CDE659CB}" type="datetimeFigureOut">
               <a:rPr kumimoji="1" lang="ja-JP" altLang="en-US" smtClean="0"/>
-              <a:t>17/07/29</a:t>
+              <a:t>17/08/05</a:t>
             </a:fld>
             <a:endParaRPr kumimoji="1" lang="ja-JP" altLang="en-US"/>
           </a:p>
@@ -1960,7 +2045,7 @@
           <a:p>
             <a:fld id="{3ABA01A1-4899-9944-833D-6A66CDE659CB}" type="datetimeFigureOut">
               <a:rPr kumimoji="1" lang="ja-JP" altLang="en-US" smtClean="0"/>
-              <a:t>17/07/29</a:t>
+              <a:t>17/08/05</a:t>
             </a:fld>
             <a:endParaRPr kumimoji="1" lang="ja-JP" altLang="en-US"/>
           </a:p>
@@ -2312,7 +2397,7 @@
           <a:p>
             <a:fld id="{3ABA01A1-4899-9944-833D-6A66CDE659CB}" type="datetimeFigureOut">
               <a:rPr kumimoji="1" lang="ja-JP" altLang="en-US" smtClean="0"/>
-              <a:t>17/07/29</a:t>
+              <a:t>17/08/05</a:t>
             </a:fld>
             <a:endParaRPr kumimoji="1" lang="ja-JP" altLang="en-US"/>
           </a:p>
@@ -2798,7 +2883,7 @@
           <a:p>
             <a:fld id="{3ABA01A1-4899-9944-833D-6A66CDE659CB}" type="datetimeFigureOut">
               <a:rPr kumimoji="1" lang="ja-JP" altLang="en-US" smtClean="0"/>
-              <a:t>17/07/29</a:t>
+              <a:t>17/08/05</a:t>
             </a:fld>
             <a:endParaRPr kumimoji="1" lang="ja-JP" altLang="en-US"/>
           </a:p>
@@ -2916,7 +3001,7 @@
           <a:p>
             <a:fld id="{3ABA01A1-4899-9944-833D-6A66CDE659CB}" type="datetimeFigureOut">
               <a:rPr kumimoji="1" lang="ja-JP" altLang="en-US" smtClean="0"/>
-              <a:t>17/07/29</a:t>
+              <a:t>17/08/05</a:t>
             </a:fld>
             <a:endParaRPr kumimoji="1" lang="ja-JP" altLang="en-US"/>
           </a:p>
@@ -3011,7 +3096,7 @@
           <a:p>
             <a:fld id="{3ABA01A1-4899-9944-833D-6A66CDE659CB}" type="datetimeFigureOut">
               <a:rPr kumimoji="1" lang="ja-JP" altLang="en-US" smtClean="0"/>
-              <a:t>17/07/29</a:t>
+              <a:t>17/08/05</a:t>
             </a:fld>
             <a:endParaRPr kumimoji="1" lang="ja-JP" altLang="en-US"/>
           </a:p>
@@ -3320,7 +3405,7 @@
           <a:p>
             <a:fld id="{3ABA01A1-4899-9944-833D-6A66CDE659CB}" type="datetimeFigureOut">
               <a:rPr kumimoji="1" lang="ja-JP" altLang="en-US" smtClean="0"/>
-              <a:t>17/07/29</a:t>
+              <a:t>17/08/05</a:t>
             </a:fld>
             <a:endParaRPr kumimoji="1" lang="ja-JP" altLang="en-US"/>
           </a:p>
@@ -3573,7 +3658,7 @@
           <a:p>
             <a:fld id="{3ABA01A1-4899-9944-833D-6A66CDE659CB}" type="datetimeFigureOut">
               <a:rPr kumimoji="1" lang="ja-JP" altLang="en-US" smtClean="0"/>
-              <a:t>17/07/29</a:t>
+              <a:t>17/08/05</a:t>
             </a:fld>
             <a:endParaRPr kumimoji="1" lang="ja-JP" altLang="en-US"/>
           </a:p>
@@ -3818,7 +3903,7 @@
           <a:p>
             <a:fld id="{3ABA01A1-4899-9944-833D-6A66CDE659CB}" type="datetimeFigureOut">
               <a:rPr kumimoji="1" lang="ja-JP" altLang="en-US" smtClean="0"/>
-              <a:t>17/07/29</a:t>
+              <a:t>17/08/05</a:t>
             </a:fld>
             <a:endParaRPr kumimoji="1" lang="ja-JP" altLang="en-US"/>
           </a:p>
@@ -4262,15 +4347,11 @@
             </a:r>
             <a:r>
               <a:rPr lang="en-US" altLang="ja-JP" sz="2800" dirty="0" smtClean="0"/>
-              <a:t>2017/07</a:t>
+              <a:t>2017/</a:t>
             </a:r>
             <a:r>
               <a:rPr lang="en-US" altLang="ja-JP" sz="2800" dirty="0" smtClean="0"/>
-              <a:t>/</a:t>
-            </a:r>
-            <a:r>
-              <a:rPr lang="en-US" altLang="ja-JP" sz="2800" dirty="0" smtClean="0"/>
-              <a:t>29</a:t>
+              <a:t>08/05</a:t>
             </a:r>
             <a:r>
               <a:rPr lang="en-US" altLang="ja-JP" sz="2800" dirty="0" smtClean="0"/>
@@ -4289,7 +4370,7 @@
             </a:r>
             <a:r>
               <a:rPr lang="en-US" altLang="ja-JP" sz="2800" dirty="0" smtClean="0"/>
-              <a:t>2.6.0</a:t>
+              <a:t>2.7.0</a:t>
             </a:r>
             <a:endParaRPr kumimoji="1" lang="ja-JP" altLang="en-US" dirty="0"/>
           </a:p>
@@ -4372,7 +4453,7 @@
         <p:spPr>
           <a:xfrm>
             <a:off x="646545" y="969818"/>
-            <a:ext cx="8071440" cy="4524316"/>
+            <a:ext cx="8071440" cy="4801315"/>
           </a:xfrm>
           <a:prstGeom prst="rect">
             <a:avLst/>
@@ -4512,7 +4593,34 @@
                 <a:ea typeface="メイリオ"/>
                 <a:cs typeface="メイリオ"/>
               </a:rPr>
-              <a:t>画面上部の入力フォームから収支情報を入力する</a:t>
+              <a:t>画面上部の入力フォームから収支情報を入力</a:t>
+            </a:r>
+            <a:r>
+              <a:rPr lang="ja-JP" altLang="en-US" dirty="0" smtClean="0">
+                <a:latin typeface="メイリオ"/>
+                <a:ea typeface="メイリオ"/>
+                <a:cs typeface="メイリオ"/>
+              </a:rPr>
+              <a:t>する</a:t>
+            </a:r>
+            <a:endParaRPr lang="en-US" altLang="ja-JP" dirty="0" smtClean="0">
+              <a:latin typeface="メイリオ"/>
+              <a:ea typeface="メイリオ"/>
+              <a:cs typeface="メイリオ"/>
+            </a:endParaRPr>
+          </a:p>
+          <a:p>
+            <a:pPr marL="1200150" lvl="2" indent="-285750">
+              <a:buFont typeface="Arial"/>
+              <a:buChar char="•"/>
+            </a:pPr>
+            <a:r>
+              <a:rPr lang="ja-JP" altLang="en-US" dirty="0" smtClean="0">
+                <a:latin typeface="メイリオ"/>
+                <a:ea typeface="メイリオ"/>
+                <a:cs typeface="メイリオ"/>
+              </a:rPr>
+              <a:t>日付は直接入力不可で、表示されるカレンダーから選択する</a:t>
             </a:r>
             <a:endParaRPr lang="en-US" altLang="ja-JP" dirty="0">
               <a:latin typeface="メイリオ"/>
@@ -5359,7 +5467,7 @@
           <p:nvPr>
             <p:extLst>
               <p:ext uri="{D42A27DB-BD31-4B8C-83A1-F6EECF244321}">
-                <p14:modId xmlns:p14="http://schemas.microsoft.com/office/powerpoint/2010/main" val="636032545"/>
+                <p14:modId xmlns:p14="http://schemas.microsoft.com/office/powerpoint/2010/main" val="588428799"/>
               </p:ext>
             </p:extLst>
           </p:nvPr>
@@ -6982,456 +7090,306 @@
           </a:p>
         </p:txBody>
       </p:sp>
-      <p:sp>
-        <p:nvSpPr>
-          <p:cNvPr id="2" name="円柱 1"/>
-          <p:cNvSpPr/>
+      <p:pic>
+        <p:nvPicPr>
+          <p:cNvPr id="5" name="図 4" descr="trash.png"/>
+          <p:cNvPicPr>
+            <a:picLocks noChangeAspect="1"/>
+          </p:cNvPicPr>
           <p:nvPr/>
-        </p:nvSpPr>
+        </p:nvPicPr>
+        <p:blipFill>
+          <a:blip r:embed="rId3">
+            <a:extLst>
+              <a:ext uri="{28A0092B-C50C-407E-A947-70E740481C1C}">
+                <a14:useLocalDpi xmlns:a14="http://schemas.microsoft.com/office/drawing/2010/main" val="0"/>
+              </a:ext>
+            </a:extLst>
+          </a:blip>
+          <a:stretch>
+            <a:fillRect/>
+          </a:stretch>
+        </p:blipFill>
         <p:spPr>
           <a:xfrm>
-            <a:off x="8017036" y="2447634"/>
-            <a:ext cx="173182" cy="288636"/>
-          </a:xfrm>
-          <a:prstGeom prst="can">
+            <a:off x="7967360" y="2463737"/>
+            <a:ext cx="272533" cy="272533"/>
+          </a:xfrm>
+          <a:prstGeom prst="rect">
             <a:avLst/>
           </a:prstGeom>
-          <a:noFill/>
-          <a:ln w="25400">
-            <a:solidFill>
-              <a:schemeClr val="tx1"/>
-            </a:solidFill>
-          </a:ln>
-          <a:effectLst/>
-        </p:spPr>
-        <p:style>
-          <a:lnRef idx="1">
-            <a:schemeClr val="accent1"/>
-          </a:lnRef>
-          <a:fillRef idx="3">
-            <a:schemeClr val="accent1"/>
-          </a:fillRef>
-          <a:effectRef idx="2">
-            <a:schemeClr val="accent1"/>
-          </a:effectRef>
-          <a:fontRef idx="minor">
-            <a:schemeClr val="lt1"/>
-          </a:fontRef>
-        </p:style>
-        <p:txBody>
-          <a:bodyPr rtlCol="0" anchor="ctr"/>
-          <a:lstStyle/>
-          <a:p>
-            <a:pPr algn="ctr"/>
-            <a:endParaRPr kumimoji="1" lang="ja-JP" altLang="en-US"/>
-          </a:p>
-        </p:txBody>
-      </p:sp>
-      <p:sp>
-        <p:nvSpPr>
-          <p:cNvPr id="29" name="円柱 28"/>
-          <p:cNvSpPr/>
+        </p:spPr>
+      </p:pic>
+      <p:pic>
+        <p:nvPicPr>
+          <p:cNvPr id="39" name="図 38" descr="trash.png"/>
+          <p:cNvPicPr>
+            <a:picLocks noChangeAspect="1"/>
+          </p:cNvPicPr>
           <p:nvPr/>
-        </p:nvSpPr>
+        </p:nvPicPr>
+        <p:blipFill>
+          <a:blip r:embed="rId3">
+            <a:extLst>
+              <a:ext uri="{28A0092B-C50C-407E-A947-70E740481C1C}">
+                <a14:useLocalDpi xmlns:a14="http://schemas.microsoft.com/office/drawing/2010/main" val="0"/>
+              </a:ext>
+            </a:extLst>
+          </a:blip>
+          <a:stretch>
+            <a:fillRect/>
+          </a:stretch>
+        </p:blipFill>
         <p:spPr>
           <a:xfrm>
-            <a:off x="8017036" y="2856340"/>
-            <a:ext cx="173182" cy="288636"/>
-          </a:xfrm>
-          <a:prstGeom prst="can">
+            <a:off x="7967360" y="2865577"/>
+            <a:ext cx="272533" cy="272533"/>
+          </a:xfrm>
+          <a:prstGeom prst="rect">
             <a:avLst/>
           </a:prstGeom>
-          <a:noFill/>
-          <a:ln w="25400">
-            <a:solidFill>
-              <a:schemeClr val="tx1"/>
-            </a:solidFill>
-          </a:ln>
-          <a:effectLst/>
-        </p:spPr>
-        <p:style>
-          <a:lnRef idx="1">
-            <a:schemeClr val="accent1"/>
-          </a:lnRef>
-          <a:fillRef idx="3">
-            <a:schemeClr val="accent1"/>
-          </a:fillRef>
-          <a:effectRef idx="2">
-            <a:schemeClr val="accent1"/>
-          </a:effectRef>
-          <a:fontRef idx="minor">
-            <a:schemeClr val="lt1"/>
-          </a:fontRef>
-        </p:style>
-        <p:txBody>
-          <a:bodyPr rtlCol="0" anchor="ctr"/>
-          <a:lstStyle/>
-          <a:p>
-            <a:pPr algn="ctr"/>
-            <a:endParaRPr kumimoji="1" lang="ja-JP" altLang="en-US"/>
-          </a:p>
-        </p:txBody>
-      </p:sp>
-      <p:sp>
-        <p:nvSpPr>
-          <p:cNvPr id="30" name="円柱 29"/>
-          <p:cNvSpPr/>
+        </p:spPr>
+      </p:pic>
+      <p:pic>
+        <p:nvPicPr>
+          <p:cNvPr id="40" name="図 39" descr="trash.png"/>
+          <p:cNvPicPr>
+            <a:picLocks noChangeAspect="1"/>
+          </p:cNvPicPr>
           <p:nvPr/>
-        </p:nvSpPr>
+        </p:nvPicPr>
+        <p:blipFill>
+          <a:blip r:embed="rId3">
+            <a:extLst>
+              <a:ext uri="{28A0092B-C50C-407E-A947-70E740481C1C}">
+                <a14:useLocalDpi xmlns:a14="http://schemas.microsoft.com/office/drawing/2010/main" val="0"/>
+              </a:ext>
+            </a:extLst>
+          </a:blip>
+          <a:stretch>
+            <a:fillRect/>
+          </a:stretch>
+        </p:blipFill>
         <p:spPr>
           <a:xfrm>
-            <a:off x="8017036" y="3235027"/>
-            <a:ext cx="173182" cy="288636"/>
-          </a:xfrm>
-          <a:prstGeom prst="can">
+            <a:off x="7967360" y="3244330"/>
+            <a:ext cx="272533" cy="272533"/>
+          </a:xfrm>
+          <a:prstGeom prst="rect">
             <a:avLst/>
           </a:prstGeom>
-          <a:noFill/>
-          <a:ln w="25400">
-            <a:solidFill>
-              <a:schemeClr val="tx1"/>
-            </a:solidFill>
-          </a:ln>
-          <a:effectLst/>
-        </p:spPr>
-        <p:style>
-          <a:lnRef idx="1">
-            <a:schemeClr val="accent1"/>
-          </a:lnRef>
-          <a:fillRef idx="3">
-            <a:schemeClr val="accent1"/>
-          </a:fillRef>
-          <a:effectRef idx="2">
-            <a:schemeClr val="accent1"/>
-          </a:effectRef>
-          <a:fontRef idx="minor">
-            <a:schemeClr val="lt1"/>
-          </a:fontRef>
-        </p:style>
-        <p:txBody>
-          <a:bodyPr rtlCol="0" anchor="ctr"/>
-          <a:lstStyle/>
-          <a:p>
-            <a:pPr algn="ctr"/>
-            <a:endParaRPr kumimoji="1" lang="ja-JP" altLang="en-US"/>
-          </a:p>
-        </p:txBody>
-      </p:sp>
-      <p:sp>
-        <p:nvSpPr>
-          <p:cNvPr id="31" name="円柱 30"/>
-          <p:cNvSpPr/>
+        </p:spPr>
+      </p:pic>
+      <p:pic>
+        <p:nvPicPr>
+          <p:cNvPr id="41" name="図 40" descr="trash.png"/>
+          <p:cNvPicPr>
+            <a:picLocks noChangeAspect="1"/>
+          </p:cNvPicPr>
           <p:nvPr/>
-        </p:nvSpPr>
+        </p:nvPicPr>
+        <p:blipFill>
+          <a:blip r:embed="rId3">
+            <a:extLst>
+              <a:ext uri="{28A0092B-C50C-407E-A947-70E740481C1C}">
+                <a14:useLocalDpi xmlns:a14="http://schemas.microsoft.com/office/drawing/2010/main" val="0"/>
+              </a:ext>
+            </a:extLst>
+          </a:blip>
+          <a:stretch>
+            <a:fillRect/>
+          </a:stretch>
+        </p:blipFill>
         <p:spPr>
           <a:xfrm>
-            <a:off x="8017036" y="3624105"/>
-            <a:ext cx="173182" cy="288636"/>
-          </a:xfrm>
-          <a:prstGeom prst="can">
+            <a:off x="7967360" y="3646170"/>
+            <a:ext cx="272533" cy="272533"/>
+          </a:xfrm>
+          <a:prstGeom prst="rect">
             <a:avLst/>
           </a:prstGeom>
-          <a:noFill/>
-          <a:ln w="25400">
-            <a:solidFill>
-              <a:schemeClr val="tx1"/>
-            </a:solidFill>
-          </a:ln>
-          <a:effectLst/>
-        </p:spPr>
-        <p:style>
-          <a:lnRef idx="1">
-            <a:schemeClr val="accent1"/>
-          </a:lnRef>
-          <a:fillRef idx="3">
-            <a:schemeClr val="accent1"/>
-          </a:fillRef>
-          <a:effectRef idx="2">
-            <a:schemeClr val="accent1"/>
-          </a:effectRef>
-          <a:fontRef idx="minor">
-            <a:schemeClr val="lt1"/>
-          </a:fontRef>
-        </p:style>
-        <p:txBody>
-          <a:bodyPr rtlCol="0" anchor="ctr"/>
-          <a:lstStyle/>
-          <a:p>
-            <a:pPr algn="ctr"/>
-            <a:endParaRPr kumimoji="1" lang="ja-JP" altLang="en-US"/>
-          </a:p>
-        </p:txBody>
-      </p:sp>
-      <p:sp>
-        <p:nvSpPr>
-          <p:cNvPr id="32" name="円柱 31"/>
-          <p:cNvSpPr/>
+        </p:spPr>
+      </p:pic>
+      <p:pic>
+        <p:nvPicPr>
+          <p:cNvPr id="42" name="図 41" descr="trash.png"/>
+          <p:cNvPicPr>
+            <a:picLocks noChangeAspect="1"/>
+          </p:cNvPicPr>
           <p:nvPr/>
-        </p:nvSpPr>
+        </p:nvPicPr>
+        <p:blipFill>
+          <a:blip r:embed="rId3">
+            <a:extLst>
+              <a:ext uri="{28A0092B-C50C-407E-A947-70E740481C1C}">
+                <a14:useLocalDpi xmlns:a14="http://schemas.microsoft.com/office/drawing/2010/main" val="0"/>
+              </a:ext>
+            </a:extLst>
+          </a:blip>
+          <a:stretch>
+            <a:fillRect/>
+          </a:stretch>
+        </p:blipFill>
         <p:spPr>
           <a:xfrm>
-            <a:off x="8017036" y="4008555"/>
-            <a:ext cx="173182" cy="288636"/>
-          </a:xfrm>
-          <a:prstGeom prst="can">
+            <a:off x="7966108" y="4020421"/>
+            <a:ext cx="272533" cy="272533"/>
+          </a:xfrm>
+          <a:prstGeom prst="rect">
             <a:avLst/>
           </a:prstGeom>
-          <a:noFill/>
-          <a:ln w="25400">
-            <a:solidFill>
-              <a:schemeClr val="tx1"/>
-            </a:solidFill>
-          </a:ln>
-          <a:effectLst/>
-        </p:spPr>
-        <p:style>
-          <a:lnRef idx="1">
-            <a:schemeClr val="accent1"/>
-          </a:lnRef>
-          <a:fillRef idx="3">
-            <a:schemeClr val="accent1"/>
-          </a:fillRef>
-          <a:effectRef idx="2">
-            <a:schemeClr val="accent1"/>
-          </a:effectRef>
-          <a:fontRef idx="minor">
-            <a:schemeClr val="lt1"/>
-          </a:fontRef>
-        </p:style>
-        <p:txBody>
-          <a:bodyPr rtlCol="0" anchor="ctr"/>
-          <a:lstStyle/>
-          <a:p>
-            <a:pPr algn="ctr"/>
-            <a:endParaRPr kumimoji="1" lang="ja-JP" altLang="en-US"/>
-          </a:p>
-        </p:txBody>
-      </p:sp>
-      <p:sp>
-        <p:nvSpPr>
-          <p:cNvPr id="33" name="円柱 32"/>
-          <p:cNvSpPr/>
+        </p:spPr>
+      </p:pic>
+      <p:pic>
+        <p:nvPicPr>
+          <p:cNvPr id="43" name="図 42" descr="trash.png"/>
+          <p:cNvPicPr>
+            <a:picLocks noChangeAspect="1"/>
+          </p:cNvPicPr>
           <p:nvPr/>
-        </p:nvSpPr>
+        </p:nvPicPr>
+        <p:blipFill>
+          <a:blip r:embed="rId3">
+            <a:extLst>
+              <a:ext uri="{28A0092B-C50C-407E-A947-70E740481C1C}">
+                <a14:useLocalDpi xmlns:a14="http://schemas.microsoft.com/office/drawing/2010/main" val="0"/>
+              </a:ext>
+            </a:extLst>
+          </a:blip>
+          <a:stretch>
+            <a:fillRect/>
+          </a:stretch>
+        </p:blipFill>
         <p:spPr>
           <a:xfrm>
-            <a:off x="8017036" y="4397633"/>
-            <a:ext cx="173182" cy="288636"/>
-          </a:xfrm>
-          <a:prstGeom prst="can">
+            <a:off x="7966108" y="4422261"/>
+            <a:ext cx="272533" cy="272533"/>
+          </a:xfrm>
+          <a:prstGeom prst="rect">
             <a:avLst/>
           </a:prstGeom>
-          <a:noFill/>
-          <a:ln w="25400">
-            <a:solidFill>
-              <a:schemeClr val="tx1"/>
-            </a:solidFill>
-          </a:ln>
-          <a:effectLst/>
-        </p:spPr>
-        <p:style>
-          <a:lnRef idx="1">
-            <a:schemeClr val="accent1"/>
-          </a:lnRef>
-          <a:fillRef idx="3">
-            <a:schemeClr val="accent1"/>
-          </a:fillRef>
-          <a:effectRef idx="2">
-            <a:schemeClr val="accent1"/>
-          </a:effectRef>
-          <a:fontRef idx="minor">
-            <a:schemeClr val="lt1"/>
-          </a:fontRef>
-        </p:style>
-        <p:txBody>
-          <a:bodyPr rtlCol="0" anchor="ctr"/>
-          <a:lstStyle/>
-          <a:p>
-            <a:pPr algn="ctr"/>
-            <a:endParaRPr kumimoji="1" lang="ja-JP" altLang="en-US"/>
-          </a:p>
-        </p:txBody>
-      </p:sp>
-      <p:sp>
-        <p:nvSpPr>
-          <p:cNvPr id="34" name="円柱 33"/>
-          <p:cNvSpPr/>
+        </p:spPr>
+      </p:pic>
+      <p:pic>
+        <p:nvPicPr>
+          <p:cNvPr id="44" name="図 43" descr="trash.png"/>
+          <p:cNvPicPr>
+            <a:picLocks noChangeAspect="1"/>
+          </p:cNvPicPr>
           <p:nvPr/>
-        </p:nvSpPr>
+        </p:nvPicPr>
+        <p:blipFill>
+          <a:blip r:embed="rId3">
+            <a:extLst>
+              <a:ext uri="{28A0092B-C50C-407E-A947-70E740481C1C}">
+                <a14:useLocalDpi xmlns:a14="http://schemas.microsoft.com/office/drawing/2010/main" val="0"/>
+              </a:ext>
+            </a:extLst>
+          </a:blip>
+          <a:stretch>
+            <a:fillRect/>
+          </a:stretch>
+        </p:blipFill>
         <p:spPr>
           <a:xfrm>
-            <a:off x="8017036" y="4782067"/>
-            <a:ext cx="173182" cy="288636"/>
-          </a:xfrm>
-          <a:prstGeom prst="can">
+            <a:off x="7967360" y="4799059"/>
+            <a:ext cx="272533" cy="272533"/>
+          </a:xfrm>
+          <a:prstGeom prst="rect">
             <a:avLst/>
           </a:prstGeom>
-          <a:noFill/>
-          <a:ln w="25400">
-            <a:solidFill>
-              <a:schemeClr val="tx1"/>
-            </a:solidFill>
-          </a:ln>
-          <a:effectLst/>
-        </p:spPr>
-        <p:style>
-          <a:lnRef idx="1">
-            <a:schemeClr val="accent1"/>
-          </a:lnRef>
-          <a:fillRef idx="3">
-            <a:schemeClr val="accent1"/>
-          </a:fillRef>
-          <a:effectRef idx="2">
-            <a:schemeClr val="accent1"/>
-          </a:effectRef>
-          <a:fontRef idx="minor">
-            <a:schemeClr val="lt1"/>
-          </a:fontRef>
-        </p:style>
-        <p:txBody>
-          <a:bodyPr rtlCol="0" anchor="ctr"/>
-          <a:lstStyle/>
-          <a:p>
-            <a:pPr algn="ctr"/>
-            <a:endParaRPr kumimoji="1" lang="ja-JP" altLang="en-US"/>
-          </a:p>
-        </p:txBody>
-      </p:sp>
-      <p:sp>
-        <p:nvSpPr>
-          <p:cNvPr id="35" name="円柱 34"/>
-          <p:cNvSpPr/>
+        </p:spPr>
+      </p:pic>
+      <p:pic>
+        <p:nvPicPr>
+          <p:cNvPr id="45" name="図 44" descr="trash.png"/>
+          <p:cNvPicPr>
+            <a:picLocks noChangeAspect="1"/>
+          </p:cNvPicPr>
           <p:nvPr/>
-        </p:nvSpPr>
+        </p:nvPicPr>
+        <p:blipFill>
+          <a:blip r:embed="rId3">
+            <a:extLst>
+              <a:ext uri="{28A0092B-C50C-407E-A947-70E740481C1C}">
+                <a14:useLocalDpi xmlns:a14="http://schemas.microsoft.com/office/drawing/2010/main" val="0"/>
+              </a:ext>
+            </a:extLst>
+          </a:blip>
+          <a:stretch>
+            <a:fillRect/>
+          </a:stretch>
+        </p:blipFill>
         <p:spPr>
           <a:xfrm>
-            <a:off x="8017036" y="5169935"/>
-            <a:ext cx="173182" cy="288636"/>
-          </a:xfrm>
-          <a:prstGeom prst="can">
+            <a:off x="7967360" y="5200899"/>
+            <a:ext cx="272533" cy="272533"/>
+          </a:xfrm>
+          <a:prstGeom prst="rect">
             <a:avLst/>
           </a:prstGeom>
-          <a:noFill/>
-          <a:ln w="25400">
-            <a:solidFill>
-              <a:schemeClr val="tx1"/>
-            </a:solidFill>
-          </a:ln>
-          <a:effectLst/>
-        </p:spPr>
-        <p:style>
-          <a:lnRef idx="1">
-            <a:schemeClr val="accent1"/>
-          </a:lnRef>
-          <a:fillRef idx="3">
-            <a:schemeClr val="accent1"/>
-          </a:fillRef>
-          <a:effectRef idx="2">
-            <a:schemeClr val="accent1"/>
-          </a:effectRef>
-          <a:fontRef idx="minor">
-            <a:schemeClr val="lt1"/>
-          </a:fontRef>
-        </p:style>
-        <p:txBody>
-          <a:bodyPr rtlCol="0" anchor="ctr"/>
-          <a:lstStyle/>
-          <a:p>
-            <a:pPr algn="ctr"/>
-            <a:endParaRPr kumimoji="1" lang="ja-JP" altLang="en-US"/>
-          </a:p>
-        </p:txBody>
-      </p:sp>
-      <p:sp>
-        <p:nvSpPr>
-          <p:cNvPr id="36" name="円柱 35"/>
-          <p:cNvSpPr/>
+        </p:spPr>
+      </p:pic>
+      <p:pic>
+        <p:nvPicPr>
+          <p:cNvPr id="46" name="図 45" descr="trash.png"/>
+          <p:cNvPicPr>
+            <a:picLocks noChangeAspect="1"/>
+          </p:cNvPicPr>
           <p:nvPr/>
-        </p:nvSpPr>
+        </p:nvPicPr>
+        <p:blipFill>
+          <a:blip r:embed="rId3">
+            <a:extLst>
+              <a:ext uri="{28A0092B-C50C-407E-A947-70E740481C1C}">
+                <a14:useLocalDpi xmlns:a14="http://schemas.microsoft.com/office/drawing/2010/main" val="0"/>
+              </a:ext>
+            </a:extLst>
+          </a:blip>
+          <a:stretch>
+            <a:fillRect/>
+          </a:stretch>
+        </p:blipFill>
         <p:spPr>
           <a:xfrm>
-            <a:off x="8017036" y="5559013"/>
-            <a:ext cx="173182" cy="288636"/>
-          </a:xfrm>
-          <a:prstGeom prst="can">
+            <a:off x="7966108" y="5558835"/>
+            <a:ext cx="272533" cy="272533"/>
+          </a:xfrm>
+          <a:prstGeom prst="rect">
             <a:avLst/>
           </a:prstGeom>
-          <a:noFill/>
-          <a:ln w="25400">
-            <a:solidFill>
-              <a:schemeClr val="tx1"/>
-            </a:solidFill>
-          </a:ln>
-          <a:effectLst/>
-        </p:spPr>
-        <p:style>
-          <a:lnRef idx="1">
-            <a:schemeClr val="accent1"/>
-          </a:lnRef>
-          <a:fillRef idx="3">
-            <a:schemeClr val="accent1"/>
-          </a:fillRef>
-          <a:effectRef idx="2">
-            <a:schemeClr val="accent1"/>
-          </a:effectRef>
-          <a:fontRef idx="minor">
-            <a:schemeClr val="lt1"/>
-          </a:fontRef>
-        </p:style>
-        <p:txBody>
-          <a:bodyPr rtlCol="0" anchor="ctr"/>
-          <a:lstStyle/>
-          <a:p>
-            <a:pPr algn="ctr"/>
-            <a:endParaRPr kumimoji="1" lang="ja-JP" altLang="en-US"/>
-          </a:p>
-        </p:txBody>
-      </p:sp>
-      <p:sp>
-        <p:nvSpPr>
-          <p:cNvPr id="37" name="円柱 36"/>
-          <p:cNvSpPr/>
+        </p:spPr>
+      </p:pic>
+      <p:pic>
+        <p:nvPicPr>
+          <p:cNvPr id="47" name="図 46" descr="trash.png"/>
+          <p:cNvPicPr>
+            <a:picLocks noChangeAspect="1"/>
+          </p:cNvPicPr>
           <p:nvPr/>
-        </p:nvSpPr>
+        </p:nvPicPr>
+        <p:blipFill>
+          <a:blip r:embed="rId3">
+            <a:extLst>
+              <a:ext uri="{28A0092B-C50C-407E-A947-70E740481C1C}">
+                <a14:useLocalDpi xmlns:a14="http://schemas.microsoft.com/office/drawing/2010/main" val="0"/>
+              </a:ext>
+            </a:extLst>
+          </a:blip>
+          <a:stretch>
+            <a:fillRect/>
+          </a:stretch>
+        </p:blipFill>
         <p:spPr>
           <a:xfrm>
-            <a:off x="8017036" y="5930778"/>
-            <a:ext cx="173182" cy="288636"/>
-          </a:xfrm>
-          <a:prstGeom prst="can">
+            <a:off x="7966108" y="5960675"/>
+            <a:ext cx="272533" cy="272533"/>
+          </a:xfrm>
+          <a:prstGeom prst="rect">
             <a:avLst/>
           </a:prstGeom>
-          <a:noFill/>
-          <a:ln w="25400">
-            <a:solidFill>
-              <a:schemeClr val="tx1"/>
-            </a:solidFill>
-          </a:ln>
-          <a:effectLst/>
-        </p:spPr>
-        <p:style>
-          <a:lnRef idx="1">
-            <a:schemeClr val="accent1"/>
-          </a:lnRef>
-          <a:fillRef idx="3">
-            <a:schemeClr val="accent1"/>
-          </a:fillRef>
-          <a:effectRef idx="2">
-            <a:schemeClr val="accent1"/>
-          </a:effectRef>
-          <a:fontRef idx="minor">
-            <a:schemeClr val="lt1"/>
-          </a:fontRef>
-        </p:style>
-        <p:txBody>
-          <a:bodyPr rtlCol="0" anchor="ctr"/>
-          <a:lstStyle/>
-          <a:p>
-            <a:pPr algn="ctr"/>
-            <a:endParaRPr kumimoji="1" lang="ja-JP" altLang="en-US"/>
-          </a:p>
-        </p:txBody>
-      </p:sp>
+        </p:spPr>
+      </p:pic>
     </p:spTree>
     <p:extLst>
       <p:ext uri="{BB962C8B-B14F-4D97-AF65-F5344CB8AC3E}">
@@ -7471,6 +7429,234 @@
         <p:spPr>
           <a:xfrm>
             <a:off x="200532" y="187161"/>
+            <a:ext cx="4852610" cy="523220"/>
+          </a:xfrm>
+          <a:prstGeom prst="rect">
+            <a:avLst/>
+          </a:prstGeom>
+          <a:noFill/>
+        </p:spPr>
+        <p:txBody>
+          <a:bodyPr wrap="none" rtlCol="0">
+            <a:spAutoFit/>
+          </a:bodyPr>
+          <a:lstStyle/>
+          <a:p>
+            <a:r>
+              <a:rPr lang="ja-JP" altLang="en-US" sz="2800" dirty="0" smtClean="0">
+                <a:latin typeface="メイリオ"/>
+                <a:ea typeface="メイリオ"/>
+                <a:cs typeface="メイリオ"/>
+              </a:rPr>
+              <a:t>管理</a:t>
+            </a:r>
+            <a:r>
+              <a:rPr lang="ja-JP" altLang="en-US" sz="2800" dirty="0" smtClean="0">
+                <a:latin typeface="メイリオ"/>
+                <a:ea typeface="メイリオ"/>
+                <a:cs typeface="メイリオ"/>
+              </a:rPr>
+              <a:t>画面</a:t>
+            </a:r>
+            <a:r>
+              <a:rPr lang="ja-JP" altLang="en-US" sz="2800" dirty="0" smtClean="0">
+                <a:latin typeface="メイリオ"/>
+                <a:ea typeface="メイリオ"/>
+                <a:cs typeface="メイリオ"/>
+              </a:rPr>
+              <a:t>（カレンダー表示）</a:t>
+            </a:r>
+            <a:endParaRPr kumimoji="1" lang="ja-JP" altLang="en-US" sz="2000" dirty="0">
+              <a:latin typeface="メイリオ"/>
+              <a:ea typeface="メイリオ"/>
+              <a:cs typeface="メイリオ"/>
+            </a:endParaRPr>
+          </a:p>
+        </p:txBody>
+      </p:sp>
+      <p:grpSp>
+        <p:nvGrpSpPr>
+          <p:cNvPr id="8" name="図形グループ 7"/>
+          <p:cNvGrpSpPr/>
+          <p:nvPr/>
+        </p:nvGrpSpPr>
+        <p:grpSpPr>
+          <a:xfrm>
+            <a:off x="450272" y="803189"/>
+            <a:ext cx="7666183" cy="5128055"/>
+            <a:chOff x="450272" y="803189"/>
+            <a:chExt cx="7666183" cy="5128055"/>
+          </a:xfrm>
+        </p:grpSpPr>
+        <p:pic>
+          <p:nvPicPr>
+            <p:cNvPr id="5" name="図 4" descr="スクリーンショット（0029-08-05 8.47.25）.png"/>
+            <p:cNvPicPr>
+              <a:picLocks noChangeAspect="1"/>
+            </p:cNvPicPr>
+            <p:nvPr/>
+          </p:nvPicPr>
+          <p:blipFill>
+            <a:blip r:embed="rId3">
+              <a:extLst>
+                <a:ext uri="{28A0092B-C50C-407E-A947-70E740481C1C}">
+                  <a14:useLocalDpi xmlns:a14="http://schemas.microsoft.com/office/drawing/2010/main" val="0"/>
+                </a:ext>
+              </a:extLst>
+            </a:blip>
+            <a:stretch>
+              <a:fillRect/>
+            </a:stretch>
+          </p:blipFill>
+          <p:spPr>
+            <a:xfrm>
+              <a:off x="450272" y="803189"/>
+              <a:ext cx="7666183" cy="5128055"/>
+            </a:xfrm>
+            <a:prstGeom prst="rect">
+              <a:avLst/>
+            </a:prstGeom>
+          </p:spPr>
+        </p:pic>
+        <p:grpSp>
+          <p:nvGrpSpPr>
+            <p:cNvPr id="7" name="図形グループ 6"/>
+            <p:cNvGrpSpPr/>
+            <p:nvPr/>
+          </p:nvGrpSpPr>
+          <p:grpSpPr>
+            <a:xfrm>
+              <a:off x="2708050" y="2078179"/>
+              <a:ext cx="2637496" cy="3127449"/>
+              <a:chOff x="2904322" y="2297543"/>
+              <a:chExt cx="2637496" cy="3127449"/>
+            </a:xfrm>
+          </p:grpSpPr>
+          <p:pic>
+            <p:nvPicPr>
+              <p:cNvPr id="3" name="図 2" descr="スクリーンショット（0029-08-05 8.37.51）.png"/>
+              <p:cNvPicPr>
+                <a:picLocks noChangeAspect="1"/>
+              </p:cNvPicPr>
+              <p:nvPr/>
+            </p:nvPicPr>
+            <p:blipFill>
+              <a:blip r:embed="rId4">
+                <a:extLst>
+                  <a:ext uri="{28A0092B-C50C-407E-A947-70E740481C1C}">
+                    <a14:useLocalDpi xmlns:a14="http://schemas.microsoft.com/office/drawing/2010/main" val="0"/>
+                  </a:ext>
+                </a:extLst>
+              </a:blip>
+              <a:stretch>
+                <a:fillRect/>
+              </a:stretch>
+            </p:blipFill>
+            <p:spPr>
+              <a:xfrm>
+                <a:off x="2904322" y="2424539"/>
+                <a:ext cx="2637496" cy="3000453"/>
+              </a:xfrm>
+              <a:prstGeom prst="rect">
+                <a:avLst/>
+              </a:prstGeom>
+              <a:effectLst>
+                <a:outerShdw blurRad="50800" dist="38100" dir="2700000" algn="tl" rotWithShape="0">
+                  <a:srgbClr val="000000">
+                    <a:alpha val="43000"/>
+                  </a:srgbClr>
+                </a:outerShdw>
+              </a:effectLst>
+            </p:spPr>
+          </p:pic>
+          <p:sp>
+            <p:nvSpPr>
+              <p:cNvPr id="6" name="二等辺三角形 5"/>
+              <p:cNvSpPr/>
+              <p:nvPr/>
+            </p:nvSpPr>
+            <p:spPr>
+              <a:xfrm>
+                <a:off x="3048000" y="2297543"/>
+                <a:ext cx="311727" cy="138541"/>
+              </a:xfrm>
+              <a:prstGeom prst="triangle">
+                <a:avLst/>
+              </a:prstGeom>
+              <a:solidFill>
+                <a:schemeClr val="bg1"/>
+              </a:solidFill>
+              <a:ln>
+                <a:solidFill>
+                  <a:schemeClr val="bg1"/>
+                </a:solidFill>
+              </a:ln>
+              <a:effectLst/>
+            </p:spPr>
+            <p:style>
+              <a:lnRef idx="1">
+                <a:schemeClr val="accent1"/>
+              </a:lnRef>
+              <a:fillRef idx="3">
+                <a:schemeClr val="accent1"/>
+              </a:fillRef>
+              <a:effectRef idx="2">
+                <a:schemeClr val="accent1"/>
+              </a:effectRef>
+              <a:fontRef idx="minor">
+                <a:schemeClr val="lt1"/>
+              </a:fontRef>
+            </p:style>
+            <p:txBody>
+              <a:bodyPr rtlCol="0" anchor="ctr"/>
+              <a:lstStyle/>
+              <a:p>
+                <a:pPr algn="ctr"/>
+                <a:endParaRPr kumimoji="1" lang="ja-JP" altLang="en-US"/>
+              </a:p>
+            </p:txBody>
+          </p:sp>
+        </p:grpSp>
+      </p:grpSp>
+    </p:spTree>
+    <p:extLst>
+      <p:ext uri="{BB962C8B-B14F-4D97-AF65-F5344CB8AC3E}">
+        <p14:creationId xmlns:p14="http://schemas.microsoft.com/office/powerpoint/2010/main" val="3659710789"/>
+      </p:ext>
+    </p:extLst>
+  </p:cSld>
+  <p:clrMapOvr>
+    <a:masterClrMapping/>
+  </p:clrMapOvr>
+</p:sld>
+</file>
+
+<file path=ppt/slides/slide6.xml><?xml version="1.0" encoding="utf-8"?>
+<p:sld xmlns:a="http://schemas.openxmlformats.org/drawingml/2006/main" xmlns:r="http://schemas.openxmlformats.org/officeDocument/2006/relationships" xmlns:p="http://schemas.openxmlformats.org/presentationml/2006/main">
+  <p:cSld>
+    <p:spTree>
+      <p:nvGrpSpPr>
+        <p:cNvPr id="1" name=""/>
+        <p:cNvGrpSpPr/>
+        <p:nvPr/>
+      </p:nvGrpSpPr>
+      <p:grpSpPr>
+        <a:xfrm>
+          <a:off x="0" y="0"/>
+          <a:ext cx="0" cy="0"/>
+          <a:chOff x="0" y="0"/>
+          <a:chExt cx="0" cy="0"/>
+        </a:xfrm>
+      </p:grpSpPr>
+      <p:sp>
+        <p:nvSpPr>
+          <p:cNvPr id="4" name="テキスト ボックス 3"/>
+          <p:cNvSpPr txBox="1"/>
+          <p:nvPr/>
+        </p:nvSpPr>
+        <p:spPr>
+          <a:xfrm>
+            <a:off x="200532" y="187161"/>
             <a:ext cx="4134465" cy="523220"/>
           </a:xfrm>
           <a:prstGeom prst="rect">
@@ -8545,7 +8731,7 @@
           <p:nvPr>
             <p:extLst>
               <p:ext uri="{D42A27DB-BD31-4B8C-83A1-F6EECF244321}">
-                <p14:modId xmlns:p14="http://schemas.microsoft.com/office/powerpoint/2010/main" val="3126585566"/>
+                <p14:modId xmlns:p14="http://schemas.microsoft.com/office/powerpoint/2010/main" val="2774768286"/>
               </p:ext>
             </p:extLst>
           </p:nvPr>
@@ -9080,456 +9266,6 @@
           </a:graphicData>
         </a:graphic>
       </p:graphicFrame>
-      <p:sp>
-        <p:nvSpPr>
-          <p:cNvPr id="41" name="円柱 40"/>
-          <p:cNvSpPr/>
-          <p:nvPr/>
-        </p:nvSpPr>
-        <p:spPr>
-          <a:xfrm>
-            <a:off x="8017036" y="2447634"/>
-            <a:ext cx="173182" cy="288636"/>
-          </a:xfrm>
-          <a:prstGeom prst="can">
-            <a:avLst/>
-          </a:prstGeom>
-          <a:noFill/>
-          <a:ln w="25400">
-            <a:solidFill>
-              <a:schemeClr val="tx1"/>
-            </a:solidFill>
-          </a:ln>
-          <a:effectLst/>
-        </p:spPr>
-        <p:style>
-          <a:lnRef idx="1">
-            <a:schemeClr val="accent1"/>
-          </a:lnRef>
-          <a:fillRef idx="3">
-            <a:schemeClr val="accent1"/>
-          </a:fillRef>
-          <a:effectRef idx="2">
-            <a:schemeClr val="accent1"/>
-          </a:effectRef>
-          <a:fontRef idx="minor">
-            <a:schemeClr val="lt1"/>
-          </a:fontRef>
-        </p:style>
-        <p:txBody>
-          <a:bodyPr rtlCol="0" anchor="ctr"/>
-          <a:lstStyle/>
-          <a:p>
-            <a:pPr algn="ctr"/>
-            <a:endParaRPr kumimoji="1" lang="ja-JP" altLang="en-US"/>
-          </a:p>
-        </p:txBody>
-      </p:sp>
-      <p:sp>
-        <p:nvSpPr>
-          <p:cNvPr id="42" name="円柱 41"/>
-          <p:cNvSpPr/>
-          <p:nvPr/>
-        </p:nvSpPr>
-        <p:spPr>
-          <a:xfrm>
-            <a:off x="8017036" y="2856340"/>
-            <a:ext cx="173182" cy="288636"/>
-          </a:xfrm>
-          <a:prstGeom prst="can">
-            <a:avLst/>
-          </a:prstGeom>
-          <a:noFill/>
-          <a:ln w="25400">
-            <a:solidFill>
-              <a:schemeClr val="tx1"/>
-            </a:solidFill>
-          </a:ln>
-          <a:effectLst/>
-        </p:spPr>
-        <p:style>
-          <a:lnRef idx="1">
-            <a:schemeClr val="accent1"/>
-          </a:lnRef>
-          <a:fillRef idx="3">
-            <a:schemeClr val="accent1"/>
-          </a:fillRef>
-          <a:effectRef idx="2">
-            <a:schemeClr val="accent1"/>
-          </a:effectRef>
-          <a:fontRef idx="minor">
-            <a:schemeClr val="lt1"/>
-          </a:fontRef>
-        </p:style>
-        <p:txBody>
-          <a:bodyPr rtlCol="0" anchor="ctr"/>
-          <a:lstStyle/>
-          <a:p>
-            <a:pPr algn="ctr"/>
-            <a:endParaRPr kumimoji="1" lang="ja-JP" altLang="en-US"/>
-          </a:p>
-        </p:txBody>
-      </p:sp>
-      <p:sp>
-        <p:nvSpPr>
-          <p:cNvPr id="45" name="円柱 44"/>
-          <p:cNvSpPr/>
-          <p:nvPr/>
-        </p:nvSpPr>
-        <p:spPr>
-          <a:xfrm>
-            <a:off x="8017036" y="3235027"/>
-            <a:ext cx="173182" cy="288636"/>
-          </a:xfrm>
-          <a:prstGeom prst="can">
-            <a:avLst/>
-          </a:prstGeom>
-          <a:noFill/>
-          <a:ln w="25400">
-            <a:solidFill>
-              <a:schemeClr val="tx1"/>
-            </a:solidFill>
-          </a:ln>
-          <a:effectLst/>
-        </p:spPr>
-        <p:style>
-          <a:lnRef idx="1">
-            <a:schemeClr val="accent1"/>
-          </a:lnRef>
-          <a:fillRef idx="3">
-            <a:schemeClr val="accent1"/>
-          </a:fillRef>
-          <a:effectRef idx="2">
-            <a:schemeClr val="accent1"/>
-          </a:effectRef>
-          <a:fontRef idx="minor">
-            <a:schemeClr val="lt1"/>
-          </a:fontRef>
-        </p:style>
-        <p:txBody>
-          <a:bodyPr rtlCol="0" anchor="ctr"/>
-          <a:lstStyle/>
-          <a:p>
-            <a:pPr algn="ctr"/>
-            <a:endParaRPr kumimoji="1" lang="ja-JP" altLang="en-US"/>
-          </a:p>
-        </p:txBody>
-      </p:sp>
-      <p:sp>
-        <p:nvSpPr>
-          <p:cNvPr id="46" name="円柱 45"/>
-          <p:cNvSpPr/>
-          <p:nvPr/>
-        </p:nvSpPr>
-        <p:spPr>
-          <a:xfrm>
-            <a:off x="8017036" y="3624105"/>
-            <a:ext cx="173182" cy="288636"/>
-          </a:xfrm>
-          <a:prstGeom prst="can">
-            <a:avLst/>
-          </a:prstGeom>
-          <a:noFill/>
-          <a:ln w="25400">
-            <a:solidFill>
-              <a:schemeClr val="tx1"/>
-            </a:solidFill>
-          </a:ln>
-          <a:effectLst/>
-        </p:spPr>
-        <p:style>
-          <a:lnRef idx="1">
-            <a:schemeClr val="accent1"/>
-          </a:lnRef>
-          <a:fillRef idx="3">
-            <a:schemeClr val="accent1"/>
-          </a:fillRef>
-          <a:effectRef idx="2">
-            <a:schemeClr val="accent1"/>
-          </a:effectRef>
-          <a:fontRef idx="minor">
-            <a:schemeClr val="lt1"/>
-          </a:fontRef>
-        </p:style>
-        <p:txBody>
-          <a:bodyPr rtlCol="0" anchor="ctr"/>
-          <a:lstStyle/>
-          <a:p>
-            <a:pPr algn="ctr"/>
-            <a:endParaRPr kumimoji="1" lang="ja-JP" altLang="en-US"/>
-          </a:p>
-        </p:txBody>
-      </p:sp>
-      <p:sp>
-        <p:nvSpPr>
-          <p:cNvPr id="47" name="円柱 46"/>
-          <p:cNvSpPr/>
-          <p:nvPr/>
-        </p:nvSpPr>
-        <p:spPr>
-          <a:xfrm>
-            <a:off x="8017036" y="4008555"/>
-            <a:ext cx="173182" cy="288636"/>
-          </a:xfrm>
-          <a:prstGeom prst="can">
-            <a:avLst/>
-          </a:prstGeom>
-          <a:noFill/>
-          <a:ln w="25400">
-            <a:solidFill>
-              <a:schemeClr val="tx1"/>
-            </a:solidFill>
-          </a:ln>
-          <a:effectLst/>
-        </p:spPr>
-        <p:style>
-          <a:lnRef idx="1">
-            <a:schemeClr val="accent1"/>
-          </a:lnRef>
-          <a:fillRef idx="3">
-            <a:schemeClr val="accent1"/>
-          </a:fillRef>
-          <a:effectRef idx="2">
-            <a:schemeClr val="accent1"/>
-          </a:effectRef>
-          <a:fontRef idx="minor">
-            <a:schemeClr val="lt1"/>
-          </a:fontRef>
-        </p:style>
-        <p:txBody>
-          <a:bodyPr rtlCol="0" anchor="ctr"/>
-          <a:lstStyle/>
-          <a:p>
-            <a:pPr algn="ctr"/>
-            <a:endParaRPr kumimoji="1" lang="ja-JP" altLang="en-US"/>
-          </a:p>
-        </p:txBody>
-      </p:sp>
-      <p:sp>
-        <p:nvSpPr>
-          <p:cNvPr id="48" name="円柱 47"/>
-          <p:cNvSpPr/>
-          <p:nvPr/>
-        </p:nvSpPr>
-        <p:spPr>
-          <a:xfrm>
-            <a:off x="8017036" y="4397633"/>
-            <a:ext cx="173182" cy="288636"/>
-          </a:xfrm>
-          <a:prstGeom prst="can">
-            <a:avLst/>
-          </a:prstGeom>
-          <a:noFill/>
-          <a:ln w="25400">
-            <a:solidFill>
-              <a:schemeClr val="tx1"/>
-            </a:solidFill>
-          </a:ln>
-          <a:effectLst/>
-        </p:spPr>
-        <p:style>
-          <a:lnRef idx="1">
-            <a:schemeClr val="accent1"/>
-          </a:lnRef>
-          <a:fillRef idx="3">
-            <a:schemeClr val="accent1"/>
-          </a:fillRef>
-          <a:effectRef idx="2">
-            <a:schemeClr val="accent1"/>
-          </a:effectRef>
-          <a:fontRef idx="minor">
-            <a:schemeClr val="lt1"/>
-          </a:fontRef>
-        </p:style>
-        <p:txBody>
-          <a:bodyPr rtlCol="0" anchor="ctr"/>
-          <a:lstStyle/>
-          <a:p>
-            <a:pPr algn="ctr"/>
-            <a:endParaRPr kumimoji="1" lang="ja-JP" altLang="en-US"/>
-          </a:p>
-        </p:txBody>
-      </p:sp>
-      <p:sp>
-        <p:nvSpPr>
-          <p:cNvPr id="49" name="円柱 48"/>
-          <p:cNvSpPr/>
-          <p:nvPr/>
-        </p:nvSpPr>
-        <p:spPr>
-          <a:xfrm>
-            <a:off x="8017036" y="4782067"/>
-            <a:ext cx="173182" cy="288636"/>
-          </a:xfrm>
-          <a:prstGeom prst="can">
-            <a:avLst/>
-          </a:prstGeom>
-          <a:noFill/>
-          <a:ln w="25400">
-            <a:solidFill>
-              <a:schemeClr val="tx1"/>
-            </a:solidFill>
-          </a:ln>
-          <a:effectLst/>
-        </p:spPr>
-        <p:style>
-          <a:lnRef idx="1">
-            <a:schemeClr val="accent1"/>
-          </a:lnRef>
-          <a:fillRef idx="3">
-            <a:schemeClr val="accent1"/>
-          </a:fillRef>
-          <a:effectRef idx="2">
-            <a:schemeClr val="accent1"/>
-          </a:effectRef>
-          <a:fontRef idx="minor">
-            <a:schemeClr val="lt1"/>
-          </a:fontRef>
-        </p:style>
-        <p:txBody>
-          <a:bodyPr rtlCol="0" anchor="ctr"/>
-          <a:lstStyle/>
-          <a:p>
-            <a:pPr algn="ctr"/>
-            <a:endParaRPr kumimoji="1" lang="ja-JP" altLang="en-US"/>
-          </a:p>
-        </p:txBody>
-      </p:sp>
-      <p:sp>
-        <p:nvSpPr>
-          <p:cNvPr id="50" name="円柱 49"/>
-          <p:cNvSpPr/>
-          <p:nvPr/>
-        </p:nvSpPr>
-        <p:spPr>
-          <a:xfrm>
-            <a:off x="8017036" y="5169935"/>
-            <a:ext cx="173182" cy="288636"/>
-          </a:xfrm>
-          <a:prstGeom prst="can">
-            <a:avLst/>
-          </a:prstGeom>
-          <a:noFill/>
-          <a:ln w="25400">
-            <a:solidFill>
-              <a:schemeClr val="tx1"/>
-            </a:solidFill>
-          </a:ln>
-          <a:effectLst/>
-        </p:spPr>
-        <p:style>
-          <a:lnRef idx="1">
-            <a:schemeClr val="accent1"/>
-          </a:lnRef>
-          <a:fillRef idx="3">
-            <a:schemeClr val="accent1"/>
-          </a:fillRef>
-          <a:effectRef idx="2">
-            <a:schemeClr val="accent1"/>
-          </a:effectRef>
-          <a:fontRef idx="minor">
-            <a:schemeClr val="lt1"/>
-          </a:fontRef>
-        </p:style>
-        <p:txBody>
-          <a:bodyPr rtlCol="0" anchor="ctr"/>
-          <a:lstStyle/>
-          <a:p>
-            <a:pPr algn="ctr"/>
-            <a:endParaRPr kumimoji="1" lang="ja-JP" altLang="en-US"/>
-          </a:p>
-        </p:txBody>
-      </p:sp>
-      <p:sp>
-        <p:nvSpPr>
-          <p:cNvPr id="51" name="円柱 50"/>
-          <p:cNvSpPr/>
-          <p:nvPr/>
-        </p:nvSpPr>
-        <p:spPr>
-          <a:xfrm>
-            <a:off x="8017036" y="5559013"/>
-            <a:ext cx="173182" cy="288636"/>
-          </a:xfrm>
-          <a:prstGeom prst="can">
-            <a:avLst/>
-          </a:prstGeom>
-          <a:noFill/>
-          <a:ln w="25400">
-            <a:solidFill>
-              <a:schemeClr val="tx1"/>
-            </a:solidFill>
-          </a:ln>
-          <a:effectLst/>
-        </p:spPr>
-        <p:style>
-          <a:lnRef idx="1">
-            <a:schemeClr val="accent1"/>
-          </a:lnRef>
-          <a:fillRef idx="3">
-            <a:schemeClr val="accent1"/>
-          </a:fillRef>
-          <a:effectRef idx="2">
-            <a:schemeClr val="accent1"/>
-          </a:effectRef>
-          <a:fontRef idx="minor">
-            <a:schemeClr val="lt1"/>
-          </a:fontRef>
-        </p:style>
-        <p:txBody>
-          <a:bodyPr rtlCol="0" anchor="ctr"/>
-          <a:lstStyle/>
-          <a:p>
-            <a:pPr algn="ctr"/>
-            <a:endParaRPr kumimoji="1" lang="ja-JP" altLang="en-US"/>
-          </a:p>
-        </p:txBody>
-      </p:sp>
-      <p:sp>
-        <p:nvSpPr>
-          <p:cNvPr id="54" name="円柱 53"/>
-          <p:cNvSpPr/>
-          <p:nvPr/>
-        </p:nvSpPr>
-        <p:spPr>
-          <a:xfrm>
-            <a:off x="8017036" y="5930778"/>
-            <a:ext cx="173182" cy="288636"/>
-          </a:xfrm>
-          <a:prstGeom prst="can">
-            <a:avLst/>
-          </a:prstGeom>
-          <a:noFill/>
-          <a:ln w="25400">
-            <a:solidFill>
-              <a:schemeClr val="tx1"/>
-            </a:solidFill>
-          </a:ln>
-          <a:effectLst/>
-        </p:spPr>
-        <p:style>
-          <a:lnRef idx="1">
-            <a:schemeClr val="accent1"/>
-          </a:lnRef>
-          <a:fillRef idx="3">
-            <a:schemeClr val="accent1"/>
-          </a:fillRef>
-          <a:effectRef idx="2">
-            <a:schemeClr val="accent1"/>
-          </a:effectRef>
-          <a:fontRef idx="minor">
-            <a:schemeClr val="lt1"/>
-          </a:fontRef>
-        </p:style>
-        <p:txBody>
-          <a:bodyPr rtlCol="0" anchor="ctr"/>
-          <a:lstStyle/>
-          <a:p>
-            <a:pPr algn="ctr"/>
-            <a:endParaRPr kumimoji="1" lang="ja-JP" altLang="en-US"/>
-          </a:p>
-        </p:txBody>
-      </p:sp>
       <p:sp>
         <p:nvSpPr>
           <p:cNvPr id="55" name="正方形/長方形 54"/>
@@ -9930,6 +9666,306 @@
           </p:txBody>
         </p:sp>
       </p:grpSp>
+      <p:pic>
+        <p:nvPicPr>
+          <p:cNvPr id="70" name="図 69" descr="trash.png"/>
+          <p:cNvPicPr>
+            <a:picLocks noChangeAspect="1"/>
+          </p:cNvPicPr>
+          <p:nvPr/>
+        </p:nvPicPr>
+        <p:blipFill>
+          <a:blip r:embed="rId3">
+            <a:extLst>
+              <a:ext uri="{28A0092B-C50C-407E-A947-70E740481C1C}">
+                <a14:useLocalDpi xmlns:a14="http://schemas.microsoft.com/office/drawing/2010/main" val="0"/>
+              </a:ext>
+            </a:extLst>
+          </a:blip>
+          <a:stretch>
+            <a:fillRect/>
+          </a:stretch>
+        </p:blipFill>
+        <p:spPr>
+          <a:xfrm>
+            <a:off x="7967360" y="2463737"/>
+            <a:ext cx="272533" cy="272533"/>
+          </a:xfrm>
+          <a:prstGeom prst="rect">
+            <a:avLst/>
+          </a:prstGeom>
+        </p:spPr>
+      </p:pic>
+      <p:pic>
+        <p:nvPicPr>
+          <p:cNvPr id="71" name="図 70" descr="trash.png"/>
+          <p:cNvPicPr>
+            <a:picLocks noChangeAspect="1"/>
+          </p:cNvPicPr>
+          <p:nvPr/>
+        </p:nvPicPr>
+        <p:blipFill>
+          <a:blip r:embed="rId3">
+            <a:extLst>
+              <a:ext uri="{28A0092B-C50C-407E-A947-70E740481C1C}">
+                <a14:useLocalDpi xmlns:a14="http://schemas.microsoft.com/office/drawing/2010/main" val="0"/>
+              </a:ext>
+            </a:extLst>
+          </a:blip>
+          <a:stretch>
+            <a:fillRect/>
+          </a:stretch>
+        </p:blipFill>
+        <p:spPr>
+          <a:xfrm>
+            <a:off x="7967360" y="2865577"/>
+            <a:ext cx="272533" cy="272533"/>
+          </a:xfrm>
+          <a:prstGeom prst="rect">
+            <a:avLst/>
+          </a:prstGeom>
+        </p:spPr>
+      </p:pic>
+      <p:pic>
+        <p:nvPicPr>
+          <p:cNvPr id="72" name="図 71" descr="trash.png"/>
+          <p:cNvPicPr>
+            <a:picLocks noChangeAspect="1"/>
+          </p:cNvPicPr>
+          <p:nvPr/>
+        </p:nvPicPr>
+        <p:blipFill>
+          <a:blip r:embed="rId3">
+            <a:extLst>
+              <a:ext uri="{28A0092B-C50C-407E-A947-70E740481C1C}">
+                <a14:useLocalDpi xmlns:a14="http://schemas.microsoft.com/office/drawing/2010/main" val="0"/>
+              </a:ext>
+            </a:extLst>
+          </a:blip>
+          <a:stretch>
+            <a:fillRect/>
+          </a:stretch>
+        </p:blipFill>
+        <p:spPr>
+          <a:xfrm>
+            <a:off x="7967360" y="3244330"/>
+            <a:ext cx="272533" cy="272533"/>
+          </a:xfrm>
+          <a:prstGeom prst="rect">
+            <a:avLst/>
+          </a:prstGeom>
+        </p:spPr>
+      </p:pic>
+      <p:pic>
+        <p:nvPicPr>
+          <p:cNvPr id="73" name="図 72" descr="trash.png"/>
+          <p:cNvPicPr>
+            <a:picLocks noChangeAspect="1"/>
+          </p:cNvPicPr>
+          <p:nvPr/>
+        </p:nvPicPr>
+        <p:blipFill>
+          <a:blip r:embed="rId3">
+            <a:extLst>
+              <a:ext uri="{28A0092B-C50C-407E-A947-70E740481C1C}">
+                <a14:useLocalDpi xmlns:a14="http://schemas.microsoft.com/office/drawing/2010/main" val="0"/>
+              </a:ext>
+            </a:extLst>
+          </a:blip>
+          <a:stretch>
+            <a:fillRect/>
+          </a:stretch>
+        </p:blipFill>
+        <p:spPr>
+          <a:xfrm>
+            <a:off x="7967360" y="3646170"/>
+            <a:ext cx="272533" cy="272533"/>
+          </a:xfrm>
+          <a:prstGeom prst="rect">
+            <a:avLst/>
+          </a:prstGeom>
+        </p:spPr>
+      </p:pic>
+      <p:pic>
+        <p:nvPicPr>
+          <p:cNvPr id="74" name="図 73" descr="trash.png"/>
+          <p:cNvPicPr>
+            <a:picLocks noChangeAspect="1"/>
+          </p:cNvPicPr>
+          <p:nvPr/>
+        </p:nvPicPr>
+        <p:blipFill>
+          <a:blip r:embed="rId3">
+            <a:extLst>
+              <a:ext uri="{28A0092B-C50C-407E-A947-70E740481C1C}">
+                <a14:useLocalDpi xmlns:a14="http://schemas.microsoft.com/office/drawing/2010/main" val="0"/>
+              </a:ext>
+            </a:extLst>
+          </a:blip>
+          <a:stretch>
+            <a:fillRect/>
+          </a:stretch>
+        </p:blipFill>
+        <p:spPr>
+          <a:xfrm>
+            <a:off x="7966108" y="4020421"/>
+            <a:ext cx="272533" cy="272533"/>
+          </a:xfrm>
+          <a:prstGeom prst="rect">
+            <a:avLst/>
+          </a:prstGeom>
+        </p:spPr>
+      </p:pic>
+      <p:pic>
+        <p:nvPicPr>
+          <p:cNvPr id="75" name="図 74" descr="trash.png"/>
+          <p:cNvPicPr>
+            <a:picLocks noChangeAspect="1"/>
+          </p:cNvPicPr>
+          <p:nvPr/>
+        </p:nvPicPr>
+        <p:blipFill>
+          <a:blip r:embed="rId3">
+            <a:extLst>
+              <a:ext uri="{28A0092B-C50C-407E-A947-70E740481C1C}">
+                <a14:useLocalDpi xmlns:a14="http://schemas.microsoft.com/office/drawing/2010/main" val="0"/>
+              </a:ext>
+            </a:extLst>
+          </a:blip>
+          <a:stretch>
+            <a:fillRect/>
+          </a:stretch>
+        </p:blipFill>
+        <p:spPr>
+          <a:xfrm>
+            <a:off x="7966108" y="4422261"/>
+            <a:ext cx="272533" cy="272533"/>
+          </a:xfrm>
+          <a:prstGeom prst="rect">
+            <a:avLst/>
+          </a:prstGeom>
+        </p:spPr>
+      </p:pic>
+      <p:pic>
+        <p:nvPicPr>
+          <p:cNvPr id="76" name="図 75" descr="trash.png"/>
+          <p:cNvPicPr>
+            <a:picLocks noChangeAspect="1"/>
+          </p:cNvPicPr>
+          <p:nvPr/>
+        </p:nvPicPr>
+        <p:blipFill>
+          <a:blip r:embed="rId3">
+            <a:extLst>
+              <a:ext uri="{28A0092B-C50C-407E-A947-70E740481C1C}">
+                <a14:useLocalDpi xmlns:a14="http://schemas.microsoft.com/office/drawing/2010/main" val="0"/>
+              </a:ext>
+            </a:extLst>
+          </a:blip>
+          <a:stretch>
+            <a:fillRect/>
+          </a:stretch>
+        </p:blipFill>
+        <p:spPr>
+          <a:xfrm>
+            <a:off x="7967360" y="4799059"/>
+            <a:ext cx="272533" cy="272533"/>
+          </a:xfrm>
+          <a:prstGeom prst="rect">
+            <a:avLst/>
+          </a:prstGeom>
+        </p:spPr>
+      </p:pic>
+      <p:pic>
+        <p:nvPicPr>
+          <p:cNvPr id="77" name="図 76" descr="trash.png"/>
+          <p:cNvPicPr>
+            <a:picLocks noChangeAspect="1"/>
+          </p:cNvPicPr>
+          <p:nvPr/>
+        </p:nvPicPr>
+        <p:blipFill>
+          <a:blip r:embed="rId3">
+            <a:extLst>
+              <a:ext uri="{28A0092B-C50C-407E-A947-70E740481C1C}">
+                <a14:useLocalDpi xmlns:a14="http://schemas.microsoft.com/office/drawing/2010/main" val="0"/>
+              </a:ext>
+            </a:extLst>
+          </a:blip>
+          <a:stretch>
+            <a:fillRect/>
+          </a:stretch>
+        </p:blipFill>
+        <p:spPr>
+          <a:xfrm>
+            <a:off x="7967360" y="5200899"/>
+            <a:ext cx="272533" cy="272533"/>
+          </a:xfrm>
+          <a:prstGeom prst="rect">
+            <a:avLst/>
+          </a:prstGeom>
+        </p:spPr>
+      </p:pic>
+      <p:pic>
+        <p:nvPicPr>
+          <p:cNvPr id="78" name="図 77" descr="trash.png"/>
+          <p:cNvPicPr>
+            <a:picLocks noChangeAspect="1"/>
+          </p:cNvPicPr>
+          <p:nvPr/>
+        </p:nvPicPr>
+        <p:blipFill>
+          <a:blip r:embed="rId3">
+            <a:extLst>
+              <a:ext uri="{28A0092B-C50C-407E-A947-70E740481C1C}">
+                <a14:useLocalDpi xmlns:a14="http://schemas.microsoft.com/office/drawing/2010/main" val="0"/>
+              </a:ext>
+            </a:extLst>
+          </a:blip>
+          <a:stretch>
+            <a:fillRect/>
+          </a:stretch>
+        </p:blipFill>
+        <p:spPr>
+          <a:xfrm>
+            <a:off x="7966108" y="5558835"/>
+            <a:ext cx="272533" cy="272533"/>
+          </a:xfrm>
+          <a:prstGeom prst="rect">
+            <a:avLst/>
+          </a:prstGeom>
+        </p:spPr>
+      </p:pic>
+      <p:pic>
+        <p:nvPicPr>
+          <p:cNvPr id="79" name="図 78" descr="trash.png"/>
+          <p:cNvPicPr>
+            <a:picLocks noChangeAspect="1"/>
+          </p:cNvPicPr>
+          <p:nvPr/>
+        </p:nvPicPr>
+        <p:blipFill>
+          <a:blip r:embed="rId3">
+            <a:extLst>
+              <a:ext uri="{28A0092B-C50C-407E-A947-70E740481C1C}">
+                <a14:useLocalDpi xmlns:a14="http://schemas.microsoft.com/office/drawing/2010/main" val="0"/>
+              </a:ext>
+            </a:extLst>
+          </a:blip>
+          <a:stretch>
+            <a:fillRect/>
+          </a:stretch>
+        </p:blipFill>
+        <p:spPr>
+          <a:xfrm>
+            <a:off x="7966108" y="5960675"/>
+            <a:ext cx="272533" cy="272533"/>
+          </a:xfrm>
+          <a:prstGeom prst="rect">
+            <a:avLst/>
+          </a:prstGeom>
+        </p:spPr>
+      </p:pic>
     </p:spTree>
     <p:extLst>
       <p:ext uri="{BB962C8B-B14F-4D97-AF65-F5344CB8AC3E}">
@@ -9943,7 +9979,7 @@
 </p:sld>
 </file>
 
-<file path=ppt/slides/slide6.xml><?xml version="1.0" encoding="utf-8"?>
+<file path=ppt/slides/slide7.xml><?xml version="1.0" encoding="utf-8"?>
 <p:sld xmlns:a="http://schemas.openxmlformats.org/drawingml/2006/main" xmlns:r="http://schemas.openxmlformats.org/officeDocument/2006/relationships" xmlns:p="http://schemas.openxmlformats.org/presentationml/2006/main">
   <p:cSld>
     <p:spTree>
@@ -11059,7 +11095,7 @@
           <p:nvPr>
             <p:extLst>
               <p:ext uri="{D42A27DB-BD31-4B8C-83A1-F6EECF244321}">
-                <p14:modId xmlns:p14="http://schemas.microsoft.com/office/powerpoint/2010/main" val="1012184571"/>
+                <p14:modId xmlns:p14="http://schemas.microsoft.com/office/powerpoint/2010/main" val="2838429161"/>
               </p:ext>
             </p:extLst>
           </p:nvPr>
@@ -11594,456 +11630,6 @@
           </a:graphicData>
         </a:graphic>
       </p:graphicFrame>
-      <p:sp>
-        <p:nvSpPr>
-          <p:cNvPr id="41" name="円柱 40"/>
-          <p:cNvSpPr/>
-          <p:nvPr/>
-        </p:nvSpPr>
-        <p:spPr>
-          <a:xfrm>
-            <a:off x="8017036" y="2447634"/>
-            <a:ext cx="173182" cy="288636"/>
-          </a:xfrm>
-          <a:prstGeom prst="can">
-            <a:avLst/>
-          </a:prstGeom>
-          <a:noFill/>
-          <a:ln w="25400">
-            <a:solidFill>
-              <a:schemeClr val="tx1"/>
-            </a:solidFill>
-          </a:ln>
-          <a:effectLst/>
-        </p:spPr>
-        <p:style>
-          <a:lnRef idx="1">
-            <a:schemeClr val="accent1"/>
-          </a:lnRef>
-          <a:fillRef idx="3">
-            <a:schemeClr val="accent1"/>
-          </a:fillRef>
-          <a:effectRef idx="2">
-            <a:schemeClr val="accent1"/>
-          </a:effectRef>
-          <a:fontRef idx="minor">
-            <a:schemeClr val="lt1"/>
-          </a:fontRef>
-        </p:style>
-        <p:txBody>
-          <a:bodyPr rtlCol="0" anchor="ctr"/>
-          <a:lstStyle/>
-          <a:p>
-            <a:pPr algn="ctr"/>
-            <a:endParaRPr kumimoji="1" lang="ja-JP" altLang="en-US"/>
-          </a:p>
-        </p:txBody>
-      </p:sp>
-      <p:sp>
-        <p:nvSpPr>
-          <p:cNvPr id="42" name="円柱 41"/>
-          <p:cNvSpPr/>
-          <p:nvPr/>
-        </p:nvSpPr>
-        <p:spPr>
-          <a:xfrm>
-            <a:off x="8017036" y="2856340"/>
-            <a:ext cx="173182" cy="288636"/>
-          </a:xfrm>
-          <a:prstGeom prst="can">
-            <a:avLst/>
-          </a:prstGeom>
-          <a:noFill/>
-          <a:ln w="25400">
-            <a:solidFill>
-              <a:schemeClr val="tx1"/>
-            </a:solidFill>
-          </a:ln>
-          <a:effectLst/>
-        </p:spPr>
-        <p:style>
-          <a:lnRef idx="1">
-            <a:schemeClr val="accent1"/>
-          </a:lnRef>
-          <a:fillRef idx="3">
-            <a:schemeClr val="accent1"/>
-          </a:fillRef>
-          <a:effectRef idx="2">
-            <a:schemeClr val="accent1"/>
-          </a:effectRef>
-          <a:fontRef idx="minor">
-            <a:schemeClr val="lt1"/>
-          </a:fontRef>
-        </p:style>
-        <p:txBody>
-          <a:bodyPr rtlCol="0" anchor="ctr"/>
-          <a:lstStyle/>
-          <a:p>
-            <a:pPr algn="ctr"/>
-            <a:endParaRPr kumimoji="1" lang="ja-JP" altLang="en-US"/>
-          </a:p>
-        </p:txBody>
-      </p:sp>
-      <p:sp>
-        <p:nvSpPr>
-          <p:cNvPr id="45" name="円柱 44"/>
-          <p:cNvSpPr/>
-          <p:nvPr/>
-        </p:nvSpPr>
-        <p:spPr>
-          <a:xfrm>
-            <a:off x="8017036" y="3235027"/>
-            <a:ext cx="173182" cy="288636"/>
-          </a:xfrm>
-          <a:prstGeom prst="can">
-            <a:avLst/>
-          </a:prstGeom>
-          <a:noFill/>
-          <a:ln w="25400">
-            <a:solidFill>
-              <a:schemeClr val="tx1"/>
-            </a:solidFill>
-          </a:ln>
-          <a:effectLst/>
-        </p:spPr>
-        <p:style>
-          <a:lnRef idx="1">
-            <a:schemeClr val="accent1"/>
-          </a:lnRef>
-          <a:fillRef idx="3">
-            <a:schemeClr val="accent1"/>
-          </a:fillRef>
-          <a:effectRef idx="2">
-            <a:schemeClr val="accent1"/>
-          </a:effectRef>
-          <a:fontRef idx="minor">
-            <a:schemeClr val="lt1"/>
-          </a:fontRef>
-        </p:style>
-        <p:txBody>
-          <a:bodyPr rtlCol="0" anchor="ctr"/>
-          <a:lstStyle/>
-          <a:p>
-            <a:pPr algn="ctr"/>
-            <a:endParaRPr kumimoji="1" lang="ja-JP" altLang="en-US"/>
-          </a:p>
-        </p:txBody>
-      </p:sp>
-      <p:sp>
-        <p:nvSpPr>
-          <p:cNvPr id="46" name="円柱 45"/>
-          <p:cNvSpPr/>
-          <p:nvPr/>
-        </p:nvSpPr>
-        <p:spPr>
-          <a:xfrm>
-            <a:off x="8017036" y="3624105"/>
-            <a:ext cx="173182" cy="288636"/>
-          </a:xfrm>
-          <a:prstGeom prst="can">
-            <a:avLst/>
-          </a:prstGeom>
-          <a:noFill/>
-          <a:ln w="25400">
-            <a:solidFill>
-              <a:schemeClr val="tx1"/>
-            </a:solidFill>
-          </a:ln>
-          <a:effectLst/>
-        </p:spPr>
-        <p:style>
-          <a:lnRef idx="1">
-            <a:schemeClr val="accent1"/>
-          </a:lnRef>
-          <a:fillRef idx="3">
-            <a:schemeClr val="accent1"/>
-          </a:fillRef>
-          <a:effectRef idx="2">
-            <a:schemeClr val="accent1"/>
-          </a:effectRef>
-          <a:fontRef idx="minor">
-            <a:schemeClr val="lt1"/>
-          </a:fontRef>
-        </p:style>
-        <p:txBody>
-          <a:bodyPr rtlCol="0" anchor="ctr"/>
-          <a:lstStyle/>
-          <a:p>
-            <a:pPr algn="ctr"/>
-            <a:endParaRPr kumimoji="1" lang="ja-JP" altLang="en-US"/>
-          </a:p>
-        </p:txBody>
-      </p:sp>
-      <p:sp>
-        <p:nvSpPr>
-          <p:cNvPr id="47" name="円柱 46"/>
-          <p:cNvSpPr/>
-          <p:nvPr/>
-        </p:nvSpPr>
-        <p:spPr>
-          <a:xfrm>
-            <a:off x="8017036" y="4008555"/>
-            <a:ext cx="173182" cy="288636"/>
-          </a:xfrm>
-          <a:prstGeom prst="can">
-            <a:avLst/>
-          </a:prstGeom>
-          <a:noFill/>
-          <a:ln w="25400">
-            <a:solidFill>
-              <a:schemeClr val="tx1"/>
-            </a:solidFill>
-          </a:ln>
-          <a:effectLst/>
-        </p:spPr>
-        <p:style>
-          <a:lnRef idx="1">
-            <a:schemeClr val="accent1"/>
-          </a:lnRef>
-          <a:fillRef idx="3">
-            <a:schemeClr val="accent1"/>
-          </a:fillRef>
-          <a:effectRef idx="2">
-            <a:schemeClr val="accent1"/>
-          </a:effectRef>
-          <a:fontRef idx="minor">
-            <a:schemeClr val="lt1"/>
-          </a:fontRef>
-        </p:style>
-        <p:txBody>
-          <a:bodyPr rtlCol="0" anchor="ctr"/>
-          <a:lstStyle/>
-          <a:p>
-            <a:pPr algn="ctr"/>
-            <a:endParaRPr kumimoji="1" lang="ja-JP" altLang="en-US"/>
-          </a:p>
-        </p:txBody>
-      </p:sp>
-      <p:sp>
-        <p:nvSpPr>
-          <p:cNvPr id="48" name="円柱 47"/>
-          <p:cNvSpPr/>
-          <p:nvPr/>
-        </p:nvSpPr>
-        <p:spPr>
-          <a:xfrm>
-            <a:off x="8017036" y="4397633"/>
-            <a:ext cx="173182" cy="288636"/>
-          </a:xfrm>
-          <a:prstGeom prst="can">
-            <a:avLst/>
-          </a:prstGeom>
-          <a:noFill/>
-          <a:ln w="25400">
-            <a:solidFill>
-              <a:schemeClr val="tx1"/>
-            </a:solidFill>
-          </a:ln>
-          <a:effectLst/>
-        </p:spPr>
-        <p:style>
-          <a:lnRef idx="1">
-            <a:schemeClr val="accent1"/>
-          </a:lnRef>
-          <a:fillRef idx="3">
-            <a:schemeClr val="accent1"/>
-          </a:fillRef>
-          <a:effectRef idx="2">
-            <a:schemeClr val="accent1"/>
-          </a:effectRef>
-          <a:fontRef idx="minor">
-            <a:schemeClr val="lt1"/>
-          </a:fontRef>
-        </p:style>
-        <p:txBody>
-          <a:bodyPr rtlCol="0" anchor="ctr"/>
-          <a:lstStyle/>
-          <a:p>
-            <a:pPr algn="ctr"/>
-            <a:endParaRPr kumimoji="1" lang="ja-JP" altLang="en-US"/>
-          </a:p>
-        </p:txBody>
-      </p:sp>
-      <p:sp>
-        <p:nvSpPr>
-          <p:cNvPr id="49" name="円柱 48"/>
-          <p:cNvSpPr/>
-          <p:nvPr/>
-        </p:nvSpPr>
-        <p:spPr>
-          <a:xfrm>
-            <a:off x="8017036" y="4782067"/>
-            <a:ext cx="173182" cy="288636"/>
-          </a:xfrm>
-          <a:prstGeom prst="can">
-            <a:avLst/>
-          </a:prstGeom>
-          <a:noFill/>
-          <a:ln w="25400">
-            <a:solidFill>
-              <a:schemeClr val="tx1"/>
-            </a:solidFill>
-          </a:ln>
-          <a:effectLst/>
-        </p:spPr>
-        <p:style>
-          <a:lnRef idx="1">
-            <a:schemeClr val="accent1"/>
-          </a:lnRef>
-          <a:fillRef idx="3">
-            <a:schemeClr val="accent1"/>
-          </a:fillRef>
-          <a:effectRef idx="2">
-            <a:schemeClr val="accent1"/>
-          </a:effectRef>
-          <a:fontRef idx="minor">
-            <a:schemeClr val="lt1"/>
-          </a:fontRef>
-        </p:style>
-        <p:txBody>
-          <a:bodyPr rtlCol="0" anchor="ctr"/>
-          <a:lstStyle/>
-          <a:p>
-            <a:pPr algn="ctr"/>
-            <a:endParaRPr kumimoji="1" lang="ja-JP" altLang="en-US"/>
-          </a:p>
-        </p:txBody>
-      </p:sp>
-      <p:sp>
-        <p:nvSpPr>
-          <p:cNvPr id="50" name="円柱 49"/>
-          <p:cNvSpPr/>
-          <p:nvPr/>
-        </p:nvSpPr>
-        <p:spPr>
-          <a:xfrm>
-            <a:off x="8017036" y="5169935"/>
-            <a:ext cx="173182" cy="288636"/>
-          </a:xfrm>
-          <a:prstGeom prst="can">
-            <a:avLst/>
-          </a:prstGeom>
-          <a:noFill/>
-          <a:ln w="25400">
-            <a:solidFill>
-              <a:schemeClr val="tx1"/>
-            </a:solidFill>
-          </a:ln>
-          <a:effectLst/>
-        </p:spPr>
-        <p:style>
-          <a:lnRef idx="1">
-            <a:schemeClr val="accent1"/>
-          </a:lnRef>
-          <a:fillRef idx="3">
-            <a:schemeClr val="accent1"/>
-          </a:fillRef>
-          <a:effectRef idx="2">
-            <a:schemeClr val="accent1"/>
-          </a:effectRef>
-          <a:fontRef idx="minor">
-            <a:schemeClr val="lt1"/>
-          </a:fontRef>
-        </p:style>
-        <p:txBody>
-          <a:bodyPr rtlCol="0" anchor="ctr"/>
-          <a:lstStyle/>
-          <a:p>
-            <a:pPr algn="ctr"/>
-            <a:endParaRPr kumimoji="1" lang="ja-JP" altLang="en-US"/>
-          </a:p>
-        </p:txBody>
-      </p:sp>
-      <p:sp>
-        <p:nvSpPr>
-          <p:cNvPr id="51" name="円柱 50"/>
-          <p:cNvSpPr/>
-          <p:nvPr/>
-        </p:nvSpPr>
-        <p:spPr>
-          <a:xfrm>
-            <a:off x="8017036" y="5559013"/>
-            <a:ext cx="173182" cy="288636"/>
-          </a:xfrm>
-          <a:prstGeom prst="can">
-            <a:avLst/>
-          </a:prstGeom>
-          <a:noFill/>
-          <a:ln w="25400">
-            <a:solidFill>
-              <a:schemeClr val="tx1"/>
-            </a:solidFill>
-          </a:ln>
-          <a:effectLst/>
-        </p:spPr>
-        <p:style>
-          <a:lnRef idx="1">
-            <a:schemeClr val="accent1"/>
-          </a:lnRef>
-          <a:fillRef idx="3">
-            <a:schemeClr val="accent1"/>
-          </a:fillRef>
-          <a:effectRef idx="2">
-            <a:schemeClr val="accent1"/>
-          </a:effectRef>
-          <a:fontRef idx="minor">
-            <a:schemeClr val="lt1"/>
-          </a:fontRef>
-        </p:style>
-        <p:txBody>
-          <a:bodyPr rtlCol="0" anchor="ctr"/>
-          <a:lstStyle/>
-          <a:p>
-            <a:pPr algn="ctr"/>
-            <a:endParaRPr kumimoji="1" lang="ja-JP" altLang="en-US"/>
-          </a:p>
-        </p:txBody>
-      </p:sp>
-      <p:sp>
-        <p:nvSpPr>
-          <p:cNvPr id="54" name="円柱 53"/>
-          <p:cNvSpPr/>
-          <p:nvPr/>
-        </p:nvSpPr>
-        <p:spPr>
-          <a:xfrm>
-            <a:off x="8017036" y="5930778"/>
-            <a:ext cx="173182" cy="288636"/>
-          </a:xfrm>
-          <a:prstGeom prst="can">
-            <a:avLst/>
-          </a:prstGeom>
-          <a:noFill/>
-          <a:ln w="25400">
-            <a:solidFill>
-              <a:schemeClr val="tx1"/>
-            </a:solidFill>
-          </a:ln>
-          <a:effectLst/>
-        </p:spPr>
-        <p:style>
-          <a:lnRef idx="1">
-            <a:schemeClr val="accent1"/>
-          </a:lnRef>
-          <a:fillRef idx="3">
-            <a:schemeClr val="accent1"/>
-          </a:fillRef>
-          <a:effectRef idx="2">
-            <a:schemeClr val="accent1"/>
-          </a:effectRef>
-          <a:fontRef idx="minor">
-            <a:schemeClr val="lt1"/>
-          </a:fontRef>
-        </p:style>
-        <p:txBody>
-          <a:bodyPr rtlCol="0" anchor="ctr"/>
-          <a:lstStyle/>
-          <a:p>
-            <a:pPr algn="ctr"/>
-            <a:endParaRPr kumimoji="1" lang="ja-JP" altLang="en-US"/>
-          </a:p>
-        </p:txBody>
-      </p:sp>
       <p:sp>
         <p:nvSpPr>
           <p:cNvPr id="55" name="正方形/長方形 54"/>
@@ -12382,6 +11968,306 @@
           </a:fontRef>
         </p:style>
       </p:cxnSp>
+      <p:pic>
+        <p:nvPicPr>
+          <p:cNvPr id="53" name="図 52" descr="trash.png"/>
+          <p:cNvPicPr>
+            <a:picLocks noChangeAspect="1"/>
+          </p:cNvPicPr>
+          <p:nvPr/>
+        </p:nvPicPr>
+        <p:blipFill>
+          <a:blip r:embed="rId3">
+            <a:extLst>
+              <a:ext uri="{28A0092B-C50C-407E-A947-70E740481C1C}">
+                <a14:useLocalDpi xmlns:a14="http://schemas.microsoft.com/office/drawing/2010/main" val="0"/>
+              </a:ext>
+            </a:extLst>
+          </a:blip>
+          <a:stretch>
+            <a:fillRect/>
+          </a:stretch>
+        </p:blipFill>
+        <p:spPr>
+          <a:xfrm>
+            <a:off x="7967360" y="2463737"/>
+            <a:ext cx="272533" cy="272533"/>
+          </a:xfrm>
+          <a:prstGeom prst="rect">
+            <a:avLst/>
+          </a:prstGeom>
+        </p:spPr>
+      </p:pic>
+      <p:pic>
+        <p:nvPicPr>
+          <p:cNvPr id="56" name="図 55" descr="trash.png"/>
+          <p:cNvPicPr>
+            <a:picLocks noChangeAspect="1"/>
+          </p:cNvPicPr>
+          <p:nvPr/>
+        </p:nvPicPr>
+        <p:blipFill>
+          <a:blip r:embed="rId3">
+            <a:extLst>
+              <a:ext uri="{28A0092B-C50C-407E-A947-70E740481C1C}">
+                <a14:useLocalDpi xmlns:a14="http://schemas.microsoft.com/office/drawing/2010/main" val="0"/>
+              </a:ext>
+            </a:extLst>
+          </a:blip>
+          <a:stretch>
+            <a:fillRect/>
+          </a:stretch>
+        </p:blipFill>
+        <p:spPr>
+          <a:xfrm>
+            <a:off x="7967360" y="2865577"/>
+            <a:ext cx="272533" cy="272533"/>
+          </a:xfrm>
+          <a:prstGeom prst="rect">
+            <a:avLst/>
+          </a:prstGeom>
+        </p:spPr>
+      </p:pic>
+      <p:pic>
+        <p:nvPicPr>
+          <p:cNvPr id="57" name="図 56" descr="trash.png"/>
+          <p:cNvPicPr>
+            <a:picLocks noChangeAspect="1"/>
+          </p:cNvPicPr>
+          <p:nvPr/>
+        </p:nvPicPr>
+        <p:blipFill>
+          <a:blip r:embed="rId3">
+            <a:extLst>
+              <a:ext uri="{28A0092B-C50C-407E-A947-70E740481C1C}">
+                <a14:useLocalDpi xmlns:a14="http://schemas.microsoft.com/office/drawing/2010/main" val="0"/>
+              </a:ext>
+            </a:extLst>
+          </a:blip>
+          <a:stretch>
+            <a:fillRect/>
+          </a:stretch>
+        </p:blipFill>
+        <p:spPr>
+          <a:xfrm>
+            <a:off x="7967360" y="3244330"/>
+            <a:ext cx="272533" cy="272533"/>
+          </a:xfrm>
+          <a:prstGeom prst="rect">
+            <a:avLst/>
+          </a:prstGeom>
+        </p:spPr>
+      </p:pic>
+      <p:pic>
+        <p:nvPicPr>
+          <p:cNvPr id="58" name="図 57" descr="trash.png"/>
+          <p:cNvPicPr>
+            <a:picLocks noChangeAspect="1"/>
+          </p:cNvPicPr>
+          <p:nvPr/>
+        </p:nvPicPr>
+        <p:blipFill>
+          <a:blip r:embed="rId3">
+            <a:extLst>
+              <a:ext uri="{28A0092B-C50C-407E-A947-70E740481C1C}">
+                <a14:useLocalDpi xmlns:a14="http://schemas.microsoft.com/office/drawing/2010/main" val="0"/>
+              </a:ext>
+            </a:extLst>
+          </a:blip>
+          <a:stretch>
+            <a:fillRect/>
+          </a:stretch>
+        </p:blipFill>
+        <p:spPr>
+          <a:xfrm>
+            <a:off x="7967360" y="3646170"/>
+            <a:ext cx="272533" cy="272533"/>
+          </a:xfrm>
+          <a:prstGeom prst="rect">
+            <a:avLst/>
+          </a:prstGeom>
+        </p:spPr>
+      </p:pic>
+      <p:pic>
+        <p:nvPicPr>
+          <p:cNvPr id="59" name="図 58" descr="trash.png"/>
+          <p:cNvPicPr>
+            <a:picLocks noChangeAspect="1"/>
+          </p:cNvPicPr>
+          <p:nvPr/>
+        </p:nvPicPr>
+        <p:blipFill>
+          <a:blip r:embed="rId3">
+            <a:extLst>
+              <a:ext uri="{28A0092B-C50C-407E-A947-70E740481C1C}">
+                <a14:useLocalDpi xmlns:a14="http://schemas.microsoft.com/office/drawing/2010/main" val="0"/>
+              </a:ext>
+            </a:extLst>
+          </a:blip>
+          <a:stretch>
+            <a:fillRect/>
+          </a:stretch>
+        </p:blipFill>
+        <p:spPr>
+          <a:xfrm>
+            <a:off x="7966108" y="4020421"/>
+            <a:ext cx="272533" cy="272533"/>
+          </a:xfrm>
+          <a:prstGeom prst="rect">
+            <a:avLst/>
+          </a:prstGeom>
+        </p:spPr>
+      </p:pic>
+      <p:pic>
+        <p:nvPicPr>
+          <p:cNvPr id="60" name="図 59" descr="trash.png"/>
+          <p:cNvPicPr>
+            <a:picLocks noChangeAspect="1"/>
+          </p:cNvPicPr>
+          <p:nvPr/>
+        </p:nvPicPr>
+        <p:blipFill>
+          <a:blip r:embed="rId3">
+            <a:extLst>
+              <a:ext uri="{28A0092B-C50C-407E-A947-70E740481C1C}">
+                <a14:useLocalDpi xmlns:a14="http://schemas.microsoft.com/office/drawing/2010/main" val="0"/>
+              </a:ext>
+            </a:extLst>
+          </a:blip>
+          <a:stretch>
+            <a:fillRect/>
+          </a:stretch>
+        </p:blipFill>
+        <p:spPr>
+          <a:xfrm>
+            <a:off x="7966108" y="4422261"/>
+            <a:ext cx="272533" cy="272533"/>
+          </a:xfrm>
+          <a:prstGeom prst="rect">
+            <a:avLst/>
+          </a:prstGeom>
+        </p:spPr>
+      </p:pic>
+      <p:pic>
+        <p:nvPicPr>
+          <p:cNvPr id="61" name="図 60" descr="trash.png"/>
+          <p:cNvPicPr>
+            <a:picLocks noChangeAspect="1"/>
+          </p:cNvPicPr>
+          <p:nvPr/>
+        </p:nvPicPr>
+        <p:blipFill>
+          <a:blip r:embed="rId3">
+            <a:extLst>
+              <a:ext uri="{28A0092B-C50C-407E-A947-70E740481C1C}">
+                <a14:useLocalDpi xmlns:a14="http://schemas.microsoft.com/office/drawing/2010/main" val="0"/>
+              </a:ext>
+            </a:extLst>
+          </a:blip>
+          <a:stretch>
+            <a:fillRect/>
+          </a:stretch>
+        </p:blipFill>
+        <p:spPr>
+          <a:xfrm>
+            <a:off x="7967360" y="4799059"/>
+            <a:ext cx="272533" cy="272533"/>
+          </a:xfrm>
+          <a:prstGeom prst="rect">
+            <a:avLst/>
+          </a:prstGeom>
+        </p:spPr>
+      </p:pic>
+      <p:pic>
+        <p:nvPicPr>
+          <p:cNvPr id="62" name="図 61" descr="trash.png"/>
+          <p:cNvPicPr>
+            <a:picLocks noChangeAspect="1"/>
+          </p:cNvPicPr>
+          <p:nvPr/>
+        </p:nvPicPr>
+        <p:blipFill>
+          <a:blip r:embed="rId3">
+            <a:extLst>
+              <a:ext uri="{28A0092B-C50C-407E-A947-70E740481C1C}">
+                <a14:useLocalDpi xmlns:a14="http://schemas.microsoft.com/office/drawing/2010/main" val="0"/>
+              </a:ext>
+            </a:extLst>
+          </a:blip>
+          <a:stretch>
+            <a:fillRect/>
+          </a:stretch>
+        </p:blipFill>
+        <p:spPr>
+          <a:xfrm>
+            <a:off x="7967360" y="5200899"/>
+            <a:ext cx="272533" cy="272533"/>
+          </a:xfrm>
+          <a:prstGeom prst="rect">
+            <a:avLst/>
+          </a:prstGeom>
+        </p:spPr>
+      </p:pic>
+      <p:pic>
+        <p:nvPicPr>
+          <p:cNvPr id="63" name="図 62" descr="trash.png"/>
+          <p:cNvPicPr>
+            <a:picLocks noChangeAspect="1"/>
+          </p:cNvPicPr>
+          <p:nvPr/>
+        </p:nvPicPr>
+        <p:blipFill>
+          <a:blip r:embed="rId3">
+            <a:extLst>
+              <a:ext uri="{28A0092B-C50C-407E-A947-70E740481C1C}">
+                <a14:useLocalDpi xmlns:a14="http://schemas.microsoft.com/office/drawing/2010/main" val="0"/>
+              </a:ext>
+            </a:extLst>
+          </a:blip>
+          <a:stretch>
+            <a:fillRect/>
+          </a:stretch>
+        </p:blipFill>
+        <p:spPr>
+          <a:xfrm>
+            <a:off x="7966108" y="5558835"/>
+            <a:ext cx="272533" cy="272533"/>
+          </a:xfrm>
+          <a:prstGeom prst="rect">
+            <a:avLst/>
+          </a:prstGeom>
+        </p:spPr>
+      </p:pic>
+      <p:pic>
+        <p:nvPicPr>
+          <p:cNvPr id="70" name="図 69" descr="trash.png"/>
+          <p:cNvPicPr>
+            <a:picLocks noChangeAspect="1"/>
+          </p:cNvPicPr>
+          <p:nvPr/>
+        </p:nvPicPr>
+        <p:blipFill>
+          <a:blip r:embed="rId3">
+            <a:extLst>
+              <a:ext uri="{28A0092B-C50C-407E-A947-70E740481C1C}">
+                <a14:useLocalDpi xmlns:a14="http://schemas.microsoft.com/office/drawing/2010/main" val="0"/>
+              </a:ext>
+            </a:extLst>
+          </a:blip>
+          <a:stretch>
+            <a:fillRect/>
+          </a:stretch>
+        </p:blipFill>
+        <p:spPr>
+          <a:xfrm>
+            <a:off x="7966108" y="5960675"/>
+            <a:ext cx="272533" cy="272533"/>
+          </a:xfrm>
+          <a:prstGeom prst="rect">
+            <a:avLst/>
+          </a:prstGeom>
+        </p:spPr>
+      </p:pic>
     </p:spTree>
     <p:extLst>
       <p:ext uri="{BB962C8B-B14F-4D97-AF65-F5344CB8AC3E}">

</xml_diff>